<commit_message>
Add graphs to poster.
</commit_message>
<xml_diff>
--- a/Poster.pptx
+++ b/Poster.pptx
@@ -109,7 +109,7 @@
   </p:defaultTextStyle>
   <p:extLst>
     <p:ext uri="{EFAFB233-063F-42B5-8137-9DF3F51BA10A}">
-      <p15:sldGuideLst xmlns:p15="http://schemas.microsoft.com/office/powerpoint/2012/main" xmlns="">
+      <p15:sldGuideLst xmlns="" xmlns:p15="http://schemas.microsoft.com/office/powerpoint/2012/main">
         <p15:guide id="1" orient="horz" pos="3318">
           <p15:clr>
             <a:srgbClr val="A4A3A4"/>
@@ -163,7 +163,7 @@
       </p15:sldGuideLst>
     </p:ext>
     <p:ext uri="{2D200454-40CA-4A62-9FC3-DE9A4176ACB9}">
-      <p15:notesGuideLst xmlns:p15="http://schemas.microsoft.com/office/powerpoint/2012/main" xmlns="">
+      <p15:notesGuideLst xmlns="" xmlns:p15="http://schemas.microsoft.com/office/powerpoint/2012/main">
         <p15:guide id="1" orient="horz" pos="13681">
           <p15:clr>
             <a:srgbClr val="A4A3A4"/>
@@ -187,6 +187,732 @@
   <p:cmAuthor id="2" name="A.KOTOULAS" initials="HELP - " lastIdx="1" clrIdx="2"/>
   <p:cmAuthor id="3" name="PosterPresentations.com - 510.649.3001" initials="HELP - " lastIdx="1" clrIdx="3"/>
 </p:cmAuthorLst>
+</file>
+
+<file path=ppt/charts/chart1.xml><?xml version="1.0" encoding="utf-8"?>
+<c:chartSpace xmlns:c="http://schemas.openxmlformats.org/drawingml/2006/chart" xmlns:a="http://schemas.openxmlformats.org/drawingml/2006/main" xmlns:r="http://schemas.openxmlformats.org/officeDocument/2006/relationships">
+  <c:date1904 val="0"/>
+  <c:lang val="en-US"/>
+  <c:roundedCorners val="0"/>
+  <mc:AlternateContent xmlns:mc="http://schemas.openxmlformats.org/markup-compatibility/2006">
+    <mc:Choice xmlns:c14="http://schemas.microsoft.com/office/drawing/2007/8/2/chart" Requires="c14">
+      <c14:style val="118"/>
+    </mc:Choice>
+    <mc:Fallback>
+      <c:style val="18"/>
+    </mc:Fallback>
+  </mc:AlternateContent>
+  <c:chart>
+    <c:title>
+      <c:tx>
+        <c:rich>
+          <a:bodyPr/>
+          <a:lstStyle/>
+          <a:p>
+            <a:pPr>
+              <a:defRPr sz="3600"/>
+            </a:pPr>
+            <a:r>
+              <a:rPr lang="en-US" sz="3600"/>
+              <a:t>Average Money over a One-Month Period</a:t>
+            </a:r>
+          </a:p>
+        </c:rich>
+      </c:tx>
+      <c:layout/>
+      <c:overlay val="0"/>
+    </c:title>
+    <c:autoTitleDeleted val="0"/>
+    <c:plotArea>
+      <c:layout/>
+      <c:scatterChart>
+        <c:scatterStyle val="smoothMarker"/>
+        <c:varyColors val="0"/>
+        <c:ser>
+          <c:idx val="0"/>
+          <c:order val="0"/>
+          <c:tx>
+            <c:strRef>
+              <c:f>Sheet1!$B$1</c:f>
+              <c:strCache>
+                <c:ptCount val="1"/>
+                <c:pt idx="0">
+                  <c:v>Average Money</c:v>
+                </c:pt>
+              </c:strCache>
+            </c:strRef>
+          </c:tx>
+          <c:marker>
+            <c:symbol val="none"/>
+          </c:marker>
+          <c:xVal>
+            <c:numRef>
+              <c:f>Sheet1!$A$2:$A$31</c:f>
+              <c:numCache>
+                <c:formatCode>General</c:formatCode>
+                <c:ptCount val="30"/>
+                <c:pt idx="0">
+                  <c:v>1.0</c:v>
+                </c:pt>
+                <c:pt idx="1">
+                  <c:v>2.0</c:v>
+                </c:pt>
+                <c:pt idx="2">
+                  <c:v>3.0</c:v>
+                </c:pt>
+                <c:pt idx="3">
+                  <c:v>4.0</c:v>
+                </c:pt>
+                <c:pt idx="4">
+                  <c:v>5.0</c:v>
+                </c:pt>
+                <c:pt idx="5">
+                  <c:v>6.0</c:v>
+                </c:pt>
+                <c:pt idx="6">
+                  <c:v>7.0</c:v>
+                </c:pt>
+                <c:pt idx="7">
+                  <c:v>8.0</c:v>
+                </c:pt>
+                <c:pt idx="8">
+                  <c:v>9.0</c:v>
+                </c:pt>
+                <c:pt idx="9">
+                  <c:v>10.0</c:v>
+                </c:pt>
+                <c:pt idx="10">
+                  <c:v>11.0</c:v>
+                </c:pt>
+                <c:pt idx="11">
+                  <c:v>12.0</c:v>
+                </c:pt>
+                <c:pt idx="12">
+                  <c:v>13.0</c:v>
+                </c:pt>
+                <c:pt idx="13">
+                  <c:v>14.0</c:v>
+                </c:pt>
+                <c:pt idx="14">
+                  <c:v>15.0</c:v>
+                </c:pt>
+                <c:pt idx="15">
+                  <c:v>16.0</c:v>
+                </c:pt>
+                <c:pt idx="16">
+                  <c:v>17.0</c:v>
+                </c:pt>
+                <c:pt idx="17">
+                  <c:v>18.0</c:v>
+                </c:pt>
+                <c:pt idx="18">
+                  <c:v>19.0</c:v>
+                </c:pt>
+                <c:pt idx="19">
+                  <c:v>20.0</c:v>
+                </c:pt>
+                <c:pt idx="20">
+                  <c:v>21.0</c:v>
+                </c:pt>
+                <c:pt idx="21">
+                  <c:v>22.0</c:v>
+                </c:pt>
+                <c:pt idx="22">
+                  <c:v>23.0</c:v>
+                </c:pt>
+                <c:pt idx="23">
+                  <c:v>24.0</c:v>
+                </c:pt>
+                <c:pt idx="24">
+                  <c:v>25.0</c:v>
+                </c:pt>
+                <c:pt idx="25">
+                  <c:v>26.0</c:v>
+                </c:pt>
+                <c:pt idx="26">
+                  <c:v>27.0</c:v>
+                </c:pt>
+                <c:pt idx="27">
+                  <c:v>28.0</c:v>
+                </c:pt>
+                <c:pt idx="28">
+                  <c:v>29.0</c:v>
+                </c:pt>
+                <c:pt idx="29">
+                  <c:v>30.0</c:v>
+                </c:pt>
+              </c:numCache>
+            </c:numRef>
+          </c:xVal>
+          <c:yVal>
+            <c:numRef>
+              <c:f>Sheet1!$B$2:$B$31</c:f>
+              <c:numCache>
+                <c:formatCode>"$"#,##0.00_);[Red]\("$"#,##0.00\)</c:formatCode>
+                <c:ptCount val="30"/>
+                <c:pt idx="0">
+                  <c:v>160.48</c:v>
+                </c:pt>
+                <c:pt idx="1">
+                  <c:v>440.04</c:v>
+                </c:pt>
+                <c:pt idx="2">
+                  <c:v>612.91</c:v>
+                </c:pt>
+                <c:pt idx="3">
+                  <c:v>728.51</c:v>
+                </c:pt>
+                <c:pt idx="4">
+                  <c:v>957.59</c:v>
+                </c:pt>
+                <c:pt idx="5">
+                  <c:v>1091.79</c:v>
+                </c:pt>
+                <c:pt idx="6">
+                  <c:v>1270.68</c:v>
+                </c:pt>
+                <c:pt idx="7">
+                  <c:v>1300.21</c:v>
+                </c:pt>
+                <c:pt idx="8">
+                  <c:v>1429.8</c:v>
+                </c:pt>
+                <c:pt idx="9">
+                  <c:v>1569.67</c:v>
+                </c:pt>
+                <c:pt idx="10">
+                  <c:v>1770.29</c:v>
+                </c:pt>
+                <c:pt idx="11">
+                  <c:v>1739.0</c:v>
+                </c:pt>
+                <c:pt idx="12">
+                  <c:v>1941.94</c:v>
+                </c:pt>
+                <c:pt idx="13">
+                  <c:v>2184.8</c:v>
+                </c:pt>
+                <c:pt idx="14">
+                  <c:v>2690.62</c:v>
+                </c:pt>
+                <c:pt idx="15">
+                  <c:v>2232.67</c:v>
+                </c:pt>
+                <c:pt idx="16">
+                  <c:v>1955.5</c:v>
+                </c:pt>
+                <c:pt idx="17">
+                  <c:v>1858.0</c:v>
+                </c:pt>
+                <c:pt idx="18">
+                  <c:v>2212.86</c:v>
+                </c:pt>
+                <c:pt idx="19">
+                  <c:v>943.67</c:v>
+                </c:pt>
+                <c:pt idx="20">
+                  <c:v>946.0</c:v>
+                </c:pt>
+                <c:pt idx="21">
+                  <c:v>1306.0</c:v>
+                </c:pt>
+                <c:pt idx="22">
+                  <c:v>1215.0</c:v>
+                </c:pt>
+                <c:pt idx="23">
+                  <c:v>1555.0</c:v>
+                </c:pt>
+                <c:pt idx="24">
+                  <c:v>1550.5</c:v>
+                </c:pt>
+                <c:pt idx="25">
+                  <c:v>1882.67</c:v>
+                </c:pt>
+                <c:pt idx="26">
+                  <c:v>2050.33</c:v>
+                </c:pt>
+                <c:pt idx="27">
+                  <c:v>1639.0</c:v>
+                </c:pt>
+                <c:pt idx="28">
+                  <c:v>3384.0</c:v>
+                </c:pt>
+                <c:pt idx="29">
+                  <c:v>3787.0</c:v>
+                </c:pt>
+              </c:numCache>
+            </c:numRef>
+          </c:yVal>
+          <c:smooth val="1"/>
+        </c:ser>
+        <c:dLbls>
+          <c:showLegendKey val="0"/>
+          <c:showVal val="0"/>
+          <c:showCatName val="0"/>
+          <c:showSerName val="0"/>
+          <c:showPercent val="0"/>
+          <c:showBubbleSize val="0"/>
+        </c:dLbls>
+        <c:axId val="2138529032"/>
+        <c:axId val="2138532056"/>
+      </c:scatterChart>
+      <c:valAx>
+        <c:axId val="2138529032"/>
+        <c:scaling>
+          <c:orientation val="minMax"/>
+          <c:max val="30.0"/>
+        </c:scaling>
+        <c:delete val="0"/>
+        <c:axPos val="b"/>
+        <c:title>
+          <c:tx>
+            <c:rich>
+              <a:bodyPr/>
+              <a:lstStyle/>
+              <a:p>
+                <a:pPr>
+                  <a:defRPr/>
+                </a:pPr>
+                <a:r>
+                  <a:rPr lang="en-US" sz="2500" dirty="0" smtClean="0"/>
+                  <a:t>Day of Month</a:t>
+                </a:r>
+                <a:endParaRPr lang="en-US" sz="2500" dirty="0"/>
+              </a:p>
+            </c:rich>
+          </c:tx>
+          <c:layout/>
+          <c:overlay val="0"/>
+        </c:title>
+        <c:numFmt formatCode="General" sourceLinked="1"/>
+        <c:majorTickMark val="out"/>
+        <c:minorTickMark val="none"/>
+        <c:tickLblPos val="nextTo"/>
+        <c:txPr>
+          <a:bodyPr/>
+          <a:lstStyle/>
+          <a:p>
+            <a:pPr>
+              <a:defRPr sz="2500"/>
+            </a:pPr>
+            <a:endParaRPr lang="en-US"/>
+          </a:p>
+        </c:txPr>
+        <c:crossAx val="2138532056"/>
+        <c:crosses val="autoZero"/>
+        <c:crossBetween val="midCat"/>
+      </c:valAx>
+      <c:valAx>
+        <c:axId val="2138532056"/>
+        <c:scaling>
+          <c:orientation val="minMax"/>
+        </c:scaling>
+        <c:delete val="0"/>
+        <c:axPos val="l"/>
+        <c:majorGridlines/>
+        <c:numFmt formatCode="&quot;$&quot;#,##0.00_);[Red]\(&quot;$&quot;#,##0.00\)" sourceLinked="1"/>
+        <c:majorTickMark val="out"/>
+        <c:minorTickMark val="none"/>
+        <c:tickLblPos val="nextTo"/>
+        <c:txPr>
+          <a:bodyPr/>
+          <a:lstStyle/>
+          <a:p>
+            <a:pPr>
+              <a:defRPr sz="2500"/>
+            </a:pPr>
+            <a:endParaRPr lang="en-US"/>
+          </a:p>
+        </c:txPr>
+        <c:crossAx val="2138529032"/>
+        <c:crosses val="autoZero"/>
+        <c:crossBetween val="midCat"/>
+      </c:valAx>
+    </c:plotArea>
+    <c:legend>
+      <c:legendPos val="r"/>
+      <c:layout/>
+      <c:overlay val="0"/>
+      <c:txPr>
+        <a:bodyPr/>
+        <a:lstStyle/>
+        <a:p>
+          <a:pPr>
+            <a:defRPr sz="2000"/>
+          </a:pPr>
+          <a:endParaRPr lang="en-US"/>
+        </a:p>
+      </c:txPr>
+    </c:legend>
+    <c:plotVisOnly val="1"/>
+    <c:dispBlanksAs val="gap"/>
+    <c:showDLblsOverMax val="0"/>
+  </c:chart>
+  <c:spPr>
+    <a:solidFill>
+      <a:schemeClr val="bg1"/>
+    </a:solidFill>
+    <a:ln>
+      <a:solidFill>
+        <a:srgbClr val="2C556E"/>
+      </a:solidFill>
+    </a:ln>
+  </c:spPr>
+  <c:externalData r:id="rId1">
+    <c:autoUpdate val="0"/>
+  </c:externalData>
+</c:chartSpace>
+</file>
+
+<file path=ppt/charts/chart2.xml><?xml version="1.0" encoding="utf-8"?>
+<c:chartSpace xmlns:c="http://schemas.openxmlformats.org/drawingml/2006/chart" xmlns:a="http://schemas.openxmlformats.org/drawingml/2006/main" xmlns:r="http://schemas.openxmlformats.org/officeDocument/2006/relationships">
+  <c:date1904 val="0"/>
+  <c:lang val="en-US"/>
+  <c:roundedCorners val="0"/>
+  <mc:AlternateContent xmlns:mc="http://schemas.openxmlformats.org/markup-compatibility/2006">
+    <mc:Choice xmlns:c14="http://schemas.microsoft.com/office/drawing/2007/8/2/chart" Requires="c14">
+      <c14:style val="118"/>
+    </mc:Choice>
+    <mc:Fallback>
+      <c:style val="18"/>
+    </mc:Fallback>
+  </mc:AlternateContent>
+  <c:chart>
+    <c:title>
+      <c:tx>
+        <c:rich>
+          <a:bodyPr/>
+          <a:lstStyle/>
+          <a:p>
+            <a:pPr>
+              <a:defRPr sz="3600"/>
+            </a:pPr>
+            <a:r>
+              <a:rPr lang="en-US" sz="3600"/>
+              <a:t>Person's Money</a:t>
+            </a:r>
+            <a:r>
+              <a:rPr lang="en-US" sz="3600" baseline="0"/>
+              <a:t> over a Day</a:t>
+            </a:r>
+            <a:endParaRPr lang="en-US" sz="3600"/>
+          </a:p>
+        </c:rich>
+      </c:tx>
+      <c:layout/>
+      <c:overlay val="0"/>
+    </c:title>
+    <c:autoTitleDeleted val="0"/>
+    <c:plotArea>
+      <c:layout/>
+      <c:scatterChart>
+        <c:scatterStyle val="smoothMarker"/>
+        <c:varyColors val="0"/>
+        <c:ser>
+          <c:idx val="0"/>
+          <c:order val="0"/>
+          <c:tx>
+            <c:strRef>
+              <c:f>Sheet1!$B$1</c:f>
+              <c:strCache>
+                <c:ptCount val="1"/>
+                <c:pt idx="0">
+                  <c:v>Money</c:v>
+                </c:pt>
+              </c:strCache>
+            </c:strRef>
+          </c:tx>
+          <c:marker>
+            <c:symbol val="none"/>
+          </c:marker>
+          <c:xVal>
+            <c:numRef>
+              <c:f>Sheet1!$A$2:$A$26</c:f>
+              <c:numCache>
+                <c:formatCode>General</c:formatCode>
+                <c:ptCount val="25"/>
+                <c:pt idx="0">
+                  <c:v>0.0</c:v>
+                </c:pt>
+                <c:pt idx="1">
+                  <c:v>1.0</c:v>
+                </c:pt>
+                <c:pt idx="2">
+                  <c:v>2.0</c:v>
+                </c:pt>
+                <c:pt idx="3">
+                  <c:v>3.0</c:v>
+                </c:pt>
+                <c:pt idx="4">
+                  <c:v>4.0</c:v>
+                </c:pt>
+                <c:pt idx="5">
+                  <c:v>5.0</c:v>
+                </c:pt>
+                <c:pt idx="6">
+                  <c:v>6.0</c:v>
+                </c:pt>
+                <c:pt idx="7">
+                  <c:v>7.0</c:v>
+                </c:pt>
+                <c:pt idx="8">
+                  <c:v>8.0</c:v>
+                </c:pt>
+                <c:pt idx="9">
+                  <c:v>9.0</c:v>
+                </c:pt>
+                <c:pt idx="10">
+                  <c:v>10.0</c:v>
+                </c:pt>
+                <c:pt idx="11">
+                  <c:v>11.0</c:v>
+                </c:pt>
+                <c:pt idx="12">
+                  <c:v>12.0</c:v>
+                </c:pt>
+                <c:pt idx="13">
+                  <c:v>13.0</c:v>
+                </c:pt>
+                <c:pt idx="14">
+                  <c:v>14.0</c:v>
+                </c:pt>
+                <c:pt idx="15">
+                  <c:v>15.0</c:v>
+                </c:pt>
+                <c:pt idx="16">
+                  <c:v>16.0</c:v>
+                </c:pt>
+                <c:pt idx="17">
+                  <c:v>17.0</c:v>
+                </c:pt>
+                <c:pt idx="18">
+                  <c:v>18.0</c:v>
+                </c:pt>
+                <c:pt idx="19">
+                  <c:v>19.0</c:v>
+                </c:pt>
+                <c:pt idx="20">
+                  <c:v>20.0</c:v>
+                </c:pt>
+                <c:pt idx="21">
+                  <c:v>21.0</c:v>
+                </c:pt>
+                <c:pt idx="22">
+                  <c:v>22.0</c:v>
+                </c:pt>
+                <c:pt idx="23">
+                  <c:v>23.0</c:v>
+                </c:pt>
+                <c:pt idx="24">
+                  <c:v>24.0</c:v>
+                </c:pt>
+              </c:numCache>
+            </c:numRef>
+          </c:xVal>
+          <c:yVal>
+            <c:numRef>
+              <c:f>Sheet1!$B$2:$B$26</c:f>
+              <c:numCache>
+                <c:formatCode>"$"#,##0_);[Red]\("$"#,##0\)</c:formatCode>
+                <c:ptCount val="25"/>
+                <c:pt idx="0">
+                  <c:v>532.0</c:v>
+                </c:pt>
+                <c:pt idx="1">
+                  <c:v>532.0</c:v>
+                </c:pt>
+                <c:pt idx="2">
+                  <c:v>532.0</c:v>
+                </c:pt>
+                <c:pt idx="3">
+                  <c:v>532.0</c:v>
+                </c:pt>
+                <c:pt idx="4">
+                  <c:v>532.0</c:v>
+                </c:pt>
+                <c:pt idx="5">
+                  <c:v>532.0</c:v>
+                </c:pt>
+                <c:pt idx="6">
+                  <c:v>532.0</c:v>
+                </c:pt>
+                <c:pt idx="7">
+                  <c:v>532.0</c:v>
+                </c:pt>
+                <c:pt idx="8">
+                  <c:v>479.0</c:v>
+                </c:pt>
+                <c:pt idx="9">
+                  <c:v>395.0</c:v>
+                </c:pt>
+                <c:pt idx="10">
+                  <c:v>431.0</c:v>
+                </c:pt>
+                <c:pt idx="11">
+                  <c:v>467.0</c:v>
+                </c:pt>
+                <c:pt idx="12">
+                  <c:v>503.0</c:v>
+                </c:pt>
+                <c:pt idx="13">
+                  <c:v>539.0</c:v>
+                </c:pt>
+                <c:pt idx="14">
+                  <c:v>575.0</c:v>
+                </c:pt>
+                <c:pt idx="15">
+                  <c:v>611.0</c:v>
+                </c:pt>
+                <c:pt idx="16">
+                  <c:v>647.0</c:v>
+                </c:pt>
+                <c:pt idx="17">
+                  <c:v>683.0</c:v>
+                </c:pt>
+                <c:pt idx="18">
+                  <c:v>643.0</c:v>
+                </c:pt>
+                <c:pt idx="19">
+                  <c:v>622.0</c:v>
+                </c:pt>
+                <c:pt idx="20">
+                  <c:v>564.0</c:v>
+                </c:pt>
+                <c:pt idx="21">
+                  <c:v>530.0</c:v>
+                </c:pt>
+                <c:pt idx="22">
+                  <c:v>530.0</c:v>
+                </c:pt>
+                <c:pt idx="23">
+                  <c:v>530.0</c:v>
+                </c:pt>
+                <c:pt idx="24">
+                  <c:v>510.0</c:v>
+                </c:pt>
+              </c:numCache>
+            </c:numRef>
+          </c:yVal>
+          <c:smooth val="1"/>
+        </c:ser>
+        <c:dLbls>
+          <c:showLegendKey val="0"/>
+          <c:showVal val="0"/>
+          <c:showCatName val="0"/>
+          <c:showSerName val="0"/>
+          <c:showPercent val="0"/>
+          <c:showBubbleSize val="0"/>
+        </c:dLbls>
+        <c:axId val="2131454072"/>
+        <c:axId val="-2130414424"/>
+      </c:scatterChart>
+      <c:valAx>
+        <c:axId val="2131454072"/>
+        <c:scaling>
+          <c:orientation val="minMax"/>
+          <c:max val="24.0"/>
+          <c:min val="0.0"/>
+        </c:scaling>
+        <c:delete val="0"/>
+        <c:axPos val="b"/>
+        <c:title>
+          <c:tx>
+            <c:rich>
+              <a:bodyPr/>
+              <a:lstStyle/>
+              <a:p>
+                <a:pPr>
+                  <a:defRPr sz="2500"/>
+                </a:pPr>
+                <a:r>
+                  <a:rPr lang="en-US" sz="2500"/>
+                  <a:t>Time of day (hour)</a:t>
+                </a:r>
+              </a:p>
+            </c:rich>
+          </c:tx>
+          <c:layout/>
+          <c:overlay val="0"/>
+        </c:title>
+        <c:numFmt formatCode="General" sourceLinked="1"/>
+        <c:majorTickMark val="out"/>
+        <c:minorTickMark val="none"/>
+        <c:tickLblPos val="nextTo"/>
+        <c:txPr>
+          <a:bodyPr/>
+          <a:lstStyle/>
+          <a:p>
+            <a:pPr>
+              <a:defRPr sz="2500"/>
+            </a:pPr>
+            <a:endParaRPr lang="en-US"/>
+          </a:p>
+        </c:txPr>
+        <c:crossAx val="-2130414424"/>
+        <c:crosses val="autoZero"/>
+        <c:crossBetween val="midCat"/>
+        <c:majorUnit val="4.0"/>
+      </c:valAx>
+      <c:valAx>
+        <c:axId val="-2130414424"/>
+        <c:scaling>
+          <c:orientation val="minMax"/>
+        </c:scaling>
+        <c:delete val="0"/>
+        <c:axPos val="l"/>
+        <c:majorGridlines/>
+        <c:numFmt formatCode="&quot;$&quot;#,##0_);[Red]\(&quot;$&quot;#,##0\)" sourceLinked="1"/>
+        <c:majorTickMark val="out"/>
+        <c:minorTickMark val="none"/>
+        <c:tickLblPos val="nextTo"/>
+        <c:txPr>
+          <a:bodyPr/>
+          <a:lstStyle/>
+          <a:p>
+            <a:pPr>
+              <a:defRPr sz="2500"/>
+            </a:pPr>
+            <a:endParaRPr lang="en-US"/>
+          </a:p>
+        </c:txPr>
+        <c:crossAx val="2131454072"/>
+        <c:crosses val="autoZero"/>
+        <c:crossBetween val="midCat"/>
+      </c:valAx>
+    </c:plotArea>
+    <c:legend>
+      <c:legendPos val="r"/>
+      <c:layout/>
+      <c:overlay val="0"/>
+      <c:txPr>
+        <a:bodyPr/>
+        <a:lstStyle/>
+        <a:p>
+          <a:pPr>
+            <a:defRPr sz="2000"/>
+          </a:pPr>
+          <a:endParaRPr lang="en-US"/>
+        </a:p>
+      </c:txPr>
+    </c:legend>
+    <c:plotVisOnly val="1"/>
+    <c:dispBlanksAs val="gap"/>
+    <c:showDLblsOverMax val="0"/>
+  </c:chart>
+  <c:spPr>
+    <a:solidFill>
+      <a:srgbClr val="FFFFFF"/>
+    </a:solidFill>
+    <a:ln>
+      <a:solidFill>
+        <a:srgbClr val="2C556E"/>
+      </a:solidFill>
+    </a:ln>
+  </c:spPr>
+  <c:externalData r:id="rId1">
+    <c:autoUpdate val="0"/>
+  </c:externalData>
+</c:chartSpace>
 </file>
 
 <file path=ppt/notesMasters/notesMaster1.xml><?xml version="1.0" encoding="utf-8"?>
@@ -272,7 +998,7 @@
             <a:fld id="{E6CC2317-6751-4CD4-9995-8782DD78E936}" type="datetimeFigureOut">
               <a:rPr lang="en-US" smtClean="0"/>
               <a:pPr/>
-              <a:t>4/24/15</a:t>
+              <a:t>4/27/15</a:t>
             </a:fld>
             <a:endParaRPr lang="en-US" dirty="0"/>
           </a:p>
@@ -3191,7 +3917,7 @@
               <a:graphicData uri="http://schemas.openxmlformats.org/presentationml/2006/ole">
                 <mc:AlternateContent xmlns:mc="http://schemas.openxmlformats.org/markup-compatibility/2006">
                   <mc:Choice xmlns:v="urn:schemas-microsoft-com:vml" Requires="v">
-                    <p:oleObj spid="_x0000_s1111" name="Image" r:id="rId8" imgW="1828440" imgH="1117440" progId="Photoshop.Image.13">
+                    <p:oleObj spid="_x0000_s1120" name="Image" r:id="rId8" imgW="1828440" imgH="1117440" progId="Photoshop.Image.13">
                       <p:embed/>
                     </p:oleObj>
                   </mc:Choice>
@@ -3248,7 +3974,7 @@
               <a:graphicData uri="http://schemas.openxmlformats.org/presentationml/2006/ole">
                 <mc:AlternateContent xmlns:mc="http://schemas.openxmlformats.org/markup-compatibility/2006">
                   <mc:Choice xmlns:v="urn:schemas-microsoft-com:vml" Requires="v">
-                    <p:oleObj spid="_x0000_s1112" name="Image" r:id="rId10" imgW="1828440" imgH="1117440" progId="Photoshop.Image.13">
+                    <p:oleObj spid="_x0000_s1121" name="Image" r:id="rId10" imgW="1828440" imgH="1117440" progId="Photoshop.Image.13">
                       <p:embed/>
                     </p:oleObj>
                   </mc:Choice>
@@ -4376,7 +5102,7 @@
             <a:graphicData uri="http://schemas.openxmlformats.org/presentationml/2006/ole">
               <mc:AlternateContent xmlns:mc="http://schemas.openxmlformats.org/markup-compatibility/2006">
                 <mc:Choice xmlns:v="urn:schemas-microsoft-com:vml" Requires="v">
-                  <p:oleObj spid="_x0000_s1113" name="Image" r:id="rId12" imgW="4571280" imgH="1688760" progId="Photoshop.Image.13">
+                  <p:oleObj spid="_x0000_s1122" name="Image" r:id="rId12" imgW="4571280" imgH="1688760" progId="Photoshop.Image.13">
                     <p:embed/>
                   </p:oleObj>
                 </mc:Choice>
@@ -4460,7 +5186,7 @@
             <a:graphicData uri="http://schemas.openxmlformats.org/presentationml/2006/ole">
               <mc:AlternateContent xmlns:mc="http://schemas.openxmlformats.org/markup-compatibility/2006">
                 <mc:Choice xmlns:v="urn:schemas-microsoft-com:vml" Requires="v">
-                  <p:oleObj spid="_x0000_s1114" name="Image" r:id="rId15" imgW="1574280" imgH="1053720" progId="Photoshop.Image.13">
+                  <p:oleObj spid="_x0000_s1123" name="Image" r:id="rId15" imgW="1574280" imgH="1053720" progId="Photoshop.Image.13">
                     <p:embed/>
                   </p:oleObj>
                 </mc:Choice>
@@ -5320,34 +6046,6 @@
       </p:sp>
       <p:sp>
         <p:nvSpPr>
-          <p:cNvPr id="9" name="Text Placeholder 8"/>
-          <p:cNvSpPr>
-            <a:spLocks noGrp="1"/>
-          </p:cNvSpPr>
-          <p:nvPr>
-            <p:ph type="body" sz="quarter" idx="23"/>
-          </p:nvPr>
-        </p:nvSpPr>
-        <p:spPr>
-          <a:xfrm>
-            <a:off x="11252201" y="18577112"/>
-            <a:ext cx="21421724" cy="846363"/>
-          </a:xfrm>
-        </p:spPr>
-        <p:txBody>
-          <a:bodyPr/>
-          <a:lstStyle/>
-          <a:p>
-            <a:r>
-              <a:rPr lang="en-US" dirty="0" smtClean="0"/>
-              <a:t>Post graphs and perhaps a snap shot of the people at a given time</a:t>
-            </a:r>
-            <a:endParaRPr lang="en-US" dirty="0"/>
-          </a:p>
-        </p:txBody>
-      </p:sp>
-      <p:sp>
-        <p:nvSpPr>
           <p:cNvPr id="10" name="Text Placeholder 9"/>
           <p:cNvSpPr>
             <a:spLocks noGrp="1"/>
@@ -5580,7 +6278,6 @@
               <a:rPr lang="en-US" dirty="0"/>
               <a:t>Mention scope </a:t>
             </a:r>
-            <a:endParaRPr lang="en-US" dirty="0"/>
           </a:p>
         </p:txBody>
       </p:sp>
@@ -5677,12 +6374,64 @@
           <a:p>
             <a:r>
               <a:rPr lang="en-US" dirty="0" smtClean="0"/>
-              <a:t>City Simulator</a:t>
+              <a:t>City </a:t>
+            </a:r>
+            <a:r>
+              <a:rPr lang="en-US" dirty="0" smtClean="0"/>
+              <a:t>Simulator</a:t>
             </a:r>
             <a:endParaRPr lang="en-US" dirty="0"/>
           </a:p>
         </p:txBody>
       </p:sp>
+      <p:graphicFrame>
+        <p:nvGraphicFramePr>
+          <p:cNvPr id="20" name="Chart 19"/>
+          <p:cNvGraphicFramePr>
+            <a:graphicFrameLocks/>
+          </p:cNvGraphicFramePr>
+          <p:nvPr>
+            <p:extLst>
+              <p:ext uri="{D42A27DB-BD31-4B8C-83A1-F6EECF244321}">
+                <p14:modId xmlns:p14="http://schemas.microsoft.com/office/powerpoint/2010/main" val="3404271793"/>
+              </p:ext>
+            </p:extLst>
+          </p:nvPr>
+        </p:nvGraphicFramePr>
+        <p:xfrm>
+          <a:off x="12180236" y="19499695"/>
+          <a:ext cx="9374934" cy="6933750"/>
+        </p:xfrm>
+        <a:graphic>
+          <a:graphicData uri="http://schemas.openxmlformats.org/drawingml/2006/chart">
+            <c:chart xmlns:c="http://schemas.openxmlformats.org/drawingml/2006/chart" xmlns:r="http://schemas.openxmlformats.org/officeDocument/2006/relationships" r:id="rId3"/>
+          </a:graphicData>
+        </a:graphic>
+      </p:graphicFrame>
+      <p:graphicFrame>
+        <p:nvGraphicFramePr>
+          <p:cNvPr id="21" name="Chart 20"/>
+          <p:cNvGraphicFramePr>
+            <a:graphicFrameLocks/>
+          </p:cNvGraphicFramePr>
+          <p:nvPr>
+            <p:extLst>
+              <p:ext uri="{D42A27DB-BD31-4B8C-83A1-F6EECF244321}">
+                <p14:modId xmlns:p14="http://schemas.microsoft.com/office/powerpoint/2010/main" val="2459764301"/>
+              </p:ext>
+            </p:extLst>
+          </p:nvPr>
+        </p:nvGraphicFramePr>
+        <p:xfrm>
+          <a:off x="22344610" y="19499694"/>
+          <a:ext cx="8992762" cy="6933751"/>
+        </p:xfrm>
+        <a:graphic>
+          <a:graphicData uri="http://schemas.openxmlformats.org/drawingml/2006/chart">
+            <c:chart xmlns:c="http://schemas.openxmlformats.org/drawingml/2006/chart" xmlns:r="http://schemas.openxmlformats.org/officeDocument/2006/relationships" r:id="rId4"/>
+          </a:graphicData>
+        </a:graphic>
+      </p:graphicFrame>
     </p:spTree>
     <p:extLst>
       <p:ext uri="{BB962C8B-B14F-4D97-AF65-F5344CB8AC3E}">

</xml_diff>

<commit_message>
Add state machine and people to conceptual model in poster.
</commit_message>
<xml_diff>
--- a/Poster.pptx
+++ b/Poster.pptx
@@ -3917,7 +3917,7 @@
               <a:graphicData uri="http://schemas.openxmlformats.org/presentationml/2006/ole">
                 <mc:AlternateContent xmlns:mc="http://schemas.openxmlformats.org/markup-compatibility/2006">
                   <mc:Choice xmlns:v="urn:schemas-microsoft-com:vml" Requires="v">
-                    <p:oleObj spid="_x0000_s1120" name="Image" r:id="rId8" imgW="1828440" imgH="1117440" progId="Photoshop.Image.13">
+                    <p:oleObj spid="_x0000_s1124" name="Image" r:id="rId8" imgW="1828440" imgH="1117440" progId="Photoshop.Image.13">
                       <p:embed/>
                     </p:oleObj>
                   </mc:Choice>
@@ -3974,7 +3974,7 @@
               <a:graphicData uri="http://schemas.openxmlformats.org/presentationml/2006/ole">
                 <mc:AlternateContent xmlns:mc="http://schemas.openxmlformats.org/markup-compatibility/2006">
                   <mc:Choice xmlns:v="urn:schemas-microsoft-com:vml" Requires="v">
-                    <p:oleObj spid="_x0000_s1121" name="Image" r:id="rId10" imgW="1828440" imgH="1117440" progId="Photoshop.Image.13">
+                    <p:oleObj spid="_x0000_s1125" name="Image" r:id="rId10" imgW="1828440" imgH="1117440" progId="Photoshop.Image.13">
                       <p:embed/>
                     </p:oleObj>
                   </mc:Choice>
@@ -5102,7 +5102,7 @@
             <a:graphicData uri="http://schemas.openxmlformats.org/presentationml/2006/ole">
               <mc:AlternateContent xmlns:mc="http://schemas.openxmlformats.org/markup-compatibility/2006">
                 <mc:Choice xmlns:v="urn:schemas-microsoft-com:vml" Requires="v">
-                  <p:oleObj spid="_x0000_s1122" name="Image" r:id="rId12" imgW="4571280" imgH="1688760" progId="Photoshop.Image.13">
+                  <p:oleObj spid="_x0000_s1126" name="Image" r:id="rId12" imgW="4571280" imgH="1688760" progId="Photoshop.Image.13">
                     <p:embed/>
                   </p:oleObj>
                 </mc:Choice>
@@ -5186,7 +5186,7 @@
             <a:graphicData uri="http://schemas.openxmlformats.org/presentationml/2006/ole">
               <mc:AlternateContent xmlns:mc="http://schemas.openxmlformats.org/markup-compatibility/2006">
                 <mc:Choice xmlns:v="urn:schemas-microsoft-com:vml" Requires="v">
-                  <p:oleObj spid="_x0000_s1123" name="Image" r:id="rId15" imgW="1574280" imgH="1053720" progId="Photoshop.Image.13">
+                  <p:oleObj spid="_x0000_s1127" name="Image" r:id="rId15" imgW="1574280" imgH="1053720" progId="Photoshop.Image.13">
                     <p:embed/>
                   </p:oleObj>
                 </mc:Choice>
@@ -5949,8 +5949,8 @@
         </p:nvSpPr>
         <p:spPr>
           <a:xfrm>
-            <a:off x="11252201" y="6021371"/>
-            <a:ext cx="21421724" cy="5001347"/>
+            <a:off x="11252201" y="6518315"/>
+            <a:ext cx="10302969" cy="12292573"/>
           </a:xfrm>
         </p:spPr>
         <p:txBody>
@@ -5958,35 +5958,74 @@
           <a:lstStyle/>
           <a:p>
             <a:r>
+              <a:rPr lang="en-US" b="1" dirty="0" smtClean="0"/>
+              <a:t>Overview</a:t>
+            </a:r>
+            <a:endParaRPr lang="en-US" dirty="0" smtClean="0"/>
+          </a:p>
+          <a:p>
+            <a:r>
+              <a:rPr lang="en-US" sz="2400" dirty="0" smtClean="0"/>
+              <a:t>The simulation is an agent-based discrete-event simulator. Every hour, the simulator notifies all the entities (people and businesses) that time has passed, and the individuals and businesses update their properties.</a:t>
+            </a:r>
+          </a:p>
+          <a:p>
+            <a:endParaRPr lang="en-US" sz="2400" dirty="0" smtClean="0"/>
+          </a:p>
+          <a:p>
+            <a:r>
+              <a:rPr lang="en-US" b="1" dirty="0" smtClean="0"/>
+              <a:t>People</a:t>
+            </a:r>
+          </a:p>
+          <a:p>
+            <a:r>
+              <a:rPr lang="en-US" sz="2400" dirty="0" smtClean="0"/>
+              <a:t>The people represent the agents in our simulation. Every day people have unique experiences; however, they always follow the circle of life.</a:t>
+            </a:r>
+          </a:p>
+          <a:p>
+            <a:endParaRPr lang="en-US" sz="2400" dirty="0" smtClean="0"/>
+          </a:p>
+          <a:p>
+            <a:r>
+              <a:rPr lang="en-US" sz="2400" dirty="0" smtClean="0"/>
+              <a:t>In our simulation, the circle of life is simplified to sleep, eat, work, and shop. People sleep at night, eat in the morning and afternoon, work during the day, and shop in the evening. People can choose to eat at home or at any of the restaurants in the city. In our simulation, shopping refers to all forms of entertainment, which include malls, movies, bars, and night clubs.</a:t>
+            </a:r>
+          </a:p>
+          <a:p>
+            <a:endParaRPr lang="en-US" sz="2400" dirty="0"/>
+          </a:p>
+          <a:p>
+            <a:r>
+              <a:rPr lang="en-US" b="1" dirty="0"/>
+              <a:t>Businesses</a:t>
+            </a:r>
+          </a:p>
+          <a:p>
+            <a:endParaRPr lang="en-US" b="1" dirty="0" smtClean="0"/>
+          </a:p>
+          <a:p>
+            <a:r>
+              <a:rPr lang="en-US" b="1" dirty="0" smtClean="0"/>
+              <a:t>Residence</a:t>
+            </a:r>
+            <a:endParaRPr lang="en-US" b="1" dirty="0"/>
+          </a:p>
+          <a:p>
+            <a:endParaRPr lang="en-US" dirty="0" smtClean="0"/>
+          </a:p>
+          <a:p>
+            <a:endParaRPr lang="en-US" dirty="0"/>
+          </a:p>
+          <a:p>
+            <a:r>
+              <a:rPr lang="en-US" dirty="0" smtClean="0"/>
+              <a:t>State </a:t>
+            </a:r>
+            <a:r>
               <a:rPr lang="en-US" dirty="0"/>
-              <a:t>Discuss exactly how we approached modeling a city</a:t>
-            </a:r>
-          </a:p>
-          <a:p>
-            <a:endParaRPr lang="en-US" dirty="0"/>
-          </a:p>
-          <a:p>
-            <a:r>
-              <a:rPr lang="en-US" dirty="0"/>
-              <a:t>Businesses</a:t>
-            </a:r>
-          </a:p>
-          <a:p>
-            <a:r>
-              <a:rPr lang="en-US" dirty="0"/>
-              <a:t>Residence</a:t>
-            </a:r>
-          </a:p>
-          <a:p>
-            <a:r>
-              <a:rPr lang="en-US" dirty="0"/>
-              <a:t>People</a:t>
-            </a:r>
-          </a:p>
-          <a:p>
-            <a:r>
-              <a:rPr lang="en-US" dirty="0"/>
-              <a:t>State machine</a:t>
+              <a:t>machine</a:t>
             </a:r>
           </a:p>
           <a:p>
@@ -6056,7 +6095,7 @@
         </p:nvSpPr>
         <p:spPr>
           <a:xfrm>
-            <a:off x="11224245" y="17756198"/>
+            <a:off x="11252201" y="21415617"/>
             <a:ext cx="21421724" cy="754045"/>
           </a:xfrm>
         </p:spPr>
@@ -6393,13 +6432,13 @@
           <p:nvPr>
             <p:extLst>
               <p:ext uri="{D42A27DB-BD31-4B8C-83A1-F6EECF244321}">
-                <p14:modId xmlns:p14="http://schemas.microsoft.com/office/powerpoint/2010/main" val="3404271793"/>
+                <p14:modId xmlns:p14="http://schemas.microsoft.com/office/powerpoint/2010/main" val="3675803502"/>
               </p:ext>
             </p:extLst>
           </p:nvPr>
         </p:nvGraphicFramePr>
         <p:xfrm>
-          <a:off x="12180236" y="19499695"/>
+          <a:off x="12208192" y="23159114"/>
           <a:ext cx="9374934" cy="6933750"/>
         </p:xfrm>
         <a:graphic>
@@ -6417,13 +6456,13 @@
           <p:nvPr>
             <p:extLst>
               <p:ext uri="{D42A27DB-BD31-4B8C-83A1-F6EECF244321}">
-                <p14:modId xmlns:p14="http://schemas.microsoft.com/office/powerpoint/2010/main" val="2459764301"/>
+                <p14:modId xmlns:p14="http://schemas.microsoft.com/office/powerpoint/2010/main" val="1350298329"/>
               </p:ext>
             </p:extLst>
           </p:nvPr>
         </p:nvGraphicFramePr>
         <p:xfrm>
-          <a:off x="22344610" y="19499694"/>
+          <a:off x="22372566" y="23159113"/>
           <a:ext cx="8992762" cy="6933751"/>
         </p:xfrm>
         <a:graphic>
@@ -6432,6 +6471,66 @@
           </a:graphicData>
         </a:graphic>
       </p:graphicFrame>
+      <p:pic>
+        <p:nvPicPr>
+          <p:cNvPr id="18" name="Picture 17"/>
+          <p:cNvPicPr>
+            <a:picLocks noChangeAspect="1"/>
+          </p:cNvPicPr>
+          <p:nvPr/>
+        </p:nvPicPr>
+        <p:blipFill>
+          <a:blip r:embed="rId5"/>
+          <a:stretch>
+            <a:fillRect/>
+          </a:stretch>
+        </p:blipFill>
+        <p:spPr>
+          <a:xfrm>
+            <a:off x="21850472" y="7645323"/>
+            <a:ext cx="9486900" cy="6870700"/>
+          </a:xfrm>
+          <a:prstGeom prst="rect">
+            <a:avLst/>
+          </a:prstGeom>
+          <a:ln>
+            <a:solidFill>
+              <a:srgbClr val="2C556E"/>
+            </a:solidFill>
+          </a:ln>
+        </p:spPr>
+      </p:pic>
+      <p:sp>
+        <p:nvSpPr>
+          <p:cNvPr id="22" name="TextBox 21"/>
+          <p:cNvSpPr txBox="1"/>
+          <p:nvPr/>
+        </p:nvSpPr>
+        <p:spPr>
+          <a:xfrm>
+            <a:off x="24411682" y="6843852"/>
+            <a:ext cx="4380225" cy="646331"/>
+          </a:xfrm>
+          <a:prstGeom prst="rect">
+            <a:avLst/>
+          </a:prstGeom>
+          <a:noFill/>
+        </p:spPr>
+        <p:txBody>
+          <a:bodyPr wrap="none" rtlCol="0">
+            <a:spAutoFit/>
+          </a:bodyPr>
+          <a:lstStyle/>
+          <a:p>
+            <a:pPr algn="ctr"/>
+            <a:r>
+              <a:rPr lang="en-US" sz="3600" b="1" dirty="0" smtClean="0"/>
+              <a:t>Person State Machine</a:t>
+            </a:r>
+            <a:endParaRPr lang="en-US" sz="3600" b="1" dirty="0"/>
+          </a:p>
+        </p:txBody>
+      </p:sp>
     </p:spTree>
     <p:extLst>
       <p:ext uri="{BB962C8B-B14F-4D97-AF65-F5344CB8AC3E}">

</xml_diff>

<commit_message>
Add introduction and purpose sections to poster.
</commit_message>
<xml_diff>
--- a/Poster.pptx
+++ b/Poster.pptx
@@ -109,7 +109,7 @@
   </p:defaultTextStyle>
   <p:extLst>
     <p:ext uri="{EFAFB233-063F-42B5-8137-9DF3F51BA10A}">
-      <p15:sldGuideLst xmlns="" xmlns:p15="http://schemas.microsoft.com/office/powerpoint/2012/main">
+      <p15:sldGuideLst xmlns:p15="http://schemas.microsoft.com/office/powerpoint/2012/main" xmlns="">
         <p15:guide id="1" orient="horz" pos="3318">
           <p15:clr>
             <a:srgbClr val="A4A3A4"/>
@@ -163,7 +163,7 @@
       </p15:sldGuideLst>
     </p:ext>
     <p:ext uri="{2D200454-40CA-4A62-9FC3-DE9A4176ACB9}">
-      <p15:notesGuideLst xmlns="" xmlns:p15="http://schemas.microsoft.com/office/powerpoint/2012/main">
+      <p15:notesGuideLst xmlns:p15="http://schemas.microsoft.com/office/powerpoint/2012/main" xmlns="">
         <p15:guide id="1" orient="horz" pos="13681">
           <p15:clr>
             <a:srgbClr val="A4A3A4"/>
@@ -453,11 +453,11 @@
           <c:showPercent val="0"/>
           <c:showBubbleSize val="0"/>
         </c:dLbls>
-        <c:axId val="2138529032"/>
-        <c:axId val="2138532056"/>
+        <c:axId val="2065108120"/>
+        <c:axId val="2065113752"/>
       </c:scatterChart>
       <c:valAx>
-        <c:axId val="2138529032"/>
+        <c:axId val="2065108120"/>
         <c:scaling>
           <c:orientation val="minMax"/>
           <c:max val="30.0"/>
@@ -498,12 +498,12 @@
             <a:endParaRPr lang="en-US"/>
           </a:p>
         </c:txPr>
-        <c:crossAx val="2138532056"/>
+        <c:crossAx val="2065113752"/>
         <c:crosses val="autoZero"/>
         <c:crossBetween val="midCat"/>
       </c:valAx>
       <c:valAx>
-        <c:axId val="2138532056"/>
+        <c:axId val="2065113752"/>
         <c:scaling>
           <c:orientation val="minMax"/>
         </c:scaling>
@@ -524,7 +524,7 @@
             <a:endParaRPr lang="en-US"/>
           </a:p>
         </c:txPr>
-        <c:crossAx val="2138529032"/>
+        <c:crossAx val="2065108120"/>
         <c:crosses val="autoZero"/>
         <c:crossBetween val="midCat"/>
       </c:valAx>
@@ -803,11 +803,11 @@
           <c:showPercent val="0"/>
           <c:showBubbleSize val="0"/>
         </c:dLbls>
-        <c:axId val="2131454072"/>
-        <c:axId val="-2130414424"/>
+        <c:axId val="2065171768"/>
+        <c:axId val="2065177272"/>
       </c:scatterChart>
       <c:valAx>
-        <c:axId val="2131454072"/>
+        <c:axId val="2065171768"/>
         <c:scaling>
           <c:orientation val="minMax"/>
           <c:max val="24.0"/>
@@ -848,13 +848,13 @@
             <a:endParaRPr lang="en-US"/>
           </a:p>
         </c:txPr>
-        <c:crossAx val="-2130414424"/>
+        <c:crossAx val="2065177272"/>
         <c:crosses val="autoZero"/>
         <c:crossBetween val="midCat"/>
         <c:majorUnit val="4.0"/>
       </c:valAx>
       <c:valAx>
-        <c:axId val="-2130414424"/>
+        <c:axId val="2065177272"/>
         <c:scaling>
           <c:orientation val="minMax"/>
         </c:scaling>
@@ -875,7 +875,7 @@
             <a:endParaRPr lang="en-US"/>
           </a:p>
         </c:txPr>
-        <c:crossAx val="2131454072"/>
+        <c:crossAx val="2065171768"/>
         <c:crosses val="autoZero"/>
         <c:crossBetween val="midCat"/>
       </c:valAx>
@@ -998,7 +998,7 @@
             <a:fld id="{E6CC2317-6751-4CD4-9995-8782DD78E936}" type="datetimeFigureOut">
               <a:rPr lang="en-US" smtClean="0"/>
               <a:pPr/>
-              <a:t>4/27/15</a:t>
+              <a:t>4/28/15</a:t>
             </a:fld>
             <a:endParaRPr lang="en-US" dirty="0"/>
           </a:p>
@@ -3917,7 +3917,7 @@
               <a:graphicData uri="http://schemas.openxmlformats.org/presentationml/2006/ole">
                 <mc:AlternateContent xmlns:mc="http://schemas.openxmlformats.org/markup-compatibility/2006">
                   <mc:Choice xmlns:v="urn:schemas-microsoft-com:vml" Requires="v">
-                    <p:oleObj spid="_x0000_s1124" name="Image" r:id="rId8" imgW="1828440" imgH="1117440" progId="Photoshop.Image.13">
+                    <p:oleObj spid="_x0000_s1137" name="Image" r:id="rId8" imgW="1828440" imgH="1117440" progId="Photoshop.Image.13">
                       <p:embed/>
                     </p:oleObj>
                   </mc:Choice>
@@ -3974,7 +3974,7 @@
               <a:graphicData uri="http://schemas.openxmlformats.org/presentationml/2006/ole">
                 <mc:AlternateContent xmlns:mc="http://schemas.openxmlformats.org/markup-compatibility/2006">
                   <mc:Choice xmlns:v="urn:schemas-microsoft-com:vml" Requires="v">
-                    <p:oleObj spid="_x0000_s1125" name="Image" r:id="rId10" imgW="1828440" imgH="1117440" progId="Photoshop.Image.13">
+                    <p:oleObj spid="_x0000_s1138" name="Image" r:id="rId10" imgW="1828440" imgH="1117440" progId="Photoshop.Image.13">
                       <p:embed/>
                     </p:oleObj>
                   </mc:Choice>
@@ -5102,7 +5102,7 @@
             <a:graphicData uri="http://schemas.openxmlformats.org/presentationml/2006/ole">
               <mc:AlternateContent xmlns:mc="http://schemas.openxmlformats.org/markup-compatibility/2006">
                 <mc:Choice xmlns:v="urn:schemas-microsoft-com:vml" Requires="v">
-                  <p:oleObj spid="_x0000_s1126" name="Image" r:id="rId12" imgW="4571280" imgH="1688760" progId="Photoshop.Image.13">
+                  <p:oleObj spid="_x0000_s1139" name="Image" r:id="rId12" imgW="4571280" imgH="1688760" progId="Photoshop.Image.13">
                     <p:embed/>
                   </p:oleObj>
                 </mc:Choice>
@@ -5186,7 +5186,7 @@
             <a:graphicData uri="http://schemas.openxmlformats.org/presentationml/2006/ole">
               <mc:AlternateContent xmlns:mc="http://schemas.openxmlformats.org/markup-compatibility/2006">
                 <mc:Choice xmlns:v="urn:schemas-microsoft-com:vml" Requires="v">
-                  <p:oleObj spid="_x0000_s1127" name="Image" r:id="rId15" imgW="1574280" imgH="1053720" progId="Photoshop.Image.13">
+                  <p:oleObj spid="_x0000_s1140" name="Image" r:id="rId15" imgW="1574280" imgH="1053720" progId="Photoshop.Image.13">
                     <p:embed/>
                   </p:oleObj>
                 </mc:Choice>
@@ -5859,30 +5859,53 @@
         <p:spPr>
           <a:xfrm>
             <a:off x="527049" y="6021370"/>
-            <a:ext cx="10196513" cy="1769693"/>
+            <a:ext cx="10196513" cy="10393849"/>
           </a:xfrm>
         </p:spPr>
         <p:txBody>
           <a:bodyPr/>
           <a:lstStyle/>
           <a:p>
+            <a:pPr>
+              <a:lnSpc>
+                <a:spcPct val="150000"/>
+              </a:lnSpc>
+            </a:pPr>
+            <a:r>
+              <a:rPr lang="en-US" dirty="0"/>
+              <a:t>In the past 30 years, technological innovation reduced the prices of transportation and communication dramatically. This led to an increase in worldwide trade, which greatly expanded our economy. The increased economic activity transformed some countries and built cities where none existed before. For this project, we will simulate the economy and vitality of such a city</a:t>
+            </a:r>
             <a:r>
               <a:rPr lang="en-US" dirty="0" smtClean="0"/>
-              <a:t>Essentially describe the motivation and purpose of the simulator. </a:t>
-            </a:r>
-          </a:p>
-          <a:p>
+              <a:t>. </a:t>
+            </a:r>
+            <a:r>
+              <a:rPr lang="en-US" dirty="0"/>
+              <a:t>Ideally, we hope to understand how and why different starting conditions, such as the wealth and the disposition of its citizens, affect the overall </a:t>
+            </a:r>
             <a:r>
               <a:rPr lang="en-US" dirty="0" smtClean="0"/>
-              <a:t>Describe who can use the simulator and to what use.  </a:t>
-            </a:r>
-          </a:p>
-          <a:p>
+              <a:t>prosperity.</a:t>
+            </a:r>
+          </a:p>
+          <a:p>
+            <a:pPr>
+              <a:lnSpc>
+                <a:spcPct val="150000"/>
+              </a:lnSpc>
+            </a:pPr>
+            <a:endParaRPr lang="en-US" dirty="0"/>
+          </a:p>
+          <a:p>
+            <a:pPr>
+              <a:lnSpc>
+                <a:spcPct val="150000"/>
+              </a:lnSpc>
+            </a:pPr>
             <a:r>
               <a:rPr lang="en-US" dirty="0" smtClean="0"/>
-              <a:t>Mention scope </a:t>
-            </a:r>
-            <a:endParaRPr lang="en-US" dirty="0"/>
+              <a:t>The city simulation includes a dynamic population, residences, businesses, and entertainment venues. People can give birth to children. Children move to a new residence when they grow up. This affects the prices of residences and the average income of the population. People’s skills and ambitions determine the success of businesses, and businesses can expand or contract based on how hard their workers work.</a:t>
+            </a:r>
           </a:p>
         </p:txBody>
       </p:sp>
@@ -6300,22 +6323,40 @@
         <p:spPr>
           <a:xfrm>
             <a:off x="527049" y="18191667"/>
-            <a:ext cx="10201275" cy="1308028"/>
+            <a:ext cx="10201275" cy="10393849"/>
           </a:xfrm>
         </p:spPr>
         <p:txBody>
           <a:bodyPr/>
           <a:lstStyle/>
           <a:p>
-            <a:r>
-              <a:rPr lang="en-US" dirty="0"/>
-              <a:t>Describe who can use the simulator and to what use.  </a:t>
-            </a:r>
-          </a:p>
-          <a:p>
-            <a:r>
-              <a:rPr lang="en-US" dirty="0"/>
-              <a:t>Mention scope </a:t>
+            <a:pPr>
+              <a:lnSpc>
+                <a:spcPct val="150000"/>
+              </a:lnSpc>
+            </a:pPr>
+            <a:r>
+              <a:rPr lang="en-US" dirty="0" smtClean="0"/>
+              <a:t>This simulation can serve people in different domains. Our main customers are policy makers. Policy makers can feed the simulation with a model of their city. The simulation will show them how the city’s economy is expected to change in the future. In a sense, the simulation acts as a fast-forward for real life. This would help them see what they could do to prevent unemployment that may happen later on.</a:t>
+            </a:r>
+          </a:p>
+          <a:p>
+            <a:pPr>
+              <a:lnSpc>
+                <a:spcPct val="150000"/>
+              </a:lnSpc>
+            </a:pPr>
+            <a:endParaRPr lang="en-US" dirty="0"/>
+          </a:p>
+          <a:p>
+            <a:pPr>
+              <a:lnSpc>
+                <a:spcPct val="150000"/>
+              </a:lnSpc>
+            </a:pPr>
+            <a:r>
+              <a:rPr lang="en-US" dirty="0" smtClean="0"/>
+              <a:t>The simulation can also be used by researchers in politics, international affairs, economics, civil engineering, and environmental engineering. For example, economics researchers can use the simulation to find out how the increase in construction can reflect on the happiness and economic well-being of individuals. Civil engineers can find out how fast they need to expand the city in order to handle the growing population without ever having a bad shortage. Politicians can use it to study the effect of tax rates on businesses as well as individuals.</a:t>
             </a:r>
           </a:p>
         </p:txBody>
@@ -6413,11 +6454,7 @@
           <a:p>
             <a:r>
               <a:rPr lang="en-US" dirty="0" smtClean="0"/>
-              <a:t>City </a:t>
-            </a:r>
-            <a:r>
-              <a:rPr lang="en-US" dirty="0" smtClean="0"/>
-              <a:t>Simulator</a:t>
+              <a:t>City Simulator</a:t>
             </a:r>
             <a:endParaRPr lang="en-US" dirty="0"/>
           </a:p>
@@ -6528,6 +6565,32 @@
               <a:t>Person State Machine</a:t>
             </a:r>
             <a:endParaRPr lang="en-US" sz="3600" b="1" dirty="0"/>
+          </a:p>
+        </p:txBody>
+      </p:sp>
+      <p:sp>
+        <p:nvSpPr>
+          <p:cNvPr id="4" name="TextBox 3"/>
+          <p:cNvSpPr txBox="1"/>
+          <p:nvPr/>
+        </p:nvSpPr>
+        <p:spPr>
+          <a:xfrm>
+            <a:off x="5321978" y="9474371"/>
+            <a:ext cx="184666" cy="1415772"/>
+          </a:xfrm>
+          <a:prstGeom prst="rect">
+            <a:avLst/>
+          </a:prstGeom>
+          <a:noFill/>
+        </p:spPr>
+        <p:txBody>
+          <a:bodyPr wrap="none" rtlCol="0">
+            <a:spAutoFit/>
+          </a:bodyPr>
+          <a:lstStyle/>
+          <a:p>
+            <a:endParaRPr lang="en-US" dirty="0"/>
           </a:p>
         </p:txBody>
       </p:sp>

</xml_diff>

<commit_message>
Fix residences headline in poster.
</commit_message>
<xml_diff>
--- a/Poster.pptx
+++ b/Poster.pptx
@@ -109,7 +109,7 @@
   </p:defaultTextStyle>
   <p:extLst>
     <p:ext uri="{EFAFB233-063F-42B5-8137-9DF3F51BA10A}">
-      <p15:sldGuideLst xmlns="" xmlns:p15="http://schemas.microsoft.com/office/powerpoint/2012/main">
+      <p15:sldGuideLst xmlns:p15="http://schemas.microsoft.com/office/powerpoint/2012/main" xmlns="">
         <p15:guide id="1" orient="horz" pos="3318">
           <p15:clr>
             <a:srgbClr val="A4A3A4"/>
@@ -163,7 +163,7 @@
       </p15:sldGuideLst>
     </p:ext>
     <p:ext uri="{2D200454-40CA-4A62-9FC3-DE9A4176ACB9}">
-      <p15:notesGuideLst xmlns="" xmlns:p15="http://schemas.microsoft.com/office/powerpoint/2012/main">
+      <p15:notesGuideLst xmlns:p15="http://schemas.microsoft.com/office/powerpoint/2012/main" xmlns="">
         <p15:guide id="1" orient="horz" pos="13681">
           <p15:clr>
             <a:srgbClr val="A4A3A4"/>
@@ -453,11 +453,11 @@
           <c:showPercent val="0"/>
           <c:showBubbleSize val="0"/>
         </c:dLbls>
-        <c:axId val="2055767512"/>
-        <c:axId val="2055773112"/>
+        <c:axId val="2067721672"/>
+        <c:axId val="2085089592"/>
       </c:scatterChart>
       <c:valAx>
-        <c:axId val="2055767512"/>
+        <c:axId val="2067721672"/>
         <c:scaling>
           <c:orientation val="minMax"/>
           <c:max val="30.0"/>
@@ -498,12 +498,12 @@
             <a:endParaRPr lang="en-US"/>
           </a:p>
         </c:txPr>
-        <c:crossAx val="2055773112"/>
+        <c:crossAx val="2085089592"/>
         <c:crosses val="autoZero"/>
         <c:crossBetween val="midCat"/>
       </c:valAx>
       <c:valAx>
-        <c:axId val="2055773112"/>
+        <c:axId val="2085089592"/>
         <c:scaling>
           <c:orientation val="minMax"/>
         </c:scaling>
@@ -524,7 +524,7 @@
             <a:endParaRPr lang="en-US"/>
           </a:p>
         </c:txPr>
-        <c:crossAx val="2055767512"/>
+        <c:crossAx val="2067721672"/>
         <c:crosses val="autoZero"/>
         <c:crossBetween val="midCat"/>
       </c:valAx>
@@ -803,11 +803,11 @@
           <c:showPercent val="0"/>
           <c:showBubbleSize val="0"/>
         </c:dLbls>
-        <c:axId val="2103467944"/>
-        <c:axId val="2104220360"/>
+        <c:axId val="2066888856"/>
+        <c:axId val="2084883816"/>
       </c:scatterChart>
       <c:valAx>
-        <c:axId val="2103467944"/>
+        <c:axId val="2066888856"/>
         <c:scaling>
           <c:orientation val="minMax"/>
           <c:max val="24.0"/>
@@ -848,13 +848,13 @@
             <a:endParaRPr lang="en-US"/>
           </a:p>
         </c:txPr>
-        <c:crossAx val="2104220360"/>
+        <c:crossAx val="2084883816"/>
         <c:crosses val="autoZero"/>
         <c:crossBetween val="midCat"/>
         <c:majorUnit val="4.0"/>
       </c:valAx>
       <c:valAx>
-        <c:axId val="2104220360"/>
+        <c:axId val="2084883816"/>
         <c:scaling>
           <c:orientation val="minMax"/>
         </c:scaling>
@@ -875,7 +875,7 @@
             <a:endParaRPr lang="en-US"/>
           </a:p>
         </c:txPr>
-        <c:crossAx val="2103467944"/>
+        <c:crossAx val="2066888856"/>
         <c:crosses val="autoZero"/>
         <c:crossBetween val="midCat"/>
       </c:valAx>
@@ -3917,7 +3917,7 @@
               <a:graphicData uri="http://schemas.openxmlformats.org/presentationml/2006/ole">
                 <mc:AlternateContent xmlns:mc="http://schemas.openxmlformats.org/markup-compatibility/2006">
                   <mc:Choice xmlns:v="urn:schemas-microsoft-com:vml" Requires="v">
-                    <p:oleObj spid="_x0000_s1294" name="Image" r:id="rId8" imgW="1828440" imgH="1117440" progId="Photoshop.Image.13">
+                    <p:oleObj spid="_x0000_s1303" name="Image" r:id="rId8" imgW="1828440" imgH="1117440" progId="Photoshop.Image.13">
                       <p:embed/>
                     </p:oleObj>
                   </mc:Choice>
@@ -3974,7 +3974,7 @@
               <a:graphicData uri="http://schemas.openxmlformats.org/presentationml/2006/ole">
                 <mc:AlternateContent xmlns:mc="http://schemas.openxmlformats.org/markup-compatibility/2006">
                   <mc:Choice xmlns:v="urn:schemas-microsoft-com:vml" Requires="v">
-                    <p:oleObj spid="_x0000_s1295" name="Image" r:id="rId10" imgW="1828440" imgH="1117440" progId="Photoshop.Image.13">
+                    <p:oleObj spid="_x0000_s1304" name="Image" r:id="rId10" imgW="1828440" imgH="1117440" progId="Photoshop.Image.13">
                       <p:embed/>
                     </p:oleObj>
                   </mc:Choice>
@@ -5102,7 +5102,7 @@
             <a:graphicData uri="http://schemas.openxmlformats.org/presentationml/2006/ole">
               <mc:AlternateContent xmlns:mc="http://schemas.openxmlformats.org/markup-compatibility/2006">
                 <mc:Choice xmlns:v="urn:schemas-microsoft-com:vml" Requires="v">
-                  <p:oleObj spid="_x0000_s1296" name="Image" r:id="rId12" imgW="4571280" imgH="1688760" progId="Photoshop.Image.13">
+                  <p:oleObj spid="_x0000_s1305" name="Image" r:id="rId12" imgW="4571280" imgH="1688760" progId="Photoshop.Image.13">
                     <p:embed/>
                   </p:oleObj>
                 </mc:Choice>
@@ -5186,7 +5186,7 @@
             <a:graphicData uri="http://schemas.openxmlformats.org/presentationml/2006/ole">
               <mc:AlternateContent xmlns:mc="http://schemas.openxmlformats.org/markup-compatibility/2006">
                 <mc:Choice xmlns:v="urn:schemas-microsoft-com:vml" Requires="v">
-                  <p:oleObj spid="_x0000_s1297" name="Image" r:id="rId15" imgW="1574280" imgH="1053720" progId="Photoshop.Image.13">
+                  <p:oleObj spid="_x0000_s1306" name="Image" r:id="rId15" imgW="1574280" imgH="1053720" progId="Photoshop.Image.13">
                     <p:embed/>
                   </p:oleObj>
                 </mc:Choice>
@@ -5893,13 +5893,8 @@
             </a:r>
             <a:r>
               <a:rPr lang="en-US" dirty="0" smtClean="0"/>
-              <a:t>prosperity</a:t>
-            </a:r>
-            <a:r>
-              <a:rPr lang="en-US" dirty="0" smtClean="0"/>
-              <a:t>.</a:t>
-            </a:r>
-            <a:endParaRPr lang="en-US" dirty="0" smtClean="0"/>
+              <a:t>prosperity.</a:t>
+            </a:r>
           </a:p>
           <a:p>
             <a:pPr>
@@ -5917,47 +5912,7 @@
             </a:pPr>
             <a:r>
               <a:rPr lang="en-US" dirty="0" smtClean="0"/>
-              <a:t>The city simulation includes a dynamic population, residences, businesses, and entertainment </a:t>
-            </a:r>
-            <a:r>
-              <a:rPr lang="en-US" dirty="0" smtClean="0"/>
-              <a:t>venues. As people interact with the world, </a:t>
-            </a:r>
-            <a:r>
-              <a:rPr lang="en-US" dirty="0" smtClean="0"/>
-              <a:t>each component of world changes. </a:t>
-            </a:r>
-            <a:r>
-              <a:rPr lang="en-US" dirty="0" smtClean="0"/>
-              <a:t>People’s </a:t>
-            </a:r>
-            <a:r>
-              <a:rPr lang="en-US" dirty="0" smtClean="0"/>
-              <a:t>skills and ambitions determine </a:t>
-            </a:r>
-            <a:r>
-              <a:rPr lang="en-US" dirty="0" smtClean="0"/>
-              <a:t>how their actions and outcome of model, such as the </a:t>
-            </a:r>
-            <a:r>
-              <a:rPr lang="en-US" dirty="0" smtClean="0"/>
-              <a:t>success of </a:t>
-            </a:r>
-            <a:r>
-              <a:rPr lang="en-US" dirty="0" smtClean="0"/>
-              <a:t>businesses</a:t>
-            </a:r>
-            <a:r>
-              <a:rPr lang="en-US" dirty="0" smtClean="0"/>
-              <a:t>.  In turn, </a:t>
-            </a:r>
-            <a:r>
-              <a:rPr lang="en-US" dirty="0" smtClean="0"/>
-              <a:t>businesses </a:t>
-            </a:r>
-            <a:r>
-              <a:rPr lang="en-US" dirty="0" smtClean="0"/>
-              <a:t>can expand or contract based on how hard their workers work</a:t>
+              <a:t>The city simulation includes a dynamic population, residences, businesses, and entertainment venues. As people interact with the world, each component of world changes. People’s skills and ambitions determine how their actions and outcome of model, such as the success of businesses.  In turn, businesses can expand or contract based on how hard their workers work</a:t>
             </a:r>
             <a:r>
               <a:rPr lang="en-US" dirty="0"/>
@@ -6063,19 +6018,7 @@
           <a:p>
             <a:r>
               <a:rPr lang="en-US" sz="2400" dirty="0" smtClean="0"/>
-              <a:t>The simulation is an agent-based discrete-event simulator. Every hour, the simulator notifies all the entities (people and businesses) that time has passed, and the individuals and </a:t>
-            </a:r>
-            <a:r>
-              <a:rPr lang="en-US" sz="2400" dirty="0" smtClean="0"/>
-              <a:t>the other parts of the model update </a:t>
-            </a:r>
-            <a:r>
-              <a:rPr lang="en-US" sz="2400" dirty="0" smtClean="0"/>
-              <a:t>their properties</a:t>
-            </a:r>
-            <a:r>
-              <a:rPr lang="en-US" sz="2400" dirty="0" smtClean="0"/>
-              <a:t>.</a:t>
+              <a:t>The simulation is an agent-based discrete-event simulator. Every hour, the simulator notifies all the entities (people and businesses) that time has passed, and the individuals and the other parts of the model update their properties.</a:t>
             </a:r>
           </a:p>
           <a:p>
@@ -6090,22 +6033,13 @@
           <a:p>
             <a:r>
               <a:rPr lang="en-US" sz="2400" dirty="0" smtClean="0"/>
-              <a:t>The people represent the agents in our simulation. Every day people have unique experiences; however, they always follow the circle of life</a:t>
-            </a:r>
+              <a:t>The people represent the agents in our simulation. Every day people have unique experiences; however, they always follow the circle of life.</a:t>
+            </a:r>
+          </a:p>
+          <a:p>
             <a:r>
               <a:rPr lang="en-US" sz="2400" dirty="0" smtClean="0"/>
-              <a:t>.</a:t>
-            </a:r>
-            <a:endParaRPr lang="en-US" sz="2400" dirty="0" smtClean="0"/>
-          </a:p>
-          <a:p>
-            <a:r>
-              <a:rPr lang="en-US" sz="2400" dirty="0" smtClean="0"/>
-              <a:t>In our simulation, the circle of life is simplified to sleep, eat, work, and shop. People sleep at night, eat in the morning and afternoon, work during the day, and shop in the evening. People can choose to eat at home or at any of the restaurants in the city. In our simulation, shopping refers to all forms of entertainment, which include malls, movies, bars, and night clubs</a:t>
-            </a:r>
-            <a:r>
-              <a:rPr lang="en-US" sz="2400" dirty="0" smtClean="0"/>
-              <a:t>.</a:t>
+              <a:t>In our simulation, the circle of life is simplified to sleep, eat, work, and shop. People sleep at night, eat in the morning and afternoon, work during the day, and shop in the evening. People can choose to eat at home or at any of the restaurants in the city. In our simulation, shopping refers to all forms of entertainment, which include malls, movies, bars, and night clubs.</a:t>
             </a:r>
           </a:p>
           <a:p>
@@ -6158,7 +6092,6 @@
               <a:rPr lang="en-US" sz="2400" dirty="0" smtClean="0"/>
               <a:t>and tech.  The quality and wage of the work depends on these types.  </a:t>
             </a:r>
-            <a:endParaRPr lang="en-US" sz="2400" dirty="0" smtClean="0"/>
           </a:p>
           <a:p>
             <a:endParaRPr lang="en-US" sz="2400" dirty="0" smtClean="0"/>
@@ -6707,10 +6640,16 @@
               </a:spcBef>
             </a:pPr>
             <a:r>
-              <a:rPr lang="en-US" sz="2400" b="1" dirty="0" smtClean="0"/>
-              <a:t>Businesses</a:t>
-            </a:r>
-            <a:endParaRPr lang="en-US" sz="2400" b="1" dirty="0"/>
+              <a:rPr lang="en-US" sz="2400" b="1" smtClean="0">
+                <a:latin typeface="Trebuchet MS"/>
+                <a:cs typeface="Trebuchet MS"/>
+              </a:rPr>
+              <a:t>Residences</a:t>
+            </a:r>
+            <a:endParaRPr lang="en-US" sz="2400" b="1" dirty="0">
+              <a:latin typeface="Trebuchet MS"/>
+              <a:cs typeface="Trebuchet MS"/>
+            </a:endParaRPr>
           </a:p>
           <a:p>
             <a:pPr>
@@ -6719,7 +6658,10 @@
               </a:spcBef>
             </a:pPr>
             <a:r>
-              <a:rPr lang="en-US" sz="2400" dirty="0" smtClean="0"/>
+              <a:rPr lang="en-US" sz="2400" dirty="0" smtClean="0">
+                <a:latin typeface="Trebuchet MS"/>
+                <a:cs typeface="Trebuchet MS"/>
+              </a:rPr>
               <a:t>Residences provide individuals with shelter and serve as the launching point for the days activity.  In this model, the worth of a residence depends on its quality and proximity to high quality businesses.  Residents must pay a mortgage payment based on the net-worth of the property.  If an individual fails to pay the mortgage, they are kicked out of their home until they can repay their debt.  </a:t>
             </a:r>
           </a:p>

</xml_diff>

<commit_message>
Poster almost finished.  Just one more graph is needed
</commit_message>
<xml_diff>
--- a/Poster.pptx
+++ b/Poster.pptx
@@ -4117,7 +4117,7 @@
               <a:graphicData uri="http://schemas.openxmlformats.org/presentationml/2006/ole">
                 <mc:AlternateContent xmlns:mc="http://schemas.openxmlformats.org/markup-compatibility/2006">
                   <mc:Choice xmlns:v="urn:schemas-microsoft-com:vml" Requires="v">
-                    <p:oleObj spid="_x0000_s1306" name="Image" r:id="rId8" imgW="1828440" imgH="1117440" progId="Photoshop.Image.13">
+                    <p:oleObj spid="_x0000_s1434" name="Image" r:id="rId8" imgW="1828440" imgH="1117440" progId="Photoshop.Image.13">
                       <p:embed/>
                     </p:oleObj>
                   </mc:Choice>
@@ -4174,7 +4174,7 @@
               <a:graphicData uri="http://schemas.openxmlformats.org/presentationml/2006/ole">
                 <mc:AlternateContent xmlns:mc="http://schemas.openxmlformats.org/markup-compatibility/2006">
                   <mc:Choice xmlns:v="urn:schemas-microsoft-com:vml" Requires="v">
-                    <p:oleObj spid="_x0000_s1307" name="Image" r:id="rId10" imgW="1828440" imgH="1117440" progId="Photoshop.Image.13">
+                    <p:oleObj spid="_x0000_s1435" name="Image" r:id="rId10" imgW="1828440" imgH="1117440" progId="Photoshop.Image.13">
                       <p:embed/>
                     </p:oleObj>
                   </mc:Choice>
@@ -5302,7 +5302,7 @@
             <a:graphicData uri="http://schemas.openxmlformats.org/presentationml/2006/ole">
               <mc:AlternateContent xmlns:mc="http://schemas.openxmlformats.org/markup-compatibility/2006">
                 <mc:Choice xmlns:v="urn:schemas-microsoft-com:vml" Requires="v">
-                  <p:oleObj spid="_x0000_s1308" name="Image" r:id="rId12" imgW="4571280" imgH="1688760" progId="Photoshop.Image.13">
+                  <p:oleObj spid="_x0000_s1436" name="Image" r:id="rId12" imgW="4571280" imgH="1688760" progId="Photoshop.Image.13">
                     <p:embed/>
                   </p:oleObj>
                 </mc:Choice>
@@ -5386,7 +5386,7 @@
             <a:graphicData uri="http://schemas.openxmlformats.org/presentationml/2006/ole">
               <mc:AlternateContent xmlns:mc="http://schemas.openxmlformats.org/markup-compatibility/2006">
                 <mc:Choice xmlns:v="urn:schemas-microsoft-com:vml" Requires="v">
-                  <p:oleObj spid="_x0000_s1309" name="Image" r:id="rId15" imgW="1574280" imgH="1053720" progId="Photoshop.Image.13">
+                  <p:oleObj spid="_x0000_s1437" name="Image" r:id="rId15" imgW="1574280" imgH="1053720" progId="Photoshop.Image.13">
                     <p:embed/>
                   </p:oleObj>
                 </mc:Choice>
@@ -6247,7 +6247,7 @@
         <p:spPr>
           <a:xfrm>
             <a:off x="11252201" y="6518316"/>
-            <a:ext cx="10302969" cy="11673352"/>
+            <a:ext cx="10302969" cy="13523680"/>
           </a:xfrm>
         </p:spPr>
         <p:txBody>
@@ -6262,24 +6262,24 @@
           </a:p>
           <a:p>
             <a:r>
-              <a:rPr lang="en-US" sz="2400" dirty="0" smtClean="0"/>
+              <a:rPr lang="en-US" dirty="0" smtClean="0"/>
               <a:t>The simulation is an agent-based discrete-event simulator. Every hour, the simulator notifies all the entities (people and businesses) that time has passed, and the individuals and </a:t>
             </a:r>
             <a:r>
-              <a:rPr lang="en-US" sz="2400" dirty="0" smtClean="0"/>
+              <a:rPr lang="en-US" dirty="0" smtClean="0"/>
               <a:t>the other parts of the model update </a:t>
             </a:r>
             <a:r>
-              <a:rPr lang="en-US" sz="2400" dirty="0" smtClean="0"/>
+              <a:rPr lang="en-US" dirty="0" smtClean="0"/>
               <a:t>their properties</a:t>
             </a:r>
             <a:r>
-              <a:rPr lang="en-US" sz="2400" dirty="0" smtClean="0"/>
+              <a:rPr lang="en-US" dirty="0" smtClean="0"/>
               <a:t>.</a:t>
             </a:r>
           </a:p>
           <a:p>
-            <a:endParaRPr lang="en-US" sz="2400" dirty="0" smtClean="0"/>
+            <a:endParaRPr lang="en-US" dirty="0" smtClean="0"/>
           </a:p>
           <a:p>
             <a:r>
@@ -6289,76 +6289,76 @@
           </a:p>
           <a:p>
             <a:r>
-              <a:rPr lang="en-US" sz="2400" dirty="0" smtClean="0"/>
+              <a:rPr lang="en-US" dirty="0" smtClean="0"/>
               <a:t>The people represent the agents in our simulation. Every day people have unique experiences; however, they always follow the circle of life</a:t>
             </a:r>
             <a:r>
-              <a:rPr lang="en-US" sz="2400" dirty="0" smtClean="0"/>
+              <a:rPr lang="en-US" dirty="0" smtClean="0"/>
               <a:t>.</a:t>
             </a:r>
-            <a:endParaRPr lang="en-US" sz="2400" dirty="0" smtClean="0"/>
-          </a:p>
-          <a:p>
-            <a:r>
-              <a:rPr lang="en-US" sz="2400" dirty="0" smtClean="0"/>
+            <a:endParaRPr lang="en-US" dirty="0" smtClean="0"/>
+          </a:p>
+          <a:p>
+            <a:r>
+              <a:rPr lang="en-US" dirty="0" smtClean="0"/>
               <a:t>In our simulation, the circle of life is simplified to sleep, eat, work, and shop. People sleep at night, eat in the morning and afternoon, work during the day, and shop in the evening. People can choose to eat at home or at any of the restaurants in the city. In our simulation, shopping refers to all forms of entertainment, which include malls, movies, bars, and night clubs</a:t>
             </a:r>
             <a:r>
-              <a:rPr lang="en-US" sz="2400" dirty="0" smtClean="0"/>
+              <a:rPr lang="en-US" dirty="0" smtClean="0"/>
               <a:t>.</a:t>
             </a:r>
           </a:p>
           <a:p>
-            <a:endParaRPr lang="en-US" sz="2400" dirty="0" smtClean="0"/>
-          </a:p>
-          <a:p>
-            <a:r>
-              <a:rPr lang="en-US" sz="2400" b="1" dirty="0"/>
+            <a:endParaRPr lang="en-US" dirty="0" smtClean="0"/>
+          </a:p>
+          <a:p>
+            <a:r>
+              <a:rPr lang="en-US" b="1" dirty="0"/>
               <a:t>Businesses</a:t>
             </a:r>
           </a:p>
           <a:p>
             <a:r>
-              <a:rPr lang="en-US" sz="2400" dirty="0"/>
+              <a:rPr lang="en-US" dirty="0"/>
               <a:t>In our model, </a:t>
             </a:r>
             <a:r>
-              <a:rPr lang="en-US" sz="2400" dirty="0" smtClean="0"/>
+              <a:rPr lang="en-US" dirty="0" smtClean="0"/>
               <a:t>the success of the businesses depends </a:t>
             </a:r>
             <a:r>
-              <a:rPr lang="en-US" sz="2400" dirty="0"/>
+              <a:rPr lang="en-US" dirty="0"/>
               <a:t>on </a:t>
             </a:r>
             <a:r>
-              <a:rPr lang="en-US" sz="2400" dirty="0" smtClean="0"/>
+              <a:rPr lang="en-US" dirty="0" smtClean="0"/>
               <a:t>the </a:t>
             </a:r>
             <a:r>
-              <a:rPr lang="en-US" sz="2400" dirty="0"/>
+              <a:rPr lang="en-US" dirty="0"/>
               <a:t>productivity of </a:t>
             </a:r>
             <a:r>
-              <a:rPr lang="en-US" sz="2400" dirty="0" smtClean="0"/>
+              <a:rPr lang="en-US" dirty="0" smtClean="0"/>
               <a:t>its workers. The productivity of the workforce depends on several factors, namely the ambition, skill, and general well being of the individuals.  Every five days, companies review their overall productivity and decide whether to expand or decline.  In the case when they expand, the net-worth of the company along with its pay and  number of employees increase.  They also make the decide whether to hire or fire employees based on their current workforce and those currently seeking a job.  There are four different types of businesses</a:t>
             </a:r>
             <a:r>
-              <a:rPr lang="en-US" sz="2400" dirty="0"/>
+              <a:rPr lang="en-US" dirty="0"/>
               <a:t>: sales, manufacturing, research</a:t>
             </a:r>
             <a:r>
-              <a:rPr lang="en-US" sz="2400" dirty="0" smtClean="0"/>
+              <a:rPr lang="en-US" dirty="0" smtClean="0"/>
               <a:t>, finance</a:t>
             </a:r>
             <a:r>
-              <a:rPr lang="en-US" sz="2400" dirty="0"/>
+              <a:rPr lang="en-US" dirty="0"/>
               <a:t>, </a:t>
             </a:r>
             <a:r>
-              <a:rPr lang="en-US" sz="2400" dirty="0" smtClean="0"/>
+              <a:rPr lang="en-US" dirty="0" smtClean="0"/>
               <a:t>and tech.  The quality and wage of the work depends on these types.  </a:t>
             </a:r>
-            <a:endParaRPr lang="en-US" sz="2400" dirty="0" smtClean="0"/>
+            <a:endParaRPr lang="en-US" dirty="0" smtClean="0"/>
           </a:p>
           <a:p>
             <a:endParaRPr lang="en-US" sz="2400" dirty="0" smtClean="0"/>
@@ -6403,8 +6403,8 @@
         </p:nvSpPr>
         <p:spPr>
           <a:xfrm>
-            <a:off x="11224245" y="18397865"/>
-            <a:ext cx="21421724" cy="754045"/>
+            <a:off x="11224245" y="18176266"/>
+            <a:ext cx="21421724" cy="1197243"/>
           </a:xfrm>
         </p:spPr>
         <p:txBody>
@@ -6415,7 +6415,13 @@
               <a:rPr lang="en-US" dirty="0" smtClean="0"/>
               <a:t>RESULTS</a:t>
             </a:r>
-            <a:endParaRPr lang="en-US" dirty="0"/>
+          </a:p>
+          <a:p>
+            <a:r>
+              <a:rPr lang="en-US" sz="2400" b="0" u="none" dirty="0" smtClean="0"/>
+              <a:t>The following results were gathered under optimal conditions</a:t>
+            </a:r>
+            <a:endParaRPr lang="en-US" sz="2400" b="0" u="none" dirty="0"/>
           </a:p>
         </p:txBody>
       </p:sp>
@@ -6434,6 +6440,10 @@
           <a:bodyPr/>
           <a:lstStyle/>
           <a:p>
+            <a:r>
+              <a:rPr lang="en-US" dirty="0" smtClean="0"/>
+              <a:t>DISCUSSION &amp; OUTLOOK</a:t>
+            </a:r>
             <a:endParaRPr lang="en-US" dirty="0"/>
           </a:p>
         </p:txBody>
@@ -6451,7 +6461,7 @@
         <p:spPr>
           <a:xfrm>
             <a:off x="33185099" y="6021370"/>
-            <a:ext cx="10201275" cy="2231358"/>
+            <a:ext cx="10201275" cy="15927415"/>
           </a:xfrm>
         </p:spPr>
         <p:txBody>
@@ -6460,25 +6470,58 @@
           <a:p>
             <a:r>
               <a:rPr lang="en-US" dirty="0" smtClean="0"/>
-              <a:t>Discuss trends in the data here. </a:t>
-            </a:r>
-          </a:p>
-          <a:p>
+              <a:t>We chose to show </a:t>
+            </a:r>
             <a:r>
               <a:rPr lang="en-US" dirty="0" smtClean="0"/>
-              <a:t>How do they fit in with reality and how we set up the model itself</a:t>
-            </a:r>
-          </a:p>
-          <a:p>
+              <a:t>some general highlights of model in the graphs below.  </a:t>
+            </a:r>
             <a:r>
               <a:rPr lang="en-US" dirty="0" smtClean="0"/>
-              <a:t>Discuss further modifications to make simulator more realistic</a:t>
-            </a:r>
-          </a:p>
-          <a:p>
+              <a:t>The trends we see make sense both in terms of the model but also reality itself.  In our model, peopl</a:t>
+            </a:r>
             <a:r>
               <a:rPr lang="en-US" dirty="0" smtClean="0"/>
-              <a:t>Without lose of generality, how would this influence policy makers</a:t>
+              <a:t>e are paid by their place of work around midday, and they spend money on shopping during the morning and evening.  The average money owned by an individual throughout 24 hours reflects this. Further, the average amount of money owned by individuals does ultimately increase over a month, though there is some noise in the process.  Considering the random nature of the transitions, it makes sense that we would see certain dips in money, but given the companies grew over this period, as pictured below, </a:t>
+            </a:r>
+            <a:r>
+              <a:rPr lang="en-US" dirty="0" err="1" smtClean="0"/>
+              <a:t>ot</a:t>
+            </a:r>
+            <a:r>
+              <a:rPr lang="en-US" dirty="0" smtClean="0"/>
+              <a:t> makes sense that the individuals ultimately became richer.  </a:t>
+            </a:r>
+          </a:p>
+          <a:p>
+            <a:endParaRPr lang="en-US" dirty="0"/>
+          </a:p>
+          <a:p>
+            <a:r>
+              <a:rPr lang="en-US" dirty="0" smtClean="0"/>
+              <a:t>The graph showing the steady rise in business productivity was shown given a reasonable ratio of businesses to people.  When only a few companies exist, only the skilled individuals do well.  The rest suffer as they can’t find a place of good work. </a:t>
+            </a:r>
+          </a:p>
+          <a:p>
+            <a:endParaRPr lang="en-US" dirty="0"/>
+          </a:p>
+          <a:p>
+            <a:r>
+              <a:rPr lang="en-US" dirty="0" smtClean="0"/>
+              <a:t>Another set of experiments showed the number of deaths versus the number of children.  We see that the number of children born outweighs the number of people who die in the long term.  Given that people make money over the course of the month while businesses expand, it follows that their happiness increases.  </a:t>
+            </a:r>
+            <a:r>
+              <a:rPr lang="en-US" dirty="0" smtClean="0"/>
+              <a:t>Given that the chance of producing a child depends on the good health of a person, it follows that many children would be born.  On the other hand, because few are exceptionally poor and destitute, only a few die as the simulation proceeds.  </a:t>
+            </a:r>
+          </a:p>
+          <a:p>
+            <a:endParaRPr lang="en-US" dirty="0"/>
+          </a:p>
+          <a:p>
+            <a:r>
+              <a:rPr lang="en-US" dirty="0" smtClean="0"/>
+              <a:t>Overall, this model only broke the surface in terms of modeling the complex dynamics of a city.  Several things could be done to expand the model.  Namely, the dynamics of businesses and entertainment stores could be improved by creating a market that other businesses and consumers would be apart of.  This would better model how people and businesses actually operate.  The residence model could also be expanded by allowing individuals to renovate their home or buy a new one altogether.  The needs of individuals could also be made more robust, and the spending models could be refined by tying their actions even more closely to their basic needs.  </a:t>
             </a:r>
             <a:endParaRPr lang="en-US" dirty="0"/>
           </a:p>
@@ -6494,12 +6537,21 @@
             <p:ph type="body" sz="quarter" idx="27"/>
           </p:nvPr>
         </p:nvSpPr>
-        <p:spPr/>
+        <p:spPr>
+          <a:xfrm>
+            <a:off x="33185095" y="22130124"/>
+            <a:ext cx="10201275" cy="754045"/>
+          </a:xfrm>
+        </p:spPr>
         <p:txBody>
           <a:bodyPr/>
           <a:lstStyle/>
           <a:p>
-            <a:endParaRPr lang="en-US"/>
+            <a:r>
+              <a:rPr lang="en-US" dirty="0" smtClean="0"/>
+              <a:t>REFERENCES</a:t>
+            </a:r>
+            <a:endParaRPr lang="en-US" dirty="0"/>
           </a:p>
         </p:txBody>
       </p:sp>
@@ -6515,8 +6567,8 @@
         </p:nvSpPr>
         <p:spPr>
           <a:xfrm>
-            <a:off x="33185097" y="15011402"/>
-            <a:ext cx="10201275" cy="1308028"/>
+            <a:off x="33185095" y="23558515"/>
+            <a:ext cx="10201275" cy="4154961"/>
           </a:xfrm>
         </p:spPr>
         <p:txBody>
@@ -6524,24 +6576,83 @@
           <a:lstStyle/>
           <a:p>
             <a:r>
+              <a:rPr lang="en-US" dirty="0" err="1" smtClean="0"/>
+              <a:t>Itzak</a:t>
+            </a:r>
+            <a:r>
               <a:rPr lang="en-US" dirty="0" smtClean="0"/>
-              <a:t>Just post the people we mentioned in the original conceptual mode</a:t>
-            </a:r>
-          </a:p>
-          <a:p>
+              <a:t>, </a:t>
+            </a:r>
+            <a:r>
+              <a:rPr lang="en-US" dirty="0" err="1" smtClean="0"/>
+              <a:t>Benenson</a:t>
+            </a:r>
             <a:r>
               <a:rPr lang="en-US" dirty="0" smtClean="0"/>
-              <a:t>And reference our own </a:t>
+              <a:t>.  “</a:t>
+            </a:r>
+            <a:r>
+              <a:rPr lang="en-US" b="1" dirty="0"/>
+              <a:t>Multi-agent simulations of residential dynamics in the </a:t>
+            </a:r>
+            <a:r>
+              <a:rPr lang="en-US" b="1" dirty="0" smtClean="0"/>
+              <a:t>city.</a:t>
+            </a:r>
+            <a:r>
+              <a:rPr lang="en-US" dirty="0"/>
+              <a:t>” Department of Geography, University of Tel-Aviv, Tel-Aviv, Ramat-Aviv, 69978, </a:t>
+            </a:r>
+            <a:r>
+              <a:rPr lang="en-US" dirty="0" smtClean="0"/>
+              <a:t>Israel. Computers Environment and Urban Systems (</a:t>
+            </a:r>
+            <a:r>
+              <a:rPr lang="en-US" dirty="0"/>
+              <a:t>Impact Factor: 1.79). 04/1998; 22(1):25-42. DOI: 10.1016/S0198-9715(98)00017-9 </a:t>
+            </a:r>
+            <a:endParaRPr lang="en-US" dirty="0" smtClean="0"/>
+          </a:p>
+          <a:p>
+            <a:endParaRPr lang="en-US" b="1" dirty="0" smtClean="0"/>
+          </a:p>
+          <a:p>
+            <a:r>
+              <a:rPr lang="en-US" dirty="0" smtClean="0"/>
+              <a:t>Moore, </a:t>
             </a:r>
             <a:r>
               <a:rPr lang="en-US" dirty="0" err="1" smtClean="0"/>
-              <a:t>cocneptual</a:t>
+              <a:t>Blanes</a:t>
             </a:r>
             <a:r>
               <a:rPr lang="en-US" dirty="0" smtClean="0"/>
-              <a:t> model just to be fancy</a:t>
+              <a:t>, </a:t>
+            </a:r>
+            <a:r>
+              <a:rPr lang="en-US" dirty="0" err="1" smtClean="0"/>
+              <a:t>Hamadeh</a:t>
+            </a:r>
+            <a:r>
+              <a:rPr lang="en-US" b="1" dirty="0" smtClean="0"/>
+              <a:t>.  Conceptual Model. </a:t>
+            </a:r>
+            <a:r>
+              <a:rPr lang="en-US" dirty="0" smtClean="0"/>
+              <a:t>Computer Simulation (CX </a:t>
+            </a:r>
+            <a:r>
+              <a:rPr lang="en-US" smtClean="0"/>
+              <a:t>4230), 2015</a:t>
+            </a:r>
+            <a:r>
+              <a:rPr lang="en-US" dirty="0" smtClean="0"/>
+              <a:t>.  </a:t>
             </a:r>
             <a:endParaRPr lang="en-US" dirty="0"/>
+          </a:p>
+          <a:p>
+            <a:endParaRPr lang="en-US" b="1" dirty="0"/>
           </a:p>
         </p:txBody>
       </p:sp>
@@ -6555,11 +6666,20 @@
             <p:ph type="body" sz="quarter" idx="29"/>
           </p:nvPr>
         </p:nvSpPr>
-        <p:spPr/>
+        <p:spPr>
+          <a:xfrm>
+            <a:off x="33185095" y="26932462"/>
+            <a:ext cx="10201275" cy="754045"/>
+          </a:xfrm>
+        </p:spPr>
         <p:txBody>
           <a:bodyPr/>
           <a:lstStyle/>
           <a:p>
+            <a:r>
+              <a:rPr lang="en-US" dirty="0" smtClean="0"/>
+              <a:t>ACKNOWLEDGEMENTS</a:t>
+            </a:r>
             <a:endParaRPr lang="en-US" dirty="0"/>
           </a:p>
         </p:txBody>
@@ -6574,22 +6694,19 @@
             <p:ph type="body" sz="quarter" idx="30"/>
           </p:nvPr>
         </p:nvSpPr>
-        <p:spPr/>
+        <p:spPr>
+          <a:xfrm>
+            <a:off x="33185095" y="27865052"/>
+            <a:ext cx="10201275" cy="846363"/>
+          </a:xfrm>
+        </p:spPr>
         <p:txBody>
           <a:bodyPr/>
           <a:lstStyle/>
           <a:p>
             <a:r>
               <a:rPr lang="en-US" dirty="0" smtClean="0"/>
-              <a:t>Shout out to Dr. Vuduc for </a:t>
-            </a:r>
-            <a:r>
-              <a:rPr lang="en-US" smtClean="0"/>
-              <a:t>a chill </a:t>
-            </a:r>
-            <a:r>
-              <a:rPr lang="en-US" dirty="0" smtClean="0"/>
-              <a:t>class </a:t>
+              <a:t>Thanks to Dr. Vuduc for a great class.  </a:t>
             </a:r>
             <a:endParaRPr lang="en-US" dirty="0"/>
           </a:p>
@@ -6663,30 +6780,34 @@
           <a:p>
             <a:r>
               <a:rPr lang="en-US" dirty="0" smtClean="0"/>
-              <a:t>Ralph </a:t>
-            </a:r>
-            <a:r>
-              <a:rPr lang="en-US" dirty="0" err="1" smtClean="0"/>
-              <a:t>Blanes</a:t>
-            </a:r>
-            <a:r>
-              <a:rPr lang="en-US" dirty="0" smtClean="0"/>
-              <a:t>,</a:t>
+              <a:t>Lawrence </a:t>
             </a:r>
             <a:r>
               <a:rPr lang="en-US" dirty="0"/>
-              <a:t> Lawrence Moore</a:t>
+              <a:t>Moore</a:t>
             </a:r>
             <a:r>
               <a:rPr lang="en-US" dirty="0" smtClean="0"/>
               <a:t>, </a:t>
             </a:r>
             <a:r>
-              <a:rPr lang="en-US" dirty="0" err="1" smtClean="0"/>
+              <a:rPr lang="en-US" dirty="0"/>
+              <a:t>Ralph </a:t>
+            </a:r>
+            <a:r>
+              <a:rPr lang="en-US" dirty="0" err="1"/>
+              <a:t>Blanes</a:t>
+            </a:r>
+            <a:r>
+              <a:rPr lang="en-US" dirty="0"/>
+              <a:t>, </a:t>
+            </a:r>
+            <a:r>
+              <a:rPr lang="en-US" dirty="0" err="1"/>
               <a:t>Saleh</a:t>
             </a:r>
             <a:r>
-              <a:rPr lang="en-US" dirty="0" smtClean="0"/>
+              <a:rPr lang="en-US" dirty="0"/>
               <a:t> </a:t>
             </a:r>
             <a:r>
@@ -6778,14 +6899,14 @@
           <p:nvPr>
             <p:extLst>
               <p:ext uri="{D42A27DB-BD31-4B8C-83A1-F6EECF244321}">
-                <p14:modId xmlns:p14="http://schemas.microsoft.com/office/powerpoint/2010/main" val="3459216744"/>
+                <p14:modId xmlns:p14="http://schemas.microsoft.com/office/powerpoint/2010/main" val="4177211643"/>
               </p:ext>
             </p:extLst>
           </p:nvPr>
         </p:nvGraphicFramePr>
         <p:xfrm>
-          <a:off x="22372566" y="25679401"/>
-          <a:ext cx="8992762" cy="5856297"/>
+          <a:off x="21878428" y="25679401"/>
+          <a:ext cx="10248386" cy="6014862"/>
         </p:xfrm>
         <a:graphic>
           <a:graphicData uri="http://schemas.openxmlformats.org/drawingml/2006/chart">

</xml_diff>

<commit_message>
Poster complete.  Proof reading ahead
</commit_message>
<xml_diff>
--- a/Poster.pptx
+++ b/Poster.pptx
@@ -1108,6 +1108,660 @@
         <a:srgbClr val="2C556E"/>
       </a:solidFill>
     </a:ln>
+  </c:spPr>
+  <c:externalData r:id="rId1">
+    <c:autoUpdate val="0"/>
+  </c:externalData>
+</c:chartSpace>
+</file>
+
+<file path=ppt/charts/chart4.xml><?xml version="1.0" encoding="utf-8"?>
+<c:chartSpace xmlns:c="http://schemas.openxmlformats.org/drawingml/2006/chart" xmlns:a="http://schemas.openxmlformats.org/drawingml/2006/main" xmlns:r="http://schemas.openxmlformats.org/officeDocument/2006/relationships">
+  <c:date1904 val="0"/>
+  <c:lang val="en-US"/>
+  <c:roundedCorners val="0"/>
+  <mc:AlternateContent xmlns:mc="http://schemas.openxmlformats.org/markup-compatibility/2006">
+    <mc:Choice xmlns:c14="http://schemas.microsoft.com/office/drawing/2007/8/2/chart" Requires="c14">
+      <c14:style val="118"/>
+    </mc:Choice>
+    <mc:Fallback>
+      <c:style val="18"/>
+    </mc:Fallback>
+  </mc:AlternateContent>
+  <c:chart>
+    <c:title>
+      <c:tx>
+        <c:rich>
+          <a:bodyPr/>
+          <a:lstStyle/>
+          <a:p>
+            <a:pPr>
+              <a:defRPr sz="3600"/>
+            </a:pPr>
+            <a:r>
+              <a:rPr lang="en-US" sz="3600"/>
+              <a:t>Number of Births</a:t>
+            </a:r>
+            <a:r>
+              <a:rPr lang="en-US" sz="3600" baseline="0"/>
+              <a:t> and Deaths </a:t>
+            </a:r>
+            <a:endParaRPr lang="en-US" sz="3600"/>
+          </a:p>
+        </c:rich>
+      </c:tx>
+      <c:layout>
+        <c:manualLayout>
+          <c:xMode val="edge"/>
+          <c:yMode val="edge"/>
+          <c:x val="0.189587270341207"/>
+          <c:y val="0.0185185185185185"/>
+        </c:manualLayout>
+      </c:layout>
+      <c:overlay val="0"/>
+    </c:title>
+    <c:autoTitleDeleted val="0"/>
+    <c:plotArea>
+      <c:layout>
+        <c:manualLayout>
+          <c:layoutTarget val="inner"/>
+          <c:xMode val="edge"/>
+          <c:yMode val="edge"/>
+          <c:x val="0.101316710411199"/>
+          <c:y val="0.164814814814815"/>
+          <c:w val="0.657484470691163"/>
+          <c:h val="0.728703703703704"/>
+        </c:manualLayout>
+      </c:layout>
+      <c:scatterChart>
+        <c:scatterStyle val="smoothMarker"/>
+        <c:varyColors val="0"/>
+        <c:ser>
+          <c:idx val="0"/>
+          <c:order val="0"/>
+          <c:tx>
+            <c:v>Deaths</c:v>
+          </c:tx>
+          <c:marker>
+            <c:symbol val="none"/>
+          </c:marker>
+          <c:xVal>
+            <c:numRef>
+              <c:f>Sheet1!$A$7:$A$36</c:f>
+              <c:numCache>
+                <c:formatCode>General</c:formatCode>
+                <c:ptCount val="30"/>
+                <c:pt idx="0">
+                  <c:v>1.0</c:v>
+                </c:pt>
+                <c:pt idx="1">
+                  <c:v>2.0</c:v>
+                </c:pt>
+                <c:pt idx="2">
+                  <c:v>3.0</c:v>
+                </c:pt>
+                <c:pt idx="3">
+                  <c:v>4.0</c:v>
+                </c:pt>
+                <c:pt idx="4">
+                  <c:v>5.0</c:v>
+                </c:pt>
+                <c:pt idx="5">
+                  <c:v>6.0</c:v>
+                </c:pt>
+                <c:pt idx="6">
+                  <c:v>7.0</c:v>
+                </c:pt>
+                <c:pt idx="7">
+                  <c:v>8.0</c:v>
+                </c:pt>
+                <c:pt idx="8">
+                  <c:v>9.0</c:v>
+                </c:pt>
+                <c:pt idx="9">
+                  <c:v>10.0</c:v>
+                </c:pt>
+                <c:pt idx="10">
+                  <c:v>11.0</c:v>
+                </c:pt>
+                <c:pt idx="11">
+                  <c:v>12.0</c:v>
+                </c:pt>
+                <c:pt idx="12">
+                  <c:v>13.0</c:v>
+                </c:pt>
+                <c:pt idx="13">
+                  <c:v>14.0</c:v>
+                </c:pt>
+                <c:pt idx="14">
+                  <c:v>15.0</c:v>
+                </c:pt>
+                <c:pt idx="15">
+                  <c:v>16.0</c:v>
+                </c:pt>
+                <c:pt idx="16">
+                  <c:v>17.0</c:v>
+                </c:pt>
+                <c:pt idx="17">
+                  <c:v>18.0</c:v>
+                </c:pt>
+                <c:pt idx="18">
+                  <c:v>19.0</c:v>
+                </c:pt>
+                <c:pt idx="19">
+                  <c:v>20.0</c:v>
+                </c:pt>
+                <c:pt idx="20">
+                  <c:v>21.0</c:v>
+                </c:pt>
+                <c:pt idx="21">
+                  <c:v>22.0</c:v>
+                </c:pt>
+                <c:pt idx="22">
+                  <c:v>23.0</c:v>
+                </c:pt>
+                <c:pt idx="23">
+                  <c:v>24.0</c:v>
+                </c:pt>
+                <c:pt idx="24">
+                  <c:v>25.0</c:v>
+                </c:pt>
+                <c:pt idx="25">
+                  <c:v>26.0</c:v>
+                </c:pt>
+                <c:pt idx="26">
+                  <c:v>27.0</c:v>
+                </c:pt>
+                <c:pt idx="27">
+                  <c:v>28.0</c:v>
+                </c:pt>
+                <c:pt idx="28">
+                  <c:v>29.0</c:v>
+                </c:pt>
+                <c:pt idx="29">
+                  <c:v>30.0</c:v>
+                </c:pt>
+              </c:numCache>
+            </c:numRef>
+          </c:xVal>
+          <c:yVal>
+            <c:numRef>
+              <c:f>Sheet1!$B$7:$B$36</c:f>
+              <c:numCache>
+                <c:formatCode>General</c:formatCode>
+                <c:ptCount val="30"/>
+                <c:pt idx="0">
+                  <c:v>0.0</c:v>
+                </c:pt>
+                <c:pt idx="1">
+                  <c:v>0.0</c:v>
+                </c:pt>
+                <c:pt idx="2">
+                  <c:v>0.0</c:v>
+                </c:pt>
+                <c:pt idx="3">
+                  <c:v>1.0</c:v>
+                </c:pt>
+                <c:pt idx="4">
+                  <c:v>1.0</c:v>
+                </c:pt>
+                <c:pt idx="5">
+                  <c:v>3.0</c:v>
+                </c:pt>
+                <c:pt idx="6">
+                  <c:v>3.0</c:v>
+                </c:pt>
+                <c:pt idx="7">
+                  <c:v>3.0</c:v>
+                </c:pt>
+                <c:pt idx="8">
+                  <c:v>3.0</c:v>
+                </c:pt>
+                <c:pt idx="9">
+                  <c:v>3.0</c:v>
+                </c:pt>
+                <c:pt idx="10">
+                  <c:v>3.0</c:v>
+                </c:pt>
+                <c:pt idx="11">
+                  <c:v>4.0</c:v>
+                </c:pt>
+                <c:pt idx="12">
+                  <c:v>4.0</c:v>
+                </c:pt>
+                <c:pt idx="13">
+                  <c:v>4.0</c:v>
+                </c:pt>
+                <c:pt idx="14">
+                  <c:v>4.0</c:v>
+                </c:pt>
+                <c:pt idx="15">
+                  <c:v>6.0</c:v>
+                </c:pt>
+                <c:pt idx="16">
+                  <c:v>6.0</c:v>
+                </c:pt>
+                <c:pt idx="17">
+                  <c:v>7.0</c:v>
+                </c:pt>
+                <c:pt idx="18">
+                  <c:v>7.0</c:v>
+                </c:pt>
+                <c:pt idx="19">
+                  <c:v>7.0</c:v>
+                </c:pt>
+                <c:pt idx="20">
+                  <c:v>8.0</c:v>
+                </c:pt>
+                <c:pt idx="21">
+                  <c:v>11.0</c:v>
+                </c:pt>
+                <c:pt idx="22">
+                  <c:v>11.0</c:v>
+                </c:pt>
+                <c:pt idx="23">
+                  <c:v>11.0</c:v>
+                </c:pt>
+                <c:pt idx="24">
+                  <c:v>11.0</c:v>
+                </c:pt>
+                <c:pt idx="25">
+                  <c:v>13.0</c:v>
+                </c:pt>
+                <c:pt idx="26">
+                  <c:v>13.0</c:v>
+                </c:pt>
+                <c:pt idx="27">
+                  <c:v>13.0</c:v>
+                </c:pt>
+                <c:pt idx="28">
+                  <c:v>13.0</c:v>
+                </c:pt>
+                <c:pt idx="29">
+                  <c:v>13.0</c:v>
+                </c:pt>
+              </c:numCache>
+            </c:numRef>
+          </c:yVal>
+          <c:smooth val="1"/>
+        </c:ser>
+        <c:ser>
+          <c:idx val="1"/>
+          <c:order val="1"/>
+          <c:tx>
+            <c:v>Births</c:v>
+          </c:tx>
+          <c:marker>
+            <c:symbol val="none"/>
+          </c:marker>
+          <c:xVal>
+            <c:numRef>
+              <c:f>Sheet1!$A$7:$A$36</c:f>
+              <c:numCache>
+                <c:formatCode>General</c:formatCode>
+                <c:ptCount val="30"/>
+                <c:pt idx="0">
+                  <c:v>1.0</c:v>
+                </c:pt>
+                <c:pt idx="1">
+                  <c:v>2.0</c:v>
+                </c:pt>
+                <c:pt idx="2">
+                  <c:v>3.0</c:v>
+                </c:pt>
+                <c:pt idx="3">
+                  <c:v>4.0</c:v>
+                </c:pt>
+                <c:pt idx="4">
+                  <c:v>5.0</c:v>
+                </c:pt>
+                <c:pt idx="5">
+                  <c:v>6.0</c:v>
+                </c:pt>
+                <c:pt idx="6">
+                  <c:v>7.0</c:v>
+                </c:pt>
+                <c:pt idx="7">
+                  <c:v>8.0</c:v>
+                </c:pt>
+                <c:pt idx="8">
+                  <c:v>9.0</c:v>
+                </c:pt>
+                <c:pt idx="9">
+                  <c:v>10.0</c:v>
+                </c:pt>
+                <c:pt idx="10">
+                  <c:v>11.0</c:v>
+                </c:pt>
+                <c:pt idx="11">
+                  <c:v>12.0</c:v>
+                </c:pt>
+                <c:pt idx="12">
+                  <c:v>13.0</c:v>
+                </c:pt>
+                <c:pt idx="13">
+                  <c:v>14.0</c:v>
+                </c:pt>
+                <c:pt idx="14">
+                  <c:v>15.0</c:v>
+                </c:pt>
+                <c:pt idx="15">
+                  <c:v>16.0</c:v>
+                </c:pt>
+                <c:pt idx="16">
+                  <c:v>17.0</c:v>
+                </c:pt>
+                <c:pt idx="17">
+                  <c:v>18.0</c:v>
+                </c:pt>
+                <c:pt idx="18">
+                  <c:v>19.0</c:v>
+                </c:pt>
+                <c:pt idx="19">
+                  <c:v>20.0</c:v>
+                </c:pt>
+                <c:pt idx="20">
+                  <c:v>21.0</c:v>
+                </c:pt>
+                <c:pt idx="21">
+                  <c:v>22.0</c:v>
+                </c:pt>
+                <c:pt idx="22">
+                  <c:v>23.0</c:v>
+                </c:pt>
+                <c:pt idx="23">
+                  <c:v>24.0</c:v>
+                </c:pt>
+                <c:pt idx="24">
+                  <c:v>25.0</c:v>
+                </c:pt>
+                <c:pt idx="25">
+                  <c:v>26.0</c:v>
+                </c:pt>
+                <c:pt idx="26">
+                  <c:v>27.0</c:v>
+                </c:pt>
+                <c:pt idx="27">
+                  <c:v>28.0</c:v>
+                </c:pt>
+                <c:pt idx="28">
+                  <c:v>29.0</c:v>
+                </c:pt>
+                <c:pt idx="29">
+                  <c:v>30.0</c:v>
+                </c:pt>
+              </c:numCache>
+            </c:numRef>
+          </c:xVal>
+          <c:yVal>
+            <c:numRef>
+              <c:f>Sheet1!$C$7:$C$36</c:f>
+              <c:numCache>
+                <c:formatCode>General</c:formatCode>
+                <c:ptCount val="30"/>
+                <c:pt idx="0">
+                  <c:v>0.0</c:v>
+                </c:pt>
+                <c:pt idx="1">
+                  <c:v>0.0</c:v>
+                </c:pt>
+                <c:pt idx="2">
+                  <c:v>0.0</c:v>
+                </c:pt>
+                <c:pt idx="3">
+                  <c:v>0.0</c:v>
+                </c:pt>
+                <c:pt idx="4">
+                  <c:v>0.0</c:v>
+                </c:pt>
+                <c:pt idx="5">
+                  <c:v>0.0</c:v>
+                </c:pt>
+                <c:pt idx="6">
+                  <c:v>4.0</c:v>
+                </c:pt>
+                <c:pt idx="7">
+                  <c:v>9.0</c:v>
+                </c:pt>
+                <c:pt idx="8">
+                  <c:v>9.0</c:v>
+                </c:pt>
+                <c:pt idx="9">
+                  <c:v>9.0</c:v>
+                </c:pt>
+                <c:pt idx="10">
+                  <c:v>9.0</c:v>
+                </c:pt>
+                <c:pt idx="11">
+                  <c:v>9.0</c:v>
+                </c:pt>
+                <c:pt idx="12">
+                  <c:v>12.0</c:v>
+                </c:pt>
+                <c:pt idx="13">
+                  <c:v>16.0</c:v>
+                </c:pt>
+                <c:pt idx="14">
+                  <c:v>18.0</c:v>
+                </c:pt>
+                <c:pt idx="15">
+                  <c:v>19.0</c:v>
+                </c:pt>
+                <c:pt idx="16">
+                  <c:v>19.0</c:v>
+                </c:pt>
+                <c:pt idx="17">
+                  <c:v>22.0</c:v>
+                </c:pt>
+                <c:pt idx="18">
+                  <c:v>27.0</c:v>
+                </c:pt>
+                <c:pt idx="19">
+                  <c:v>29.0</c:v>
+                </c:pt>
+                <c:pt idx="20">
+                  <c:v>31.0</c:v>
+                </c:pt>
+                <c:pt idx="21">
+                  <c:v>31.0</c:v>
+                </c:pt>
+                <c:pt idx="22">
+                  <c:v>34.0</c:v>
+                </c:pt>
+                <c:pt idx="23">
+                  <c:v>38.0</c:v>
+                </c:pt>
+                <c:pt idx="24">
+                  <c:v>43.0</c:v>
+                </c:pt>
+                <c:pt idx="25">
+                  <c:v>44.0</c:v>
+                </c:pt>
+                <c:pt idx="26">
+                  <c:v>45.0</c:v>
+                </c:pt>
+                <c:pt idx="27">
+                  <c:v>51.0</c:v>
+                </c:pt>
+                <c:pt idx="28">
+                  <c:v>54.0</c:v>
+                </c:pt>
+                <c:pt idx="29">
+                  <c:v>55.0</c:v>
+                </c:pt>
+              </c:numCache>
+            </c:numRef>
+          </c:yVal>
+          <c:smooth val="1"/>
+        </c:ser>
+        <c:dLbls>
+          <c:showLegendKey val="0"/>
+          <c:showVal val="0"/>
+          <c:showCatName val="0"/>
+          <c:showSerName val="0"/>
+          <c:showPercent val="0"/>
+          <c:showBubbleSize val="0"/>
+        </c:dLbls>
+        <c:axId val="2086395816"/>
+        <c:axId val="2058430056"/>
+      </c:scatterChart>
+      <c:valAx>
+        <c:axId val="2086395816"/>
+        <c:scaling>
+          <c:orientation val="minMax"/>
+        </c:scaling>
+        <c:delete val="0"/>
+        <c:axPos val="b"/>
+        <c:title>
+          <c:tx>
+            <c:rich>
+              <a:bodyPr/>
+              <a:lstStyle/>
+              <a:p>
+                <a:pPr>
+                  <a:defRPr/>
+                </a:pPr>
+                <a:r>
+                  <a:rPr lang="en-US"/>
+                  <a:t>Days</a:t>
+                </a:r>
+              </a:p>
+            </c:rich>
+          </c:tx>
+          <c:layout>
+            <c:manualLayout>
+              <c:xMode val="edge"/>
+              <c:yMode val="edge"/>
+              <c:x val="0.393995406824147"/>
+              <c:y val="0.912037037037037"/>
+            </c:manualLayout>
+          </c:layout>
+          <c:overlay val="0"/>
+        </c:title>
+        <c:numFmt formatCode="General" sourceLinked="1"/>
+        <c:majorTickMark val="out"/>
+        <c:minorTickMark val="none"/>
+        <c:tickLblPos val="nextTo"/>
+        <c:crossAx val="2058430056"/>
+        <c:crosses val="autoZero"/>
+        <c:crossBetween val="midCat"/>
+      </c:valAx>
+      <c:valAx>
+        <c:axId val="2058430056"/>
+        <c:scaling>
+          <c:orientation val="minMax"/>
+        </c:scaling>
+        <c:delete val="0"/>
+        <c:axPos val="l"/>
+        <c:majorGridlines/>
+        <c:title>
+          <c:tx>
+            <c:rich>
+              <a:bodyPr rot="-5400000" vert="horz"/>
+              <a:lstStyle/>
+              <a:p>
+                <a:pPr marL="0" marR="0" indent="0" algn="ctr" defTabSz="914400" rtl="0" eaLnBrk="1" fontAlgn="auto" latinLnBrk="0" hangingPunct="1">
+                  <a:lnSpc>
+                    <a:spcPct val="100000"/>
+                  </a:lnSpc>
+                  <a:spcBef>
+                    <a:spcPts val="0"/>
+                  </a:spcBef>
+                  <a:spcAft>
+                    <a:spcPts val="0"/>
+                  </a:spcAft>
+                  <a:buClrTx/>
+                  <a:buSzTx/>
+                  <a:buFontTx/>
+                  <a:buNone/>
+                  <a:tabLst/>
+                  <a:defRPr sz="1000" b="1" i="0" u="none" strike="noStrike" kern="1200" baseline="0">
+                    <a:solidFill>
+                      <a:sysClr val="windowText" lastClr="000000"/>
+                    </a:solidFill>
+                    <a:latin typeface="+mn-lt"/>
+                    <a:ea typeface="+mn-ea"/>
+                    <a:cs typeface="+mn-cs"/>
+                  </a:defRPr>
+                </a:pPr>
+                <a:r>
+                  <a:rPr lang="en-US" sz="1000"/>
+                  <a:t> </a:t>
+                </a:r>
+                <a:r>
+                  <a:rPr lang="en-US" sz="1000" b="1" i="0" baseline="0">
+                    <a:effectLst/>
+                  </a:rPr>
+                  <a:t>Number of Occurences</a:t>
+                </a:r>
+                <a:endParaRPr lang="en-US" sz="1000">
+                  <a:effectLst/>
+                </a:endParaRPr>
+              </a:p>
+              <a:p>
+                <a:pPr marL="0" marR="0" indent="0" algn="ctr" defTabSz="914400" rtl="0" eaLnBrk="1" fontAlgn="auto" latinLnBrk="0" hangingPunct="1">
+                  <a:lnSpc>
+                    <a:spcPct val="100000"/>
+                  </a:lnSpc>
+                  <a:spcBef>
+                    <a:spcPts val="0"/>
+                  </a:spcBef>
+                  <a:spcAft>
+                    <a:spcPts val="0"/>
+                  </a:spcAft>
+                  <a:buClrTx/>
+                  <a:buSzTx/>
+                  <a:buFontTx/>
+                  <a:buNone/>
+                  <a:tabLst/>
+                  <a:defRPr sz="1000" b="1" i="0" u="none" strike="noStrike" kern="1200" baseline="0">
+                    <a:solidFill>
+                      <a:sysClr val="windowText" lastClr="000000"/>
+                    </a:solidFill>
+                    <a:latin typeface="+mn-lt"/>
+                    <a:ea typeface="+mn-ea"/>
+                    <a:cs typeface="+mn-cs"/>
+                  </a:defRPr>
+                </a:pPr>
+                <a:endParaRPr lang="en-US" sz="1000"/>
+              </a:p>
+            </c:rich>
+          </c:tx>
+          <c:layout/>
+          <c:overlay val="0"/>
+        </c:title>
+        <c:numFmt formatCode="General" sourceLinked="1"/>
+        <c:majorTickMark val="out"/>
+        <c:minorTickMark val="none"/>
+        <c:tickLblPos val="nextTo"/>
+        <c:crossAx val="2086395816"/>
+        <c:crosses val="autoZero"/>
+        <c:crossBetween val="midCat"/>
+      </c:valAx>
+    </c:plotArea>
+    <c:legend>
+      <c:legendPos val="r"/>
+      <c:layout/>
+      <c:overlay val="0"/>
+      <c:txPr>
+        <a:bodyPr/>
+        <a:lstStyle/>
+        <a:p>
+          <a:pPr>
+            <a:defRPr sz="3200"/>
+          </a:pPr>
+          <a:endParaRPr lang="en-US"/>
+        </a:p>
+      </c:txPr>
+    </c:legend>
+    <c:plotVisOnly val="1"/>
+    <c:dispBlanksAs val="gap"/>
+    <c:showDLblsOverMax val="0"/>
+  </c:chart>
+  <c:spPr>
+    <a:solidFill>
+      <a:schemeClr val="bg1"/>
+    </a:solidFill>
   </c:spPr>
   <c:externalData r:id="rId1">
     <c:autoUpdate val="0"/>
@@ -4117,7 +4771,7 @@
               <a:graphicData uri="http://schemas.openxmlformats.org/presentationml/2006/ole">
                 <mc:AlternateContent xmlns:mc="http://schemas.openxmlformats.org/markup-compatibility/2006">
                   <mc:Choice xmlns:v="urn:schemas-microsoft-com:vml" Requires="v">
-                    <p:oleObj spid="_x0000_s1434" name="Image" r:id="rId8" imgW="1828440" imgH="1117440" progId="Photoshop.Image.13">
+                    <p:oleObj spid="_x0000_s1438" name="Image" r:id="rId8" imgW="1828440" imgH="1117440" progId="Photoshop.Image.13">
                       <p:embed/>
                     </p:oleObj>
                   </mc:Choice>
@@ -4174,7 +4828,7 @@
               <a:graphicData uri="http://schemas.openxmlformats.org/presentationml/2006/ole">
                 <mc:AlternateContent xmlns:mc="http://schemas.openxmlformats.org/markup-compatibility/2006">
                   <mc:Choice xmlns:v="urn:schemas-microsoft-com:vml" Requires="v">
-                    <p:oleObj spid="_x0000_s1435" name="Image" r:id="rId10" imgW="1828440" imgH="1117440" progId="Photoshop.Image.13">
+                    <p:oleObj spid="_x0000_s1439" name="Image" r:id="rId10" imgW="1828440" imgH="1117440" progId="Photoshop.Image.13">
                       <p:embed/>
                     </p:oleObj>
                   </mc:Choice>
@@ -5302,7 +5956,7 @@
             <a:graphicData uri="http://schemas.openxmlformats.org/presentationml/2006/ole">
               <mc:AlternateContent xmlns:mc="http://schemas.openxmlformats.org/markup-compatibility/2006">
                 <mc:Choice xmlns:v="urn:schemas-microsoft-com:vml" Requires="v">
-                  <p:oleObj spid="_x0000_s1436" name="Image" r:id="rId12" imgW="4571280" imgH="1688760" progId="Photoshop.Image.13">
+                  <p:oleObj spid="_x0000_s1440" name="Image" r:id="rId12" imgW="4571280" imgH="1688760" progId="Photoshop.Image.13">
                     <p:embed/>
                   </p:oleObj>
                 </mc:Choice>
@@ -5386,7 +6040,7 @@
             <a:graphicData uri="http://schemas.openxmlformats.org/presentationml/2006/ole">
               <mc:AlternateContent xmlns:mc="http://schemas.openxmlformats.org/markup-compatibility/2006">
                 <mc:Choice xmlns:v="urn:schemas-microsoft-com:vml" Requires="v">
-                  <p:oleObj spid="_x0000_s1437" name="Image" r:id="rId15" imgW="1574280" imgH="1053720" progId="Photoshop.Image.13">
+                  <p:oleObj spid="_x0000_s1441" name="Image" r:id="rId15" imgW="1574280" imgH="1053720" progId="Photoshop.Image.13">
                     <p:embed/>
                   </p:oleObj>
                 </mc:Choice>
@@ -6639,15 +7293,7 @@
             </a:r>
             <a:r>
               <a:rPr lang="en-US" dirty="0" smtClean="0"/>
-              <a:t>Computer Simulation (CX </a:t>
-            </a:r>
-            <a:r>
-              <a:rPr lang="en-US" smtClean="0"/>
-              <a:t>4230), 2015</a:t>
-            </a:r>
-            <a:r>
-              <a:rPr lang="en-US" dirty="0" smtClean="0"/>
-              <a:t>.  </a:t>
+              <a:t>Computer Simulation (CX 4230), 2015.  </a:t>
             </a:r>
             <a:endParaRPr lang="en-US" dirty="0"/>
           </a:p>
@@ -7028,8 +7674,8 @@
               </a:spcBef>
             </a:pPr>
             <a:r>
-              <a:rPr lang="en-US" sz="2400" b="1" dirty="0" smtClean="0"/>
-              <a:t>Businesses</a:t>
+              <a:rPr lang="en-US" sz="2400" b="1" smtClean="0"/>
+              <a:t>Residences</a:t>
             </a:r>
             <a:endParaRPr lang="en-US" sz="2400" b="1" dirty="0"/>
           </a:p>
@@ -7138,6 +7784,30 @@
         <a:graphic>
           <a:graphicData uri="http://schemas.openxmlformats.org/drawingml/2006/chart">
             <c:chart xmlns:c="http://schemas.openxmlformats.org/drawingml/2006/chart" xmlns:r="http://schemas.openxmlformats.org/officeDocument/2006/relationships" r:id="rId6"/>
+          </a:graphicData>
+        </a:graphic>
+      </p:graphicFrame>
+      <p:graphicFrame>
+        <p:nvGraphicFramePr>
+          <p:cNvPr id="29" name="Chart 28"/>
+          <p:cNvGraphicFramePr>
+            <a:graphicFrameLocks/>
+          </p:cNvGraphicFramePr>
+          <p:nvPr>
+            <p:extLst>
+              <p:ext uri="{D42A27DB-BD31-4B8C-83A1-F6EECF244321}">
+                <p14:modId xmlns:p14="http://schemas.microsoft.com/office/powerpoint/2010/main" val="613865769"/>
+              </p:ext>
+            </p:extLst>
+          </p:nvPr>
+        </p:nvGraphicFramePr>
+        <p:xfrm>
+          <a:off x="22053078" y="20041996"/>
+          <a:ext cx="9817437" cy="5511309"/>
+        </p:xfrm>
+        <a:graphic>
+          <a:graphicData uri="http://schemas.openxmlformats.org/drawingml/2006/chart">
+            <c:chart xmlns:c="http://schemas.openxmlformats.org/drawingml/2006/chart" xmlns:r="http://schemas.openxmlformats.org/officeDocument/2006/relationships" r:id="rId7"/>
           </a:graphicData>
         </a:graphic>
       </p:graphicFrame>

</xml_diff>

<commit_message>
Fix styles of last graph.
</commit_message>
<xml_diff>
--- a/Poster.pptx
+++ b/Poster.pptx
@@ -109,7 +109,7 @@
   </p:defaultTextStyle>
   <p:extLst>
     <p:ext uri="{EFAFB233-063F-42B5-8137-9DF3F51BA10A}">
-      <p15:sldGuideLst xmlns="" xmlns:p15="http://schemas.microsoft.com/office/powerpoint/2012/main">
+      <p15:sldGuideLst xmlns:p15="http://schemas.microsoft.com/office/powerpoint/2012/main" xmlns="">
         <p15:guide id="1" orient="horz" pos="3318">
           <p15:clr>
             <a:srgbClr val="A4A3A4"/>
@@ -163,7 +163,7 @@
       </p15:sldGuideLst>
     </p:ext>
     <p:ext uri="{2D200454-40CA-4A62-9FC3-DE9A4176ACB9}">
-      <p15:notesGuideLst xmlns="" xmlns:p15="http://schemas.microsoft.com/office/powerpoint/2012/main">
+      <p15:notesGuideLst xmlns:p15="http://schemas.microsoft.com/office/powerpoint/2012/main" xmlns="">
         <p15:guide id="1" orient="horz" pos="13681">
           <p15:clr>
             <a:srgbClr val="A4A3A4"/>
@@ -453,11 +453,11 @@
           <c:showPercent val="0"/>
           <c:showBubbleSize val="0"/>
         </c:dLbls>
-        <c:axId val="2055767512"/>
-        <c:axId val="2055773112"/>
+        <c:axId val="2120397320"/>
+        <c:axId val="2120402920"/>
       </c:scatterChart>
       <c:valAx>
-        <c:axId val="2055767512"/>
+        <c:axId val="2120397320"/>
         <c:scaling>
           <c:orientation val="minMax"/>
           <c:max val="30.0"/>
@@ -498,12 +498,12 @@
             <a:endParaRPr lang="en-US"/>
           </a:p>
         </c:txPr>
-        <c:crossAx val="2055773112"/>
+        <c:crossAx val="2120402920"/>
         <c:crosses val="autoZero"/>
         <c:crossBetween val="midCat"/>
       </c:valAx>
       <c:valAx>
-        <c:axId val="2055773112"/>
+        <c:axId val="2120402920"/>
         <c:scaling>
           <c:orientation val="minMax"/>
         </c:scaling>
@@ -524,7 +524,7 @@
             <a:endParaRPr lang="en-US"/>
           </a:p>
         </c:txPr>
-        <c:crossAx val="2055767512"/>
+        <c:crossAx val="2120397320"/>
         <c:crosses val="autoZero"/>
         <c:crossBetween val="midCat"/>
       </c:valAx>
@@ -803,11 +803,11 @@
           <c:showPercent val="0"/>
           <c:showBubbleSize val="0"/>
         </c:dLbls>
-        <c:axId val="2103467944"/>
-        <c:axId val="2104220360"/>
+        <c:axId val="2084524920"/>
+        <c:axId val="2021574632"/>
       </c:scatterChart>
       <c:valAx>
-        <c:axId val="2103467944"/>
+        <c:axId val="2084524920"/>
         <c:scaling>
           <c:orientation val="minMax"/>
           <c:max val="24.0"/>
@@ -848,13 +848,13 @@
             <a:endParaRPr lang="en-US"/>
           </a:p>
         </c:txPr>
-        <c:crossAx val="2104220360"/>
+        <c:crossAx val="2021574632"/>
         <c:crosses val="autoZero"/>
         <c:crossBetween val="midCat"/>
         <c:majorUnit val="4.0"/>
       </c:valAx>
       <c:valAx>
-        <c:axId val="2104220360"/>
+        <c:axId val="2021574632"/>
         <c:scaling>
           <c:orientation val="minMax"/>
         </c:scaling>
@@ -875,7 +875,7 @@
             <a:endParaRPr lang="en-US"/>
           </a:p>
         </c:txPr>
-        <c:crossAx val="2103467944"/>
+        <c:crossAx val="2084524920"/>
         <c:crosses val="autoZero"/>
         <c:crossBetween val="midCat"/>
       </c:valAx>
@@ -1017,11 +1017,11 @@
           <c:showPercent val="0"/>
           <c:showBubbleSize val="0"/>
         </c:dLbls>
-        <c:axId val="2104469384"/>
-        <c:axId val="2083858920"/>
+        <c:axId val="2083740920"/>
+        <c:axId val="2083743720"/>
       </c:scatterChart>
       <c:valAx>
-        <c:axId val="2104469384"/>
+        <c:axId val="2083740920"/>
         <c:scaling>
           <c:orientation val="minMax"/>
         </c:scaling>
@@ -1034,12 +1034,13 @@
               <a:lstStyle/>
               <a:p>
                 <a:pPr>
-                  <a:defRPr/>
+                  <a:defRPr sz="2500"/>
                 </a:pPr>
                 <a:r>
-                  <a:rPr lang="en-US"/>
-                  <a:t>Days</a:t>
+                  <a:rPr lang="en-US" sz="2500" dirty="0" smtClean="0"/>
+                  <a:t>Day</a:t>
                 </a:r>
+                <a:endParaRPr lang="en-US" sz="2500" dirty="0"/>
               </a:p>
             </c:rich>
           </c:tx>
@@ -1050,12 +1051,22 @@
         <c:majorTickMark val="out"/>
         <c:minorTickMark val="none"/>
         <c:tickLblPos val="nextTo"/>
-        <c:crossAx val="2083858920"/>
+        <c:txPr>
+          <a:bodyPr/>
+          <a:lstStyle/>
+          <a:p>
+            <a:pPr>
+              <a:defRPr sz="2500"/>
+            </a:pPr>
+            <a:endParaRPr lang="en-US"/>
+          </a:p>
+        </c:txPr>
+        <c:crossAx val="2083743720"/>
         <c:crosses val="autoZero"/>
         <c:crossBetween val="midCat"/>
       </c:valAx>
       <c:valAx>
-        <c:axId val="2083858920"/>
+        <c:axId val="2083743720"/>
         <c:scaling>
           <c:orientation val="minMax"/>
         </c:scaling>
@@ -1069,17 +1080,17 @@
               <a:lstStyle/>
               <a:p>
                 <a:pPr>
-                  <a:defRPr/>
+                  <a:defRPr sz="2500"/>
                 </a:pPr>
                 <a:r>
-                  <a:rPr lang="en-US"/>
+                  <a:rPr lang="en-US" sz="2500"/>
                   <a:t>Average</a:t>
                 </a:r>
                 <a:r>
-                  <a:rPr lang="en-US" baseline="0"/>
+                  <a:rPr lang="en-US" sz="2500" baseline="0"/>
                   <a:t> Business Worth</a:t>
                 </a:r>
-                <a:endParaRPr lang="en-US"/>
+                <a:endParaRPr lang="en-US" sz="2500"/>
               </a:p>
             </c:rich>
           </c:tx>
@@ -1090,7 +1101,17 @@
         <c:majorTickMark val="out"/>
         <c:minorTickMark val="none"/>
         <c:tickLblPos val="nextTo"/>
-        <c:crossAx val="2104469384"/>
+        <c:txPr>
+          <a:bodyPr/>
+          <a:lstStyle/>
+          <a:p>
+            <a:pPr>
+              <a:defRPr sz="2500"/>
+            </a:pPr>
+            <a:endParaRPr lang="en-US"/>
+          </a:p>
+        </c:txPr>
+        <c:crossAx val="2083740920"/>
         <c:crosses val="autoZero"/>
         <c:crossBetween val="midCat"/>
       </c:valAx>
@@ -1602,11 +1623,11 @@
           <c:showPercent val="0"/>
           <c:showBubbleSize val="0"/>
         </c:dLbls>
-        <c:axId val="2086395816"/>
-        <c:axId val="2058430056"/>
+        <c:axId val="2084486376"/>
+        <c:axId val="2021452456"/>
       </c:scatterChart>
       <c:valAx>
-        <c:axId val="2086395816"/>
+        <c:axId val="2084486376"/>
         <c:scaling>
           <c:orientation val="minMax"/>
         </c:scaling>
@@ -1619,10 +1640,10 @@
               <a:lstStyle/>
               <a:p>
                 <a:pPr>
-                  <a:defRPr/>
+                  <a:defRPr sz="2500"/>
                 </a:pPr>
                 <a:r>
-                  <a:rPr lang="en-US"/>
+                  <a:rPr lang="en-US" sz="2500"/>
                   <a:t>Days</a:t>
                 </a:r>
               </a:p>
@@ -1642,12 +1663,22 @@
         <c:majorTickMark val="out"/>
         <c:minorTickMark val="none"/>
         <c:tickLblPos val="nextTo"/>
-        <c:crossAx val="2058430056"/>
+        <c:txPr>
+          <a:bodyPr/>
+          <a:lstStyle/>
+          <a:p>
+            <a:pPr>
+              <a:defRPr sz="2500"/>
+            </a:pPr>
+            <a:endParaRPr lang="en-US"/>
+          </a:p>
+        </c:txPr>
+        <c:crossAx val="2021452456"/>
         <c:crosses val="autoZero"/>
         <c:crossBetween val="midCat"/>
       </c:valAx>
       <c:valAx>
-        <c:axId val="2058430056"/>
+        <c:axId val="2021452456"/>
         <c:scaling>
           <c:orientation val="minMax"/>
         </c:scaling>
@@ -1675,7 +1706,7 @@
                   <a:buFontTx/>
                   <a:buNone/>
                   <a:tabLst/>
-                  <a:defRPr sz="1000" b="1" i="0" u="none" strike="noStrike" kern="1200" baseline="0">
+                  <a:defRPr sz="2500" b="1" i="0" u="none" strike="noStrike" kern="1200" baseline="0">
                     <a:solidFill>
                       <a:sysClr val="windowText" lastClr="000000"/>
                     </a:solidFill>
@@ -1685,16 +1716,16 @@
                   </a:defRPr>
                 </a:pPr>
                 <a:r>
-                  <a:rPr lang="en-US" sz="1000"/>
+                  <a:rPr lang="en-US" sz="2500"/>
                   <a:t> </a:t>
                 </a:r>
                 <a:r>
-                  <a:rPr lang="en-US" sz="1000" b="1" i="0" baseline="0">
+                  <a:rPr lang="en-US" sz="2500" b="1" i="0" baseline="0">
                     <a:effectLst/>
                   </a:rPr>
                   <a:t>Number of Occurences</a:t>
                 </a:r>
-                <a:endParaRPr lang="en-US" sz="1000">
+                <a:endParaRPr lang="en-US" sz="2500">
                   <a:effectLst/>
                 </a:endParaRPr>
               </a:p>
@@ -1714,7 +1745,7 @@
                   <a:buFontTx/>
                   <a:buNone/>
                   <a:tabLst/>
-                  <a:defRPr sz="1000" b="1" i="0" u="none" strike="noStrike" kern="1200" baseline="0">
+                  <a:defRPr sz="2500" b="1" i="0" u="none" strike="noStrike" kern="1200" baseline="0">
                     <a:solidFill>
                       <a:sysClr val="windowText" lastClr="000000"/>
                     </a:solidFill>
@@ -1723,7 +1754,7 @@
                     <a:cs typeface="+mn-cs"/>
                   </a:defRPr>
                 </a:pPr>
-                <a:endParaRPr lang="en-US" sz="1000"/>
+                <a:endParaRPr lang="en-US" sz="2500"/>
               </a:p>
             </c:rich>
           </c:tx>
@@ -1734,7 +1765,17 @@
         <c:majorTickMark val="out"/>
         <c:minorTickMark val="none"/>
         <c:tickLblPos val="nextTo"/>
-        <c:crossAx val="2086395816"/>
+        <c:txPr>
+          <a:bodyPr/>
+          <a:lstStyle/>
+          <a:p>
+            <a:pPr>
+              <a:defRPr sz="2500"/>
+            </a:pPr>
+            <a:endParaRPr lang="en-US"/>
+          </a:p>
+        </c:txPr>
+        <c:crossAx val="2084486376"/>
         <c:crosses val="autoZero"/>
         <c:crossBetween val="midCat"/>
       </c:valAx>
@@ -1748,7 +1789,7 @@
         <a:lstStyle/>
         <a:p>
           <a:pPr>
-            <a:defRPr sz="3200"/>
+            <a:defRPr sz="2000"/>
           </a:pPr>
           <a:endParaRPr lang="en-US"/>
         </a:p>
@@ -4771,7 +4812,7 @@
               <a:graphicData uri="http://schemas.openxmlformats.org/presentationml/2006/ole">
                 <mc:AlternateContent xmlns:mc="http://schemas.openxmlformats.org/markup-compatibility/2006">
                   <mc:Choice xmlns:v="urn:schemas-microsoft-com:vml" Requires="v">
-                    <p:oleObj spid="_x0000_s1438" name="Image" r:id="rId8" imgW="1828440" imgH="1117440" progId="Photoshop.Image.13">
+                    <p:oleObj spid="_x0000_s1443" name="Image" r:id="rId8" imgW="1828440" imgH="1117440" progId="Photoshop.Image.13">
                       <p:embed/>
                     </p:oleObj>
                   </mc:Choice>
@@ -4828,7 +4869,7 @@
               <a:graphicData uri="http://schemas.openxmlformats.org/presentationml/2006/ole">
                 <mc:AlternateContent xmlns:mc="http://schemas.openxmlformats.org/markup-compatibility/2006">
                   <mc:Choice xmlns:v="urn:schemas-microsoft-com:vml" Requires="v">
-                    <p:oleObj spid="_x0000_s1439" name="Image" r:id="rId10" imgW="1828440" imgH="1117440" progId="Photoshop.Image.13">
+                    <p:oleObj spid="_x0000_s1444" name="Image" r:id="rId10" imgW="1828440" imgH="1117440" progId="Photoshop.Image.13">
                       <p:embed/>
                     </p:oleObj>
                   </mc:Choice>
@@ -5956,7 +5997,7 @@
             <a:graphicData uri="http://schemas.openxmlformats.org/presentationml/2006/ole">
               <mc:AlternateContent xmlns:mc="http://schemas.openxmlformats.org/markup-compatibility/2006">
                 <mc:Choice xmlns:v="urn:schemas-microsoft-com:vml" Requires="v">
-                  <p:oleObj spid="_x0000_s1440" name="Image" r:id="rId12" imgW="4571280" imgH="1688760" progId="Photoshop.Image.13">
+                  <p:oleObj spid="_x0000_s1445" name="Image" r:id="rId12" imgW="4571280" imgH="1688760" progId="Photoshop.Image.13">
                     <p:embed/>
                   </p:oleObj>
                 </mc:Choice>
@@ -6040,7 +6081,7 @@
             <a:graphicData uri="http://schemas.openxmlformats.org/presentationml/2006/ole">
               <mc:AlternateContent xmlns:mc="http://schemas.openxmlformats.org/markup-compatibility/2006">
                 <mc:Choice xmlns:v="urn:schemas-microsoft-com:vml" Requires="v">
-                  <p:oleObj spid="_x0000_s1441" name="Image" r:id="rId15" imgW="1574280" imgH="1053720" progId="Photoshop.Image.13">
+                  <p:oleObj spid="_x0000_s1446" name="Image" r:id="rId15" imgW="1574280" imgH="1053720" progId="Photoshop.Image.13">
                     <p:embed/>
                   </p:oleObj>
                 </mc:Choice>
@@ -6747,13 +6788,8 @@
             </a:r>
             <a:r>
               <a:rPr lang="en-US" dirty="0" smtClean="0"/>
-              <a:t>prosperity</a:t>
-            </a:r>
-            <a:r>
-              <a:rPr lang="en-US" dirty="0" smtClean="0"/>
-              <a:t>.</a:t>
-            </a:r>
-            <a:endParaRPr lang="en-US" dirty="0" smtClean="0"/>
+              <a:t>prosperity.</a:t>
+            </a:r>
           </a:p>
           <a:p>
             <a:pPr>
@@ -6771,47 +6807,7 @@
             </a:pPr>
             <a:r>
               <a:rPr lang="en-US" dirty="0" smtClean="0"/>
-              <a:t>The city simulation includes a dynamic population, residences, businesses, and entertainment </a:t>
-            </a:r>
-            <a:r>
-              <a:rPr lang="en-US" dirty="0" smtClean="0"/>
-              <a:t>venues. As people interact with the world, </a:t>
-            </a:r>
-            <a:r>
-              <a:rPr lang="en-US" dirty="0" smtClean="0"/>
-              <a:t>each component of world changes. </a:t>
-            </a:r>
-            <a:r>
-              <a:rPr lang="en-US" dirty="0" smtClean="0"/>
-              <a:t>People’s </a:t>
-            </a:r>
-            <a:r>
-              <a:rPr lang="en-US" dirty="0" smtClean="0"/>
-              <a:t>skills and ambitions determine </a:t>
-            </a:r>
-            <a:r>
-              <a:rPr lang="en-US" dirty="0" smtClean="0"/>
-              <a:t>how their actions and outcome of model, such as the </a:t>
-            </a:r>
-            <a:r>
-              <a:rPr lang="en-US" dirty="0" smtClean="0"/>
-              <a:t>success of </a:t>
-            </a:r>
-            <a:r>
-              <a:rPr lang="en-US" dirty="0" smtClean="0"/>
-              <a:t>businesses</a:t>
-            </a:r>
-            <a:r>
-              <a:rPr lang="en-US" dirty="0" smtClean="0"/>
-              <a:t>.  In turn, </a:t>
-            </a:r>
-            <a:r>
-              <a:rPr lang="en-US" dirty="0" smtClean="0"/>
-              <a:t>businesses </a:t>
-            </a:r>
-            <a:r>
-              <a:rPr lang="en-US" dirty="0" smtClean="0"/>
-              <a:t>can expand or contract based on how hard their workers work</a:t>
+              <a:t>The city simulation includes a dynamic population, residences, businesses, and entertainment venues. As people interact with the world, each component of world changes. People’s skills and ambitions determine how their actions and outcome of model, such as the success of businesses.  In turn, businesses can expand or contract based on how hard their workers work</a:t>
             </a:r>
             <a:r>
               <a:rPr lang="en-US" dirty="0"/>
@@ -6917,19 +6913,7 @@
           <a:p>
             <a:r>
               <a:rPr lang="en-US" dirty="0" smtClean="0"/>
-              <a:t>The simulation is an agent-based discrete-event simulator. Every hour, the simulator notifies all the entities (people and businesses) that time has passed, and the individuals and </a:t>
-            </a:r>
-            <a:r>
-              <a:rPr lang="en-US" dirty="0" smtClean="0"/>
-              <a:t>the other parts of the model update </a:t>
-            </a:r>
-            <a:r>
-              <a:rPr lang="en-US" dirty="0" smtClean="0"/>
-              <a:t>their properties</a:t>
-            </a:r>
-            <a:r>
-              <a:rPr lang="en-US" dirty="0" smtClean="0"/>
-              <a:t>.</a:t>
+              <a:t>The simulation is an agent-based discrete-event simulator. Every hour, the simulator notifies all the entities (people and businesses) that time has passed, and the individuals and the other parts of the model update their properties.</a:t>
             </a:r>
           </a:p>
           <a:p>
@@ -6944,22 +6928,13 @@
           <a:p>
             <a:r>
               <a:rPr lang="en-US" dirty="0" smtClean="0"/>
-              <a:t>The people represent the agents in our simulation. Every day people have unique experiences; however, they always follow the circle of life</a:t>
-            </a:r>
+              <a:t>The people represent the agents in our simulation. Every day people have unique experiences; however, they always follow the circle of life.</a:t>
+            </a:r>
+          </a:p>
+          <a:p>
             <a:r>
               <a:rPr lang="en-US" dirty="0" smtClean="0"/>
-              <a:t>.</a:t>
-            </a:r>
-            <a:endParaRPr lang="en-US" dirty="0" smtClean="0"/>
-          </a:p>
-          <a:p>
-            <a:r>
-              <a:rPr lang="en-US" dirty="0" smtClean="0"/>
-              <a:t>In our simulation, the circle of life is simplified to sleep, eat, work, and shop. People sleep at night, eat in the morning and afternoon, work during the day, and shop in the evening. People can choose to eat at home or at any of the restaurants in the city. In our simulation, shopping refers to all forms of entertainment, which include malls, movies, bars, and night clubs</a:t>
-            </a:r>
-            <a:r>
-              <a:rPr lang="en-US" dirty="0" smtClean="0"/>
-              <a:t>.</a:t>
+              <a:t>In our simulation, the circle of life is simplified to sleep, eat, work, and shop. People sleep at night, eat in the morning and afternoon, work during the day, and shop in the evening. People can choose to eat at home or at any of the restaurants in the city. In our simulation, shopping refers to all forms of entertainment, which include malls, movies, bars, and night clubs.</a:t>
             </a:r>
           </a:p>
           <a:p>
@@ -7012,7 +6987,6 @@
               <a:rPr lang="en-US" dirty="0" smtClean="0"/>
               <a:t>and tech.  The quality and wage of the work depends on these types.  </a:t>
             </a:r>
-            <a:endParaRPr lang="en-US" dirty="0" smtClean="0"/>
           </a:p>
           <a:p>
             <a:endParaRPr lang="en-US" sz="2400" dirty="0" smtClean="0"/>
@@ -7124,19 +7098,7 @@
           <a:p>
             <a:r>
               <a:rPr lang="en-US" dirty="0" smtClean="0"/>
-              <a:t>We chose to show </a:t>
-            </a:r>
-            <a:r>
-              <a:rPr lang="en-US" dirty="0" smtClean="0"/>
-              <a:t>some general highlights of model in the graphs below.  </a:t>
-            </a:r>
-            <a:r>
-              <a:rPr lang="en-US" dirty="0" smtClean="0"/>
-              <a:t>The trends we see make sense both in terms of the model but also reality itself.  In our model, peopl</a:t>
-            </a:r>
-            <a:r>
-              <a:rPr lang="en-US" dirty="0" smtClean="0"/>
-              <a:t>e are paid by their place of work around midday, and they spend money on shopping during the morning and evening.  The average money owned by an individual throughout 24 hours reflects this. Further, the average amount of money owned by individuals does ultimately increase over a month, though there is some noise in the process.  Considering the random nature of the transitions, it makes sense that we would see certain dips in money, but given the companies grew over this period, as pictured below, </a:t>
+              <a:t>We chose to show some general highlights of model in the graphs below.  The trends we see make sense both in terms of the model but also reality itself.  In our model, people are paid by their place of work around midday, and they spend money on shopping during the morning and evening.  The average money owned by an individual throughout 24 hours reflects this. Further, the average amount of money owned by individuals does ultimately increase over a month, though there is some noise in the process.  Considering the random nature of the transitions, it makes sense that we would see certain dips in money, but given the companies grew over this period, as pictured below, </a:t>
             </a:r>
             <a:r>
               <a:rPr lang="en-US" dirty="0" err="1" smtClean="0"/>
@@ -7162,11 +7124,7 @@
           <a:p>
             <a:r>
               <a:rPr lang="en-US" dirty="0" smtClean="0"/>
-              <a:t>Another set of experiments showed the number of deaths versus the number of children.  We see that the number of children born outweighs the number of people who die in the long term.  Given that people make money over the course of the month while businesses expand, it follows that their happiness increases.  </a:t>
-            </a:r>
-            <a:r>
-              <a:rPr lang="en-US" dirty="0" smtClean="0"/>
-              <a:t>Given that the chance of producing a child depends on the good health of a person, it follows that many children would be born.  On the other hand, because few are exceptionally poor and destitute, only a few die as the simulation proceeds.  </a:t>
+              <a:t>Another set of experiments showed the number of deaths versus the number of children.  We see that the number of children born outweighs the number of people who die in the long term.  Given that people make money over the course of the month while businesses expand, it follows that their happiness increases.  Given that the chance of producing a child depends on the good health of a person, it follows that many children would be born.  On the other hand, because few are exceptionally poor and destitute, only a few die as the simulation proceeds.  </a:t>
             </a:r>
           </a:p>
           <a:p>
@@ -7772,7 +7730,7 @@
           <p:nvPr>
             <p:extLst>
               <p:ext uri="{D42A27DB-BD31-4B8C-83A1-F6EECF244321}">
-                <p14:modId xmlns:p14="http://schemas.microsoft.com/office/powerpoint/2010/main" val="3008158598"/>
+                <p14:modId xmlns:p14="http://schemas.microsoft.com/office/powerpoint/2010/main" val="1151962011"/>
               </p:ext>
             </p:extLst>
           </p:nvPr>
@@ -7796,7 +7754,7 @@
           <p:nvPr>
             <p:extLst>
               <p:ext uri="{D42A27DB-BD31-4B8C-83A1-F6EECF244321}">
-                <p14:modId xmlns:p14="http://schemas.microsoft.com/office/powerpoint/2010/main" val="613865769"/>
+                <p14:modId xmlns:p14="http://schemas.microsoft.com/office/powerpoint/2010/main" val="3981900163"/>
               </p:ext>
             </p:extLst>
           </p:nvPr>

</xml_diff>

<commit_message>
Fix sizes and styling of graphs.
</commit_message>
<xml_diff>
--- a/Poster.pptx
+++ b/Poster.pptx
@@ -109,7 +109,7 @@
   </p:defaultTextStyle>
   <p:extLst>
     <p:ext uri="{EFAFB233-063F-42B5-8137-9DF3F51BA10A}">
-      <p15:sldGuideLst xmlns="" xmlns:p15="http://schemas.microsoft.com/office/powerpoint/2012/main">
+      <p15:sldGuideLst xmlns:p15="http://schemas.microsoft.com/office/powerpoint/2012/main" xmlns="">
         <p15:guide id="1" orient="horz" pos="3318">
           <p15:clr>
             <a:srgbClr val="A4A3A4"/>
@@ -163,7 +163,7 @@
       </p15:sldGuideLst>
     </p:ext>
     <p:ext uri="{2D200454-40CA-4A62-9FC3-DE9A4176ACB9}">
-      <p15:notesGuideLst xmlns="" xmlns:p15="http://schemas.microsoft.com/office/powerpoint/2012/main">
+      <p15:notesGuideLst xmlns:p15="http://schemas.microsoft.com/office/powerpoint/2012/main" xmlns="">
         <p15:guide id="1" orient="horz" pos="13681">
           <p15:clr>
             <a:srgbClr val="A4A3A4"/>
@@ -453,11 +453,11 @@
           <c:showPercent val="0"/>
           <c:showBubbleSize val="0"/>
         </c:dLbls>
-        <c:axId val="-2145153608"/>
-        <c:axId val="2038036200"/>
+        <c:axId val="2085737208"/>
+        <c:axId val="2086068376"/>
       </c:scatterChart>
       <c:valAx>
-        <c:axId val="-2145153608"/>
+        <c:axId val="2085737208"/>
         <c:scaling>
           <c:orientation val="minMax"/>
           <c:max val="30.0"/>
@@ -498,18 +498,38 @@
             <a:endParaRPr lang="en-US"/>
           </a:p>
         </c:txPr>
-        <c:crossAx val="2038036200"/>
+        <c:crossAx val="2086068376"/>
         <c:crosses val="autoZero"/>
         <c:crossBetween val="midCat"/>
       </c:valAx>
       <c:valAx>
-        <c:axId val="2038036200"/>
+        <c:axId val="2086068376"/>
         <c:scaling>
           <c:orientation val="minMax"/>
         </c:scaling>
         <c:delete val="0"/>
         <c:axPos val="l"/>
         <c:majorGridlines/>
+        <c:title>
+          <c:tx>
+            <c:rich>
+              <a:bodyPr rot="-5400000" vert="horz"/>
+              <a:lstStyle/>
+              <a:p>
+                <a:pPr>
+                  <a:defRPr/>
+                </a:pPr>
+                <a:r>
+                  <a:rPr lang="en-US" sz="2500" dirty="0" smtClean="0"/>
+                  <a:t>Money</a:t>
+                </a:r>
+                <a:endParaRPr lang="en-US" sz="2500" dirty="0"/>
+              </a:p>
+            </c:rich>
+          </c:tx>
+          <c:layout/>
+          <c:overlay val="0"/>
+        </c:title>
         <c:numFmt formatCode="&quot;$&quot;#,##0.00_);[Red]\(&quot;$&quot;#,##0.00\)" sourceLinked="1"/>
         <c:majorTickMark val="out"/>
         <c:minorTickMark val="none"/>
@@ -524,7 +544,7 @@
             <a:endParaRPr lang="en-US"/>
           </a:p>
         </c:txPr>
-        <c:crossAx val="-2145153608"/>
+        <c:crossAx val="2085737208"/>
         <c:crosses val="autoZero"/>
         <c:crossBetween val="midCat"/>
       </c:valAx>
@@ -803,11 +823,11 @@
           <c:showPercent val="0"/>
           <c:showBubbleSize val="0"/>
         </c:dLbls>
-        <c:axId val="2058361832"/>
-        <c:axId val="-2144902392"/>
+        <c:axId val="2084986552"/>
+        <c:axId val="2086234664"/>
       </c:scatterChart>
       <c:valAx>
-        <c:axId val="2058361832"/>
+        <c:axId val="2084986552"/>
         <c:scaling>
           <c:orientation val="minMax"/>
           <c:max val="24.0"/>
@@ -848,19 +868,39 @@
             <a:endParaRPr lang="en-US"/>
           </a:p>
         </c:txPr>
-        <c:crossAx val="-2144902392"/>
+        <c:crossAx val="2086234664"/>
         <c:crosses val="autoZero"/>
         <c:crossBetween val="midCat"/>
         <c:majorUnit val="4.0"/>
       </c:valAx>
       <c:valAx>
-        <c:axId val="-2144902392"/>
+        <c:axId val="2086234664"/>
         <c:scaling>
           <c:orientation val="minMax"/>
         </c:scaling>
         <c:delete val="0"/>
         <c:axPos val="l"/>
         <c:majorGridlines/>
+        <c:title>
+          <c:tx>
+            <c:rich>
+              <a:bodyPr rot="-5400000" vert="horz"/>
+              <a:lstStyle/>
+              <a:p>
+                <a:pPr>
+                  <a:defRPr/>
+                </a:pPr>
+                <a:r>
+                  <a:rPr lang="en-US" sz="2500" dirty="0" smtClean="0"/>
+                  <a:t>Money</a:t>
+                </a:r>
+                <a:endParaRPr lang="en-US" sz="2500" dirty="0"/>
+              </a:p>
+            </c:rich>
+          </c:tx>
+          <c:layout/>
+          <c:overlay val="0"/>
+        </c:title>
         <c:numFmt formatCode="&quot;$&quot;#,##0_);[Red]\(&quot;$&quot;#,##0\)" sourceLinked="1"/>
         <c:majorTickMark val="out"/>
         <c:minorTickMark val="none"/>
@@ -875,7 +915,7 @@
             <a:endParaRPr lang="en-US"/>
           </a:p>
         </c:txPr>
-        <c:crossAx val="2058361832"/>
+        <c:crossAx val="2084986552"/>
         <c:crosses val="autoZero"/>
         <c:crossBetween val="midCat"/>
       </c:valAx>
@@ -1017,11 +1057,11 @@
           <c:showPercent val="0"/>
           <c:showBubbleSize val="0"/>
         </c:dLbls>
-        <c:axId val="2083841640"/>
-        <c:axId val="2084084024"/>
+        <c:axId val="2087880760"/>
+        <c:axId val="2067538888"/>
       </c:scatterChart>
       <c:valAx>
-        <c:axId val="2083841640"/>
+        <c:axId val="2087880760"/>
         <c:scaling>
           <c:orientation val="minMax"/>
         </c:scaling>
@@ -1061,12 +1101,12 @@
             <a:endParaRPr lang="en-US"/>
           </a:p>
         </c:txPr>
-        <c:crossAx val="2084084024"/>
+        <c:crossAx val="2067538888"/>
         <c:crosses val="autoZero"/>
         <c:crossBetween val="midCat"/>
       </c:valAx>
       <c:valAx>
-        <c:axId val="2084084024"/>
+        <c:axId val="2067538888"/>
         <c:scaling>
           <c:orientation val="minMax"/>
         </c:scaling>
@@ -1111,7 +1151,7 @@
             <a:endParaRPr lang="en-US"/>
           </a:p>
         </c:txPr>
-        <c:crossAx val="2083841640"/>
+        <c:crossAx val="2087880760"/>
         <c:crosses val="autoZero"/>
         <c:crossBetween val="midCat"/>
       </c:valAx>
@@ -1176,7 +1216,7 @@
           <c:xMode val="edge"/>
           <c:yMode val="edge"/>
           <c:x val="0.246591414491999"/>
-          <c:y val="8.36462052202499E-5"/>
+          <c:y val="8.364620522025E-5"/>
         </c:manualLayout>
       </c:layout>
       <c:overlay val="0"/>
@@ -1188,8 +1228,8 @@
           <c:layoutTarget val="inner"/>
           <c:xMode val="edge"/>
           <c:yMode val="edge"/>
-          <c:x val="0.101316710411199"/>
-          <c:y val="0.164814814814815"/>
+          <c:x val="0.155842393133904"/>
+          <c:y val="0.121889438754553"/>
           <c:w val="0.67415113735783"/>
           <c:h val="0.696296296296296"/>
         </c:manualLayout>
@@ -1623,11 +1663,11 @@
           <c:showPercent val="0"/>
           <c:showBubbleSize val="0"/>
         </c:dLbls>
-        <c:axId val="2132682920"/>
-        <c:axId val="2132465912"/>
+        <c:axId val="2031022776"/>
+        <c:axId val="2069513400"/>
       </c:scatterChart>
       <c:valAx>
-        <c:axId val="2132682920"/>
+        <c:axId val="2031022776"/>
         <c:scaling>
           <c:orientation val="minMax"/>
         </c:scaling>
@@ -1640,10 +1680,10 @@
               <a:lstStyle/>
               <a:p>
                 <a:pPr>
-                  <a:defRPr/>
+                  <a:defRPr sz="2500"/>
                 </a:pPr>
                 <a:r>
-                  <a:rPr lang="en-US"/>
+                  <a:rPr lang="en-US" sz="2500"/>
                   <a:t>Days</a:t>
                 </a:r>
               </a:p>
@@ -1663,12 +1703,22 @@
         <c:majorTickMark val="out"/>
         <c:minorTickMark val="none"/>
         <c:tickLblPos val="nextTo"/>
-        <c:crossAx val="2132465912"/>
+        <c:txPr>
+          <a:bodyPr/>
+          <a:lstStyle/>
+          <a:p>
+            <a:pPr>
+              <a:defRPr sz="2500"/>
+            </a:pPr>
+            <a:endParaRPr lang="en-US"/>
+          </a:p>
+        </c:txPr>
+        <c:crossAx val="2069513400"/>
         <c:crosses val="autoZero"/>
         <c:crossBetween val="midCat"/>
       </c:valAx>
       <c:valAx>
-        <c:axId val="2132465912"/>
+        <c:axId val="2069513400"/>
         <c:scaling>
           <c:orientation val="minMax"/>
           <c:min val="0.0"/>
@@ -1707,16 +1757,16 @@
                   </a:defRPr>
                 </a:pPr>
                 <a:r>
-                  <a:rPr lang="en-US" sz="2400"/>
+                  <a:rPr lang="en-US" sz="2500" dirty="0"/>
                   <a:t> </a:t>
                 </a:r>
                 <a:r>
-                  <a:rPr lang="en-US" sz="2400" b="1" i="0" baseline="0">
+                  <a:rPr lang="en-US" sz="2500" b="1" i="0" baseline="0" dirty="0">
                     <a:effectLst/>
                   </a:rPr>
                   <a:t>Number of Occurrences</a:t>
                 </a:r>
-                <a:endParaRPr lang="en-US" sz="2400">
+                <a:endParaRPr lang="en-US" sz="2500" dirty="0">
                   <a:effectLst/>
                 </a:endParaRPr>
               </a:p>
@@ -1745,7 +1795,7 @@
                     <a:cs typeface="+mn-cs"/>
                   </a:defRPr>
                 </a:pPr>
-                <a:endParaRPr lang="en-US" sz="2400"/>
+                <a:endParaRPr lang="en-US" sz="2500" dirty="0"/>
               </a:p>
             </c:rich>
           </c:tx>
@@ -1756,7 +1806,17 @@
         <c:majorTickMark val="out"/>
         <c:minorTickMark val="none"/>
         <c:tickLblPos val="nextTo"/>
-        <c:crossAx val="2132682920"/>
+        <c:txPr>
+          <a:bodyPr/>
+          <a:lstStyle/>
+          <a:p>
+            <a:pPr>
+              <a:defRPr sz="2500"/>
+            </a:pPr>
+            <a:endParaRPr lang="en-US"/>
+          </a:p>
+        </c:txPr>
+        <c:crossAx val="2031022776"/>
         <c:crosses val="autoZero"/>
         <c:crossBetween val="midCat"/>
       </c:valAx>
@@ -1888,7 +1948,7 @@
             <a:fld id="{E6CC2317-6751-4CD4-9995-8782DD78E936}" type="datetimeFigureOut">
               <a:rPr lang="en-US" smtClean="0"/>
               <a:pPr/>
-              <a:t>4/28/15</a:t>
+              <a:t>4/29/15</a:t>
             </a:fld>
             <a:endParaRPr lang="en-US" dirty="0"/>
           </a:p>
@@ -4807,7 +4867,7 @@
               <a:graphicData uri="http://schemas.openxmlformats.org/presentationml/2006/ole">
                 <mc:AlternateContent xmlns:mc="http://schemas.openxmlformats.org/markup-compatibility/2006">
                   <mc:Choice xmlns:v="urn:schemas-microsoft-com:vml" Requires="v">
-                    <p:oleObj spid="_x0000_s1460" name="Image" r:id="rId8" imgW="1828440" imgH="1117440" progId="Photoshop.Image.13">
+                    <p:oleObj spid="_x0000_s1465" name="Image" r:id="rId8" imgW="1828440" imgH="1117440" progId="Photoshop.Image.13">
                       <p:embed/>
                     </p:oleObj>
                   </mc:Choice>
@@ -4864,7 +4924,7 @@
               <a:graphicData uri="http://schemas.openxmlformats.org/presentationml/2006/ole">
                 <mc:AlternateContent xmlns:mc="http://schemas.openxmlformats.org/markup-compatibility/2006">
                   <mc:Choice xmlns:v="urn:schemas-microsoft-com:vml" Requires="v">
-                    <p:oleObj spid="_x0000_s1461" name="Image" r:id="rId10" imgW="1828440" imgH="1117440" progId="Photoshop.Image.13">
+                    <p:oleObj spid="_x0000_s1466" name="Image" r:id="rId10" imgW="1828440" imgH="1117440" progId="Photoshop.Image.13">
                       <p:embed/>
                     </p:oleObj>
                   </mc:Choice>
@@ -5992,7 +6052,7 @@
             <a:graphicData uri="http://schemas.openxmlformats.org/presentationml/2006/ole">
               <mc:AlternateContent xmlns:mc="http://schemas.openxmlformats.org/markup-compatibility/2006">
                 <mc:Choice xmlns:v="urn:schemas-microsoft-com:vml" Requires="v">
-                  <p:oleObj spid="_x0000_s1462" name="Image" r:id="rId12" imgW="4571280" imgH="1688760" progId="Photoshop.Image.13">
+                  <p:oleObj spid="_x0000_s1467" name="Image" r:id="rId12" imgW="4571280" imgH="1688760" progId="Photoshop.Image.13">
                     <p:embed/>
                   </p:oleObj>
                 </mc:Choice>
@@ -6076,7 +6136,7 @@
             <a:graphicData uri="http://schemas.openxmlformats.org/presentationml/2006/ole">
               <mc:AlternateContent xmlns:mc="http://schemas.openxmlformats.org/markup-compatibility/2006">
                 <mc:Choice xmlns:v="urn:schemas-microsoft-com:vml" Requires="v">
-                  <p:oleObj spid="_x0000_s1463" name="Image" r:id="rId15" imgW="1574280" imgH="1053720" progId="Photoshop.Image.13">
+                  <p:oleObj spid="_x0000_s1468" name="Image" r:id="rId15" imgW="1574280" imgH="1053720" progId="Photoshop.Image.13">
                     <p:embed/>
                   </p:oleObj>
                 </mc:Choice>
@@ -6924,7 +6984,7 @@
         <p:spPr>
           <a:xfrm>
             <a:off x="11252201" y="6518316"/>
-            <a:ext cx="10302969" cy="13523680"/>
+            <a:ext cx="10302969" cy="13985346"/>
           </a:xfrm>
         </p:spPr>
         <p:txBody>
@@ -6955,8 +7015,13 @@
           <a:p>
             <a:r>
               <a:rPr lang="en-US" dirty="0" smtClean="0"/>
-              <a:t>The people represent the agents in our simulation. Every day people have unique experiences; however, they always follow the circle of life.</a:t>
-            </a:r>
+              <a:t>The people represent the agents in our simulation. Every day people have unique experiences; however, they always follow the circle of life</a:t>
+            </a:r>
+            <a:r>
+              <a:rPr lang="en-US" dirty="0" smtClean="0"/>
+              <a:t>.</a:t>
+            </a:r>
+            <a:endParaRPr lang="en-US" dirty="0" smtClean="0"/>
           </a:p>
           <a:p>
             <a:r>
@@ -7058,7 +7123,7 @@
         </p:nvSpPr>
         <p:spPr>
           <a:xfrm>
-            <a:off x="11224245" y="18176266"/>
+            <a:off x="11224245" y="18539114"/>
             <a:ext cx="21421724" cy="1197243"/>
           </a:xfrm>
         </p:spPr>
@@ -7506,13 +7571,13 @@
           <p:nvPr>
             <p:extLst>
               <p:ext uri="{D42A27DB-BD31-4B8C-83A1-F6EECF244321}">
-                <p14:modId xmlns:p14="http://schemas.microsoft.com/office/powerpoint/2010/main" val="3906368348"/>
+                <p14:modId xmlns:p14="http://schemas.microsoft.com/office/powerpoint/2010/main" val="2812333078"/>
               </p:ext>
             </p:extLst>
           </p:nvPr>
         </p:nvGraphicFramePr>
         <p:xfrm>
-          <a:off x="12180236" y="25679401"/>
+          <a:off x="12180236" y="25578085"/>
           <a:ext cx="9374934" cy="6014862"/>
         </p:xfrm>
         <a:graphic>
@@ -7530,14 +7595,14 @@
           <p:nvPr>
             <p:extLst>
               <p:ext uri="{D42A27DB-BD31-4B8C-83A1-F6EECF244321}">
-                <p14:modId xmlns:p14="http://schemas.microsoft.com/office/powerpoint/2010/main" val="4177211643"/>
+                <p14:modId xmlns:p14="http://schemas.microsoft.com/office/powerpoint/2010/main" val="3978961917"/>
               </p:ext>
             </p:extLst>
           </p:nvPr>
         </p:nvGraphicFramePr>
         <p:xfrm>
-          <a:off x="21878428" y="25679401"/>
-          <a:ext cx="10248386" cy="6014862"/>
+          <a:off x="22471074" y="25578085"/>
+          <a:ext cx="9374935" cy="6014862"/>
         </p:xfrm>
         <a:graphic>
           <a:graphicData uri="http://schemas.openxmlformats.org/drawingml/2006/chart">
@@ -7561,7 +7626,7 @@
         </p:blipFill>
         <p:spPr>
           <a:xfrm>
-            <a:off x="21878428" y="7023539"/>
+            <a:off x="21878428" y="6771903"/>
             <a:ext cx="9486900" cy="5575360"/>
           </a:xfrm>
           <a:prstGeom prst="rect">
@@ -7582,7 +7647,7 @@
         </p:nvSpPr>
         <p:spPr>
           <a:xfrm>
-            <a:off x="24411682" y="6377207"/>
+            <a:off x="24411682" y="6125571"/>
             <a:ext cx="4380225" cy="646331"/>
           </a:xfrm>
           <a:prstGeom prst="rect">
@@ -7639,8 +7704,8 @@
         </p:nvSpPr>
         <p:spPr>
           <a:xfrm>
-            <a:off x="22053078" y="12881596"/>
-            <a:ext cx="9817437" cy="5189112"/>
+            <a:off x="21878428" y="12744052"/>
+            <a:ext cx="10248386" cy="5389168"/>
           </a:xfrm>
           <a:prstGeom prst="rect">
             <a:avLst/>
@@ -7659,10 +7724,16 @@
               </a:spcBef>
             </a:pPr>
             <a:r>
-              <a:rPr lang="en-US" sz="2400" b="1" smtClean="0"/>
+              <a:rPr lang="en-US" sz="2500" b="1" dirty="0" smtClean="0">
+                <a:latin typeface="Trebuchet MS"/>
+                <a:cs typeface="Trebuchet MS"/>
+              </a:rPr>
               <a:t>Residences</a:t>
             </a:r>
-            <a:endParaRPr lang="en-US" sz="2400" b="1" dirty="0"/>
+            <a:endParaRPr lang="en-US" sz="2500" b="1" dirty="0">
+              <a:latin typeface="Trebuchet MS"/>
+              <a:cs typeface="Trebuchet MS"/>
+            </a:endParaRPr>
           </a:p>
           <a:p>
             <a:pPr>
@@ -7671,7 +7742,10 @@
               </a:spcBef>
             </a:pPr>
             <a:r>
-              <a:rPr lang="en-US" sz="2400" dirty="0" smtClean="0"/>
+              <a:rPr lang="en-US" sz="2500" dirty="0" smtClean="0">
+                <a:latin typeface="Trebuchet MS"/>
+                <a:cs typeface="Trebuchet MS"/>
+              </a:rPr>
               <a:t>Residences provide individuals with shelter and serve as the launching point for the days activity.  In this model, the worth of a residence depends on its quality and proximity to high quality businesses.  Residents must pay a mortgage payment based on the net-worth of the property.  If an individual fails to pay the mortgage, they are kicked out of their home until they can repay their debt.  </a:t>
             </a:r>
           </a:p>
@@ -7681,7 +7755,7 @@
                 <a:spcPts val="576"/>
               </a:spcBef>
             </a:pPr>
-            <a:endParaRPr lang="en-US" sz="2400" dirty="0">
+            <a:endParaRPr lang="en-US" sz="2500" dirty="0">
               <a:latin typeface="Trebuchet MS"/>
               <a:cs typeface="Trebuchet MS"/>
             </a:endParaRPr>
@@ -7693,7 +7767,7 @@
               </a:spcBef>
             </a:pPr>
             <a:r>
-              <a:rPr lang="en-US" sz="2400" b="1" dirty="0" smtClean="0">
+              <a:rPr lang="en-US" sz="2500" b="1" dirty="0" smtClean="0">
                 <a:latin typeface="Trebuchet MS"/>
                 <a:cs typeface="Trebuchet MS"/>
               </a:rPr>
@@ -7707,41 +7781,41 @@
               </a:spcBef>
             </a:pPr>
             <a:r>
-              <a:rPr lang="en-US" sz="2400" dirty="0" smtClean="0">
+              <a:rPr lang="en-US" sz="2500" dirty="0" smtClean="0">
                 <a:latin typeface="Trebuchet MS"/>
                 <a:cs typeface="Trebuchet MS"/>
               </a:rPr>
               <a:t>When individuals want to go out and increase their happiness, they go shopping at an </a:t>
             </a:r>
             <a:r>
-              <a:rPr lang="en-US" sz="2400" dirty="0">
+              <a:rPr lang="en-US" sz="2500" dirty="0">
                 <a:latin typeface="Trebuchet MS"/>
                 <a:cs typeface="Trebuchet MS"/>
               </a:rPr>
               <a:t>entertainment establishment. </a:t>
             </a:r>
             <a:r>
-              <a:rPr lang="en-US" sz="2400" dirty="0" smtClean="0">
+              <a:rPr lang="en-US" sz="2500" dirty="0" smtClean="0">
                 <a:latin typeface="Trebuchet MS"/>
                 <a:cs typeface="Trebuchet MS"/>
               </a:rPr>
               <a:t>There are four types: restaurant</a:t>
             </a:r>
             <a:r>
-              <a:rPr lang="en-US" sz="2400" dirty="0">
+              <a:rPr lang="en-US" sz="2500" dirty="0">
                 <a:latin typeface="Trebuchet MS"/>
                 <a:cs typeface="Trebuchet MS"/>
               </a:rPr>
               <a:t>, movie, adult, </a:t>
             </a:r>
             <a:r>
-              <a:rPr lang="en-US" sz="2400" dirty="0" smtClean="0">
+              <a:rPr lang="en-US" sz="2500" dirty="0" smtClean="0">
                 <a:latin typeface="Trebuchet MS"/>
                 <a:cs typeface="Trebuchet MS"/>
               </a:rPr>
               <a:t>games.  Each influences the needs of an individual, and the quality of the store influences the price.  </a:t>
             </a:r>
-            <a:endParaRPr lang="en-US" sz="2400" dirty="0">
+            <a:endParaRPr lang="en-US" sz="2500" dirty="0">
               <a:latin typeface="Trebuchet MS"/>
               <a:cs typeface="Trebuchet MS"/>
             </a:endParaRPr>
@@ -7757,13 +7831,13 @@
           <p:nvPr>
             <p:extLst>
               <p:ext uri="{D42A27DB-BD31-4B8C-83A1-F6EECF244321}">
-                <p14:modId xmlns:p14="http://schemas.microsoft.com/office/powerpoint/2010/main" val="1151962011"/>
+                <p14:modId xmlns:p14="http://schemas.microsoft.com/office/powerpoint/2010/main" val="2254134996"/>
               </p:ext>
             </p:extLst>
           </p:nvPr>
         </p:nvGraphicFramePr>
         <p:xfrm>
-          <a:off x="12180236" y="19931932"/>
+          <a:off x="12180236" y="19829626"/>
           <a:ext cx="9374934" cy="5621373"/>
         </p:xfrm>
         <a:graphic>
@@ -7781,14 +7855,14 @@
           <p:nvPr>
             <p:extLst>
               <p:ext uri="{D42A27DB-BD31-4B8C-83A1-F6EECF244321}">
-                <p14:modId xmlns:p14="http://schemas.microsoft.com/office/powerpoint/2010/main" val="3939212386"/>
+                <p14:modId xmlns:p14="http://schemas.microsoft.com/office/powerpoint/2010/main" val="1620418802"/>
               </p:ext>
             </p:extLst>
           </p:nvPr>
         </p:nvGraphicFramePr>
         <p:xfrm>
-          <a:off x="21878428" y="20041997"/>
-          <a:ext cx="10248386" cy="5511308"/>
+          <a:off x="22471075" y="19830616"/>
+          <a:ext cx="9374934" cy="5621373"/>
         </p:xfrm>
         <a:graphic>
           <a:graphicData uri="http://schemas.openxmlformats.org/drawingml/2006/chart">

</xml_diff>

<commit_message>
Almost done eiditing poster
</commit_message>
<xml_diff>
--- a/Poster.pptx
+++ b/Poster.pptx
@@ -109,7 +109,7 @@
   </p:defaultTextStyle>
   <p:extLst>
     <p:ext uri="{EFAFB233-063F-42B5-8137-9DF3F51BA10A}">
-      <p15:sldGuideLst xmlns:p15="http://schemas.microsoft.com/office/powerpoint/2012/main" xmlns="">
+      <p15:sldGuideLst xmlns="" xmlns:p15="http://schemas.microsoft.com/office/powerpoint/2012/main">
         <p15:guide id="1" orient="horz" pos="3318">
           <p15:clr>
             <a:srgbClr val="A4A3A4"/>
@@ -163,7 +163,7 @@
       </p15:sldGuideLst>
     </p:ext>
     <p:ext uri="{2D200454-40CA-4A62-9FC3-DE9A4176ACB9}">
-      <p15:notesGuideLst xmlns:p15="http://schemas.microsoft.com/office/powerpoint/2012/main" xmlns="">
+      <p15:notesGuideLst xmlns="" xmlns:p15="http://schemas.microsoft.com/office/powerpoint/2012/main">
         <p15:guide id="1" orient="horz" pos="13681">
           <p15:clr>
             <a:srgbClr val="A4A3A4"/>
@@ -453,11 +453,11 @@
           <c:showPercent val="0"/>
           <c:showBubbleSize val="0"/>
         </c:dLbls>
-        <c:axId val="2117389368"/>
-        <c:axId val="2117945448"/>
+        <c:axId val="2082771672"/>
+        <c:axId val="2038187368"/>
       </c:scatterChart>
       <c:valAx>
-        <c:axId val="2117389368"/>
+        <c:axId val="2082771672"/>
         <c:scaling>
           <c:orientation val="minMax"/>
           <c:max val="30.0"/>
@@ -498,12 +498,12 @@
             <a:endParaRPr lang="en-US"/>
           </a:p>
         </c:txPr>
-        <c:crossAx val="2117945448"/>
+        <c:crossAx val="2038187368"/>
         <c:crosses val="autoZero"/>
         <c:crossBetween val="midCat"/>
       </c:valAx>
       <c:valAx>
-        <c:axId val="2117945448"/>
+        <c:axId val="2038187368"/>
         <c:scaling>
           <c:orientation val="minMax"/>
         </c:scaling>
@@ -544,7 +544,7 @@
             <a:endParaRPr lang="en-US"/>
           </a:p>
         </c:txPr>
-        <c:crossAx val="2117389368"/>
+        <c:crossAx val="2082771672"/>
         <c:crosses val="autoZero"/>
         <c:crossBetween val="midCat"/>
       </c:valAx>
@@ -808,11 +808,11 @@
           <c:showPercent val="0"/>
           <c:showBubbleSize val="0"/>
         </c:dLbls>
-        <c:axId val="2115817112"/>
-        <c:axId val="2115870232"/>
+        <c:axId val="2038167544"/>
+        <c:axId val="2037735128"/>
       </c:scatterChart>
       <c:valAx>
-        <c:axId val="2115817112"/>
+        <c:axId val="2038167544"/>
         <c:scaling>
           <c:orientation val="minMax"/>
           <c:max val="24.0"/>
@@ -853,13 +853,13 @@
             <a:endParaRPr lang="en-US"/>
           </a:p>
         </c:txPr>
-        <c:crossAx val="2115870232"/>
+        <c:crossAx val="2037735128"/>
         <c:crosses val="autoZero"/>
         <c:crossBetween val="midCat"/>
         <c:majorUnit val="4.0"/>
       </c:valAx>
       <c:valAx>
-        <c:axId val="2115870232"/>
+        <c:axId val="2037735128"/>
         <c:scaling>
           <c:orientation val="minMax"/>
         </c:scaling>
@@ -900,7 +900,7 @@
             <a:endParaRPr lang="en-US"/>
           </a:p>
         </c:txPr>
-        <c:crossAx val="2115817112"/>
+        <c:crossAx val="2038167544"/>
         <c:crosses val="autoZero"/>
         <c:crossBetween val="midCat"/>
       </c:valAx>
@@ -1027,11 +1027,11 @@
           <c:showPercent val="0"/>
           <c:showBubbleSize val="0"/>
         </c:dLbls>
-        <c:axId val="2115048504"/>
-        <c:axId val="2118036344"/>
+        <c:axId val="2084200568"/>
+        <c:axId val="2086767672"/>
       </c:scatterChart>
       <c:valAx>
-        <c:axId val="2115048504"/>
+        <c:axId val="2084200568"/>
         <c:scaling>
           <c:orientation val="minMax"/>
         </c:scaling>
@@ -1071,12 +1071,12 @@
             <a:endParaRPr lang="en-US"/>
           </a:p>
         </c:txPr>
-        <c:crossAx val="2118036344"/>
+        <c:crossAx val="2086767672"/>
         <c:crosses val="autoZero"/>
         <c:crossBetween val="midCat"/>
       </c:valAx>
       <c:valAx>
-        <c:axId val="2118036344"/>
+        <c:axId val="2086767672"/>
         <c:scaling>
           <c:orientation val="minMax"/>
         </c:scaling>
@@ -1121,7 +1121,7 @@
             <a:endParaRPr lang="en-US"/>
           </a:p>
         </c:txPr>
-        <c:crossAx val="2115048504"/>
+        <c:crossAx val="2084200568"/>
         <c:crosses val="autoZero"/>
         <c:crossBetween val="midCat"/>
       </c:valAx>
@@ -1633,11 +1633,11 @@
           <c:showPercent val="0"/>
           <c:showBubbleSize val="0"/>
         </c:dLbls>
-        <c:axId val="2116088552"/>
-        <c:axId val="2116550056"/>
+        <c:axId val="-2139879128"/>
+        <c:axId val="-2139873608"/>
       </c:scatterChart>
       <c:valAx>
-        <c:axId val="2116088552"/>
+        <c:axId val="-2139879128"/>
         <c:scaling>
           <c:orientation val="minMax"/>
         </c:scaling>
@@ -1683,12 +1683,12 @@
             <a:endParaRPr lang="en-US"/>
           </a:p>
         </c:txPr>
-        <c:crossAx val="2116550056"/>
+        <c:crossAx val="-2139873608"/>
         <c:crosses val="autoZero"/>
         <c:crossBetween val="midCat"/>
       </c:valAx>
       <c:valAx>
-        <c:axId val="2116550056"/>
+        <c:axId val="-2139873608"/>
         <c:scaling>
           <c:orientation val="minMax"/>
           <c:min val="0.0"/>
@@ -1786,7 +1786,7 @@
             <a:endParaRPr lang="en-US"/>
           </a:p>
         </c:txPr>
-        <c:crossAx val="2116088552"/>
+        <c:crossAx val="-2139879128"/>
         <c:crosses val="autoZero"/>
         <c:crossBetween val="midCat"/>
       </c:valAx>
@@ -4837,7 +4837,7 @@
               <a:graphicData uri="http://schemas.openxmlformats.org/presentationml/2006/ole">
                 <mc:AlternateContent xmlns:mc="http://schemas.openxmlformats.org/markup-compatibility/2006">
                   <mc:Choice xmlns:v="urn:schemas-microsoft-com:vml" Requires="v">
-                    <p:oleObj spid="_x0000_s1531" name="Image" r:id="rId8" imgW="1828440" imgH="1117440" progId="Photoshop.Image.13">
+                    <p:oleObj spid="_x0000_s1556" name="Image" r:id="rId8" imgW="1828440" imgH="1117440" progId="Photoshop.Image.13">
                       <p:embed/>
                     </p:oleObj>
                   </mc:Choice>
@@ -4894,7 +4894,7 @@
               <a:graphicData uri="http://schemas.openxmlformats.org/presentationml/2006/ole">
                 <mc:AlternateContent xmlns:mc="http://schemas.openxmlformats.org/markup-compatibility/2006">
                   <mc:Choice xmlns:v="urn:schemas-microsoft-com:vml" Requires="v">
-                    <p:oleObj spid="_x0000_s1532" name="Image" r:id="rId10" imgW="1828440" imgH="1117440" progId="Photoshop.Image.13">
+                    <p:oleObj spid="_x0000_s1557" name="Image" r:id="rId10" imgW="1828440" imgH="1117440" progId="Photoshop.Image.13">
                       <p:embed/>
                     </p:oleObj>
                   </mc:Choice>
@@ -6022,7 +6022,7 @@
             <a:graphicData uri="http://schemas.openxmlformats.org/presentationml/2006/ole">
               <mc:AlternateContent xmlns:mc="http://schemas.openxmlformats.org/markup-compatibility/2006">
                 <mc:Choice xmlns:v="urn:schemas-microsoft-com:vml" Requires="v">
-                  <p:oleObj spid="_x0000_s1533" name="Image" r:id="rId12" imgW="4571280" imgH="1688760" progId="Photoshop.Image.13">
+                  <p:oleObj spid="_x0000_s1558" name="Image" r:id="rId12" imgW="4571280" imgH="1688760" progId="Photoshop.Image.13">
                     <p:embed/>
                   </p:oleObj>
                 </mc:Choice>
@@ -6106,7 +6106,7 @@
             <a:graphicData uri="http://schemas.openxmlformats.org/presentationml/2006/ole">
               <mc:AlternateContent xmlns:mc="http://schemas.openxmlformats.org/markup-compatibility/2006">
                 <mc:Choice xmlns:v="urn:schemas-microsoft-com:vml" Requires="v">
-                  <p:oleObj spid="_x0000_s1534" name="Image" r:id="rId15" imgW="1574280" imgH="1053720" progId="Photoshop.Image.13">
+                  <p:oleObj spid="_x0000_s1559" name="Image" r:id="rId15" imgW="1574280" imgH="1053720" progId="Photoshop.Image.13">
                     <p:embed/>
                   </p:oleObj>
                 </mc:Choice>
@@ -7504,31 +7504,15 @@
             </a:pPr>
             <a:r>
               <a:rPr lang="en-US" dirty="0" smtClean="0"/>
-              <a:t>We chose to show some general highlights of model in the graphs below</a:t>
+              <a:t>We chose to show some general highlights of model in the graphs below. The trends we see make sense both in terms of the model but also </a:t>
             </a:r>
             <a:r>
               <a:rPr lang="en-US" dirty="0" smtClean="0"/>
-              <a:t>. </a:t>
+              <a:t>in terms of reality </a:t>
             </a:r>
             <a:r>
               <a:rPr lang="en-US" dirty="0" smtClean="0"/>
-              <a:t>The trends we see make sense both in terms of the model but also reality itself</a:t>
-            </a:r>
-            <a:r>
-              <a:rPr lang="en-US" dirty="0" smtClean="0"/>
-              <a:t>. </a:t>
-            </a:r>
-            <a:r>
-              <a:rPr lang="en-US" dirty="0" smtClean="0"/>
-              <a:t>In our model, people are paid by their place of work around midday, and they spend money on shopping during the morning and evening. </a:t>
-            </a:r>
-            <a:r>
-              <a:rPr lang="en-US" dirty="0" smtClean="0"/>
-              <a:t>The </a:t>
-            </a:r>
-            <a:r>
-              <a:rPr lang="en-US" dirty="0" smtClean="0"/>
-              <a:t>average money owned by an individual throughout 24 hours reflects this. Further, the average amount of money owned by individuals does ultimately increase over a month, though there is some noise in the process.  Considering the random nature of the transitions, it makes sense that we would see certain dips in money, but given the companies grew over this period, as pictured below, </a:t>
+              <a:t>itself. In our model, people are paid by their place of work around midday, and they spend money on shopping during the morning and evening. The average money owned by an individual throughout 24 hours reflects this. Further, the average amount of money owned by individuals does ultimately increase over a month, though there is some noise in the process.  Considering the random nature of the transitions, it makes sense that we would see certain dips in money, but given the companies grew over this period, as pictured below, </a:t>
             </a:r>
             <a:r>
               <a:rPr lang="en-US" dirty="0"/>
@@ -7536,11 +7520,7 @@
             </a:r>
             <a:r>
               <a:rPr lang="en-US" dirty="0" smtClean="0"/>
-              <a:t>t </a:t>
-            </a:r>
-            <a:r>
-              <a:rPr lang="en-US" dirty="0" smtClean="0"/>
-              <a:t>makes sense that the individuals ultimately became richer.  </a:t>
+              <a:t>t makes sense that the individuals ultimately became richer.  </a:t>
             </a:r>
           </a:p>
           <a:p>
@@ -7559,21 +7539,40 @@
             </a:pPr>
             <a:r>
               <a:rPr lang="en-US" dirty="0" smtClean="0"/>
-              <a:t>The graph showing the steady rise in business productivity was shown given a reasonable ratio of businesses to </a:t>
+              <a:t>The graph showing the steady rise in business productivity was </a:t>
             </a:r>
             <a:r>
               <a:rPr lang="en-US" dirty="0" smtClean="0"/>
-              <a:t>people. When </a:t>
+              <a:t>generated given </a:t>
             </a:r>
             <a:r>
               <a:rPr lang="en-US" dirty="0" smtClean="0"/>
-              <a:t>only a few companies exist, only the skilled individuals do well.  The rest suffer as they can’t find a </a:t>
+              <a:t>a reasonable ratio of businesses to people. When only a few companies exist, only the skilled individuals </a:t>
+            </a:r>
+            <a:r>
+              <a:rPr lang="en-US" dirty="0" smtClean="0"/>
+              <a:t>did </a:t>
+            </a:r>
+            <a:r>
+              <a:rPr lang="en-US" dirty="0" smtClean="0"/>
+              <a:t>well.  The rest </a:t>
+            </a:r>
+            <a:r>
+              <a:rPr lang="en-US" dirty="0" smtClean="0"/>
+              <a:t>suffered </a:t>
+            </a:r>
+            <a:r>
+              <a:rPr lang="en-US" dirty="0" smtClean="0"/>
+              <a:t>as they </a:t>
+            </a:r>
+            <a:r>
+              <a:rPr lang="en-US" dirty="0" smtClean="0"/>
+              <a:t>could not find </a:t>
             </a:r>
             <a:r>
               <a:rPr lang="en-US" dirty="0" smtClean="0"/>
               <a:t>jobs. </a:t>
             </a:r>
-            <a:endParaRPr lang="en-US" dirty="0" smtClean="0"/>
           </a:p>
           <a:p>
             <a:pPr>
@@ -7591,37 +7590,8 @@
             </a:pPr>
             <a:r>
               <a:rPr lang="en-US" dirty="0" smtClean="0"/>
-              <a:t>Another set of experiments showed the number of deaths versus the number of </a:t>
-            </a:r>
-            <a:r>
-              <a:rPr lang="en-US" dirty="0" smtClean="0"/>
-              <a:t>births.  </a:t>
-            </a:r>
-            <a:r>
-              <a:rPr lang="en-US" dirty="0" smtClean="0"/>
-              <a:t>We see that the number of </a:t>
-            </a:r>
-            <a:r>
-              <a:rPr lang="en-US" dirty="0" smtClean="0"/>
-              <a:t>babies born </a:t>
-            </a:r>
-            <a:r>
-              <a:rPr lang="en-US" dirty="0" smtClean="0"/>
-              <a:t>outweighs the number of people who </a:t>
-            </a:r>
-            <a:r>
-              <a:rPr lang="en-US" dirty="0" smtClean="0"/>
-              <a:t>die.  </a:t>
-            </a:r>
-            <a:r>
-              <a:rPr lang="en-US" dirty="0" smtClean="0"/>
-              <a:t>Given that people make money over the course of the month while businesses expand, it follows that their happiness increases.  Given that the chance of producing a child depends on the good health of a person, it follows that many children would be </a:t>
-            </a:r>
-            <a:r>
-              <a:rPr lang="en-US" dirty="0" smtClean="0"/>
-              <a:t>born.</a:t>
-            </a:r>
-            <a:endParaRPr lang="en-US" dirty="0" smtClean="0"/>
+              <a:t>Another set of experiments showed the number of deaths versus the number of births.  We see that the number of babies born outweighs the number of people who die.  Given that people make money over the course of the month while businesses expand, it follows that their happiness increases.  Given that the chance of producing a child depends on the good health of a person, it follows that many children would be born.</a:t>
+            </a:r>
           </a:p>
           <a:p>
             <a:pPr>
@@ -7639,55 +7609,15 @@
             </a:pPr>
             <a:r>
               <a:rPr lang="en-US" dirty="0" smtClean="0"/>
-              <a:t>Overall, this model only broke the surface in terms of modeling the complex dynamics of a city.  Several things could be done to expand the model</a:t>
+              <a:t>Overall, this model only broke the surface in terms of modeling the complex dynamics of a city.  Several things could be done to expand the model. Namely, the dynamics of businesses and entertainment stores could be improved by creating a market that other businesses and consumers would be apart of. This would better represent how people and businesses actually operate.  The residence model could also be expanded by allowing individuals to renovate their homes or buy a new </a:t>
             </a:r>
             <a:r>
               <a:rPr lang="en-US" dirty="0" smtClean="0"/>
-              <a:t>. </a:t>
+              <a:t>home </a:t>
             </a:r>
             <a:r>
               <a:rPr lang="en-US" dirty="0" smtClean="0"/>
-              <a:t>Namely, the dynamics of businesses and entertainment stores could be improved by creating a market that other businesses and consumers would be apart of. </a:t>
-            </a:r>
-            <a:r>
-              <a:rPr lang="en-US" dirty="0" smtClean="0"/>
-              <a:t>This </a:t>
-            </a:r>
-            <a:r>
-              <a:rPr lang="en-US" dirty="0" smtClean="0"/>
-              <a:t>would better </a:t>
-            </a:r>
-            <a:r>
-              <a:rPr lang="en-US" dirty="0" smtClean="0"/>
-              <a:t>represent how </a:t>
-            </a:r>
-            <a:r>
-              <a:rPr lang="en-US" dirty="0" smtClean="0"/>
-              <a:t>people and businesses actually operate.  The residence model could also be expanded by allowing individuals to renovate their </a:t>
-            </a:r>
-            <a:r>
-              <a:rPr lang="en-US" dirty="0" smtClean="0"/>
-              <a:t>homes </a:t>
-            </a:r>
-            <a:r>
-              <a:rPr lang="en-US" dirty="0" smtClean="0"/>
-              <a:t>or buy a new </a:t>
-            </a:r>
-            <a:r>
-              <a:rPr lang="en-US" dirty="0" smtClean="0"/>
-              <a:t>homes altogether</a:t>
-            </a:r>
-            <a:r>
-              <a:rPr lang="en-US" dirty="0" smtClean="0"/>
-              <a:t>. </a:t>
-            </a:r>
-            <a:r>
-              <a:rPr lang="en-US" dirty="0" smtClean="0"/>
-              <a:t>The </a:t>
-            </a:r>
-            <a:r>
-              <a:rPr lang="en-US" dirty="0" smtClean="0"/>
-              <a:t>needs of individuals could also be made more robust, and the spending models could be refined by tying their actions even more closely to their basic needs.  </a:t>
+              <a:t>altogether. The needs of individuals could also be made more robust, and the spending models could be refined by tying their actions even more closely to their basic needs.  </a:t>
             </a:r>
             <a:endParaRPr lang="en-US" dirty="0"/>
           </a:p>

</xml_diff>

<commit_message>
Make state machchine bigger
</commit_message>
<xml_diff>
--- a/Poster.pptx
+++ b/Poster.pptx
@@ -109,7 +109,7 @@
   </p:defaultTextStyle>
   <p:extLst>
     <p:ext uri="{EFAFB233-063F-42B5-8137-9DF3F51BA10A}">
-      <p15:sldGuideLst xmlns="" xmlns:p15="http://schemas.microsoft.com/office/powerpoint/2012/main">
+      <p15:sldGuideLst xmlns:p15="http://schemas.microsoft.com/office/powerpoint/2012/main" xmlns="">
         <p15:guide id="1" orient="horz" pos="3318">
           <p15:clr>
             <a:srgbClr val="A4A3A4"/>
@@ -163,7 +163,7 @@
       </p15:sldGuideLst>
     </p:ext>
     <p:ext uri="{2D200454-40CA-4A62-9FC3-DE9A4176ACB9}">
-      <p15:notesGuideLst xmlns="" xmlns:p15="http://schemas.microsoft.com/office/powerpoint/2012/main">
+      <p15:notesGuideLst xmlns:p15="http://schemas.microsoft.com/office/powerpoint/2012/main" xmlns="">
         <p15:guide id="1" orient="horz" pos="13681">
           <p15:clr>
             <a:srgbClr val="A4A3A4"/>
@@ -453,11 +453,11 @@
           <c:showPercent val="0"/>
           <c:showBubbleSize val="0"/>
         </c:dLbls>
-        <c:axId val="2082771672"/>
-        <c:axId val="2038187368"/>
+        <c:axId val="2031104328"/>
+        <c:axId val="2070740440"/>
       </c:scatterChart>
       <c:valAx>
-        <c:axId val="2082771672"/>
+        <c:axId val="2031104328"/>
         <c:scaling>
           <c:orientation val="minMax"/>
           <c:max val="30.0"/>
@@ -498,12 +498,12 @@
             <a:endParaRPr lang="en-US"/>
           </a:p>
         </c:txPr>
-        <c:crossAx val="2038187368"/>
+        <c:crossAx val="2070740440"/>
         <c:crosses val="autoZero"/>
         <c:crossBetween val="midCat"/>
       </c:valAx>
       <c:valAx>
-        <c:axId val="2038187368"/>
+        <c:axId val="2070740440"/>
         <c:scaling>
           <c:orientation val="minMax"/>
         </c:scaling>
@@ -544,7 +544,7 @@
             <a:endParaRPr lang="en-US"/>
           </a:p>
         </c:txPr>
-        <c:crossAx val="2082771672"/>
+        <c:crossAx val="2031104328"/>
         <c:crosses val="autoZero"/>
         <c:crossBetween val="midCat"/>
       </c:valAx>
@@ -808,11 +808,11 @@
           <c:showPercent val="0"/>
           <c:showBubbleSize val="0"/>
         </c:dLbls>
-        <c:axId val="2038167544"/>
-        <c:axId val="2037735128"/>
+        <c:axId val="2070628296"/>
+        <c:axId val="2063658632"/>
       </c:scatterChart>
       <c:valAx>
-        <c:axId val="2038167544"/>
+        <c:axId val="2070628296"/>
         <c:scaling>
           <c:orientation val="minMax"/>
           <c:max val="24.0"/>
@@ -853,13 +853,13 @@
             <a:endParaRPr lang="en-US"/>
           </a:p>
         </c:txPr>
-        <c:crossAx val="2037735128"/>
+        <c:crossAx val="2063658632"/>
         <c:crosses val="autoZero"/>
         <c:crossBetween val="midCat"/>
         <c:majorUnit val="4.0"/>
       </c:valAx>
       <c:valAx>
-        <c:axId val="2037735128"/>
+        <c:axId val="2063658632"/>
         <c:scaling>
           <c:orientation val="minMax"/>
         </c:scaling>
@@ -900,7 +900,7 @@
             <a:endParaRPr lang="en-US"/>
           </a:p>
         </c:txPr>
-        <c:crossAx val="2038167544"/>
+        <c:crossAx val="2070628296"/>
         <c:crosses val="autoZero"/>
         <c:crossBetween val="midCat"/>
       </c:valAx>
@@ -1027,11 +1027,11 @@
           <c:showPercent val="0"/>
           <c:showBubbleSize val="0"/>
         </c:dLbls>
-        <c:axId val="2084200568"/>
-        <c:axId val="2086767672"/>
+        <c:axId val="2069977160"/>
+        <c:axId val="2070567016"/>
       </c:scatterChart>
       <c:valAx>
-        <c:axId val="2084200568"/>
+        <c:axId val="2069977160"/>
         <c:scaling>
           <c:orientation val="minMax"/>
         </c:scaling>
@@ -1071,12 +1071,12 @@
             <a:endParaRPr lang="en-US"/>
           </a:p>
         </c:txPr>
-        <c:crossAx val="2086767672"/>
+        <c:crossAx val="2070567016"/>
         <c:crosses val="autoZero"/>
         <c:crossBetween val="midCat"/>
       </c:valAx>
       <c:valAx>
-        <c:axId val="2086767672"/>
+        <c:axId val="2070567016"/>
         <c:scaling>
           <c:orientation val="minMax"/>
         </c:scaling>
@@ -1121,7 +1121,7 @@
             <a:endParaRPr lang="en-US"/>
           </a:p>
         </c:txPr>
-        <c:crossAx val="2084200568"/>
+        <c:crossAx val="2069977160"/>
         <c:crosses val="autoZero"/>
         <c:crossBetween val="midCat"/>
       </c:valAx>
@@ -1633,11 +1633,11 @@
           <c:showPercent val="0"/>
           <c:showBubbleSize val="0"/>
         </c:dLbls>
-        <c:axId val="-2139879128"/>
-        <c:axId val="-2139873608"/>
+        <c:axId val="2136430984"/>
+        <c:axId val="2136436456"/>
       </c:scatterChart>
       <c:valAx>
-        <c:axId val="-2139879128"/>
+        <c:axId val="2136430984"/>
         <c:scaling>
           <c:orientation val="minMax"/>
         </c:scaling>
@@ -1683,12 +1683,12 @@
             <a:endParaRPr lang="en-US"/>
           </a:p>
         </c:txPr>
-        <c:crossAx val="-2139873608"/>
+        <c:crossAx val="2136436456"/>
         <c:crosses val="autoZero"/>
         <c:crossBetween val="midCat"/>
       </c:valAx>
       <c:valAx>
-        <c:axId val="-2139873608"/>
+        <c:axId val="2136436456"/>
         <c:scaling>
           <c:orientation val="minMax"/>
           <c:min val="0.0"/>
@@ -1786,7 +1786,7 @@
             <a:endParaRPr lang="en-US"/>
           </a:p>
         </c:txPr>
-        <c:crossAx val="-2139879128"/>
+        <c:crossAx val="2136430984"/>
         <c:crosses val="autoZero"/>
         <c:crossBetween val="midCat"/>
       </c:valAx>
@@ -4837,7 +4837,7 @@
               <a:graphicData uri="http://schemas.openxmlformats.org/presentationml/2006/ole">
                 <mc:AlternateContent xmlns:mc="http://schemas.openxmlformats.org/markup-compatibility/2006">
                   <mc:Choice xmlns:v="urn:schemas-microsoft-com:vml" Requires="v">
-                    <p:oleObj spid="_x0000_s1556" name="Image" r:id="rId8" imgW="1828440" imgH="1117440" progId="Photoshop.Image.13">
+                    <p:oleObj spid="_x0000_s1561" name="Image" r:id="rId8" imgW="1828440" imgH="1117440" progId="Photoshop.Image.13">
                       <p:embed/>
                     </p:oleObj>
                   </mc:Choice>
@@ -4894,7 +4894,7 @@
               <a:graphicData uri="http://schemas.openxmlformats.org/presentationml/2006/ole">
                 <mc:AlternateContent xmlns:mc="http://schemas.openxmlformats.org/markup-compatibility/2006">
                   <mc:Choice xmlns:v="urn:schemas-microsoft-com:vml" Requires="v">
-                    <p:oleObj spid="_x0000_s1557" name="Image" r:id="rId10" imgW="1828440" imgH="1117440" progId="Photoshop.Image.13">
+                    <p:oleObj spid="_x0000_s1562" name="Image" r:id="rId10" imgW="1828440" imgH="1117440" progId="Photoshop.Image.13">
                       <p:embed/>
                     </p:oleObj>
                   </mc:Choice>
@@ -6022,7 +6022,7 @@
             <a:graphicData uri="http://schemas.openxmlformats.org/presentationml/2006/ole">
               <mc:AlternateContent xmlns:mc="http://schemas.openxmlformats.org/markup-compatibility/2006">
                 <mc:Choice xmlns:v="urn:schemas-microsoft-com:vml" Requires="v">
-                  <p:oleObj spid="_x0000_s1558" name="Image" r:id="rId12" imgW="4571280" imgH="1688760" progId="Photoshop.Image.13">
+                  <p:oleObj spid="_x0000_s1563" name="Image" r:id="rId12" imgW="4571280" imgH="1688760" progId="Photoshop.Image.13">
                     <p:embed/>
                   </p:oleObj>
                 </mc:Choice>
@@ -6106,7 +6106,7 @@
             <a:graphicData uri="http://schemas.openxmlformats.org/presentationml/2006/ole">
               <mc:AlternateContent xmlns:mc="http://schemas.openxmlformats.org/markup-compatibility/2006">
                 <mc:Choice xmlns:v="urn:schemas-microsoft-com:vml" Requires="v">
-                  <p:oleObj spid="_x0000_s1559" name="Image" r:id="rId15" imgW="1574280" imgH="1053720" progId="Photoshop.Image.13">
+                  <p:oleObj spid="_x0000_s1564" name="Image" r:id="rId15" imgW="1574280" imgH="1053720" progId="Photoshop.Image.13">
                     <p:embed/>
                   </p:oleObj>
                 </mc:Choice>
@@ -7242,66 +7242,6 @@
           </a:graphicData>
         </a:graphic>
       </p:graphicFrame>
-      <p:pic>
-        <p:nvPicPr>
-          <p:cNvPr id="18" name="Picture 17"/>
-          <p:cNvPicPr>
-            <a:picLocks noChangeAspect="1"/>
-          </p:cNvPicPr>
-          <p:nvPr/>
-        </p:nvPicPr>
-        <p:blipFill>
-          <a:blip r:embed="rId5"/>
-          <a:stretch>
-            <a:fillRect/>
-          </a:stretch>
-        </p:blipFill>
-        <p:spPr>
-          <a:xfrm>
-            <a:off x="21878428" y="6448736"/>
-            <a:ext cx="9486900" cy="5575360"/>
-          </a:xfrm>
-          <a:prstGeom prst="rect">
-            <a:avLst/>
-          </a:prstGeom>
-          <a:ln>
-            <a:solidFill>
-              <a:srgbClr val="2C556E"/>
-            </a:solidFill>
-          </a:ln>
-        </p:spPr>
-      </p:pic>
-      <p:sp>
-        <p:nvSpPr>
-          <p:cNvPr id="22" name="TextBox 21"/>
-          <p:cNvSpPr txBox="1"/>
-          <p:nvPr/>
-        </p:nvSpPr>
-        <p:spPr>
-          <a:xfrm>
-            <a:off x="24411682" y="5802405"/>
-            <a:ext cx="4380225" cy="646331"/>
-          </a:xfrm>
-          <a:prstGeom prst="rect">
-            <a:avLst/>
-          </a:prstGeom>
-          <a:noFill/>
-        </p:spPr>
-        <p:txBody>
-          <a:bodyPr wrap="none" rtlCol="0">
-            <a:spAutoFit/>
-          </a:bodyPr>
-          <a:lstStyle/>
-          <a:p>
-            <a:pPr algn="ctr"/>
-            <a:r>
-              <a:rPr lang="en-US" sz="3600" b="1" dirty="0" smtClean="0"/>
-              <a:t>Person State Machine</a:t>
-            </a:r>
-            <a:endParaRPr lang="en-US" sz="3600" b="1" dirty="0"/>
-          </a:p>
-        </p:txBody>
-      </p:sp>
       <p:sp>
         <p:nvSpPr>
           <p:cNvPr id="4" name="TextBox 3"/>
@@ -7325,107 +7265,6 @@
           <a:lstStyle/>
           <a:p>
             <a:endParaRPr lang="en-US" dirty="0"/>
-          </a:p>
-        </p:txBody>
-      </p:sp>
-      <p:sp>
-        <p:nvSpPr>
-          <p:cNvPr id="25" name="TextBox 24"/>
-          <p:cNvSpPr txBox="1"/>
-          <p:nvPr/>
-        </p:nvSpPr>
-        <p:spPr>
-          <a:xfrm>
-            <a:off x="21878428" y="12453623"/>
-            <a:ext cx="10248386" cy="6232475"/>
-          </a:xfrm>
-          <a:prstGeom prst="rect">
-            <a:avLst/>
-          </a:prstGeom>
-          <a:noFill/>
-        </p:spPr>
-        <p:txBody>
-          <a:bodyPr wrap="square" rtlCol="0">
-            <a:spAutoFit/>
-          </a:bodyPr>
-          <a:lstStyle/>
-          <a:p>
-            <a:pPr>
-              <a:spcBef>
-                <a:spcPts val="576"/>
-              </a:spcBef>
-            </a:pPr>
-            <a:r>
-              <a:rPr lang="en-US" sz="2500" b="1" dirty="0" smtClean="0">
-                <a:latin typeface="Trebuchet MS"/>
-                <a:cs typeface="Trebuchet MS"/>
-              </a:rPr>
-              <a:t>Residences</a:t>
-            </a:r>
-          </a:p>
-          <a:p>
-            <a:pPr>
-              <a:spcBef>
-                <a:spcPts val="576"/>
-              </a:spcBef>
-            </a:pPr>
-            <a:r>
-              <a:rPr lang="en-US" sz="2500" dirty="0" smtClean="0">
-                <a:latin typeface="Trebuchet MS"/>
-                <a:cs typeface="Trebuchet MS"/>
-              </a:rPr>
-              <a:t>Residences provide individuals with shelter and serve as the launching point for the days activities.  In this model, the worth of a residence depends on its quality and proximity to high quality businesses.  Residents must pay a mortgage payment based on the net-worth of the property.  If an individual fails to pay the mortgage, they are locked out of their home until they can repay their debt.  </a:t>
-            </a:r>
-          </a:p>
-          <a:p>
-            <a:pPr>
-              <a:spcBef>
-                <a:spcPts val="576"/>
-              </a:spcBef>
-            </a:pPr>
-            <a:endParaRPr lang="en-US" sz="2500" dirty="0" smtClean="0">
-              <a:latin typeface="Trebuchet MS"/>
-              <a:cs typeface="Trebuchet MS"/>
-            </a:endParaRPr>
-          </a:p>
-          <a:p>
-            <a:pPr>
-              <a:spcBef>
-                <a:spcPts val="576"/>
-              </a:spcBef>
-            </a:pPr>
-            <a:r>
-              <a:rPr lang="en-US" sz="2500" b="1" dirty="0" smtClean="0">
-                <a:latin typeface="Trebuchet MS"/>
-                <a:cs typeface="Trebuchet MS"/>
-              </a:rPr>
-              <a:t>Entertainment </a:t>
-            </a:r>
-          </a:p>
-          <a:p>
-            <a:pPr>
-              <a:spcBef>
-                <a:spcPts val="576"/>
-              </a:spcBef>
-            </a:pPr>
-            <a:r>
-              <a:rPr lang="en-US" sz="2500" dirty="0" smtClean="0">
-                <a:latin typeface="Trebuchet MS"/>
-                <a:cs typeface="Trebuchet MS"/>
-              </a:rPr>
-              <a:t>When individuals want to go out and increase their happiness, they go shopping at an entertainment establishment. There are four types: restaurant, movie, adult, games.  Each type satisfies the needs of an individual differently, and the quality of the store influences the price.  </a:t>
-            </a:r>
-          </a:p>
-          <a:p>
-            <a:pPr>
-              <a:spcBef>
-                <a:spcPts val="576"/>
-              </a:spcBef>
-            </a:pPr>
-            <a:endParaRPr lang="en-US" sz="2500" dirty="0">
-              <a:latin typeface="Trebuchet MS"/>
-              <a:cs typeface="Trebuchet MS"/>
-            </a:endParaRPr>
           </a:p>
         </p:txBody>
       </p:sp>
@@ -7449,7 +7288,7 @@
         </p:xfrm>
         <a:graphic>
           <a:graphicData uri="http://schemas.openxmlformats.org/drawingml/2006/chart">
-            <c:chart xmlns:c="http://schemas.openxmlformats.org/drawingml/2006/chart" xmlns:r="http://schemas.openxmlformats.org/officeDocument/2006/relationships" r:id="rId6"/>
+            <c:chart xmlns:c="http://schemas.openxmlformats.org/drawingml/2006/chart" xmlns:r="http://schemas.openxmlformats.org/officeDocument/2006/relationships" r:id="rId5"/>
           </a:graphicData>
         </a:graphic>
       </p:graphicFrame>
@@ -7473,7 +7312,7 @@
         </p:xfrm>
         <a:graphic>
           <a:graphicData uri="http://schemas.openxmlformats.org/drawingml/2006/chart">
-            <c:chart xmlns:c="http://schemas.openxmlformats.org/drawingml/2006/chart" xmlns:r="http://schemas.openxmlformats.org/officeDocument/2006/relationships" r:id="rId7"/>
+            <c:chart xmlns:c="http://schemas.openxmlformats.org/drawingml/2006/chart" xmlns:r="http://schemas.openxmlformats.org/officeDocument/2006/relationships" r:id="rId6"/>
           </a:graphicData>
         </a:graphic>
       </p:graphicFrame>
@@ -7504,15 +7343,7 @@
             </a:pPr>
             <a:r>
               <a:rPr lang="en-US" dirty="0" smtClean="0"/>
-              <a:t>We chose to show some general highlights of model in the graphs below. The trends we see make sense both in terms of the model but also </a:t>
-            </a:r>
-            <a:r>
-              <a:rPr lang="en-US" dirty="0" smtClean="0"/>
-              <a:t>in terms of reality </a:t>
-            </a:r>
-            <a:r>
-              <a:rPr lang="en-US" dirty="0" smtClean="0"/>
-              <a:t>itself. In our model, people are paid by their place of work around midday, and they spend money on shopping during the morning and evening. The average money owned by an individual throughout 24 hours reflects this. Further, the average amount of money owned by individuals does ultimately increase over a month, though there is some noise in the process.  Considering the random nature of the transitions, it makes sense that we would see certain dips in money, but given the companies grew over this period, as pictured below, </a:t>
+              <a:t>We chose to show some general highlights of model in the graphs below. The trends we see make sense both in terms of the model but also in terms of reality itself. In our model, people are paid by their place of work around midday, and they spend money on shopping during the morning and evening. The average money owned by an individual throughout 24 hours reflects this. Further, the average amount of money owned by individuals does ultimately increase over a month, though there is some noise in the process.  Considering the random nature of the transitions, it makes sense that we would see certain dips in money, but given the companies grew over this period, as pictured below, </a:t>
             </a:r>
             <a:r>
               <a:rPr lang="en-US" dirty="0"/>
@@ -7539,39 +7370,7 @@
             </a:pPr>
             <a:r>
               <a:rPr lang="en-US" dirty="0" smtClean="0"/>
-              <a:t>The graph showing the steady rise in business productivity was </a:t>
-            </a:r>
-            <a:r>
-              <a:rPr lang="en-US" dirty="0" smtClean="0"/>
-              <a:t>generated given </a:t>
-            </a:r>
-            <a:r>
-              <a:rPr lang="en-US" dirty="0" smtClean="0"/>
-              <a:t>a reasonable ratio of businesses to people. When only a few companies exist, only the skilled individuals </a:t>
-            </a:r>
-            <a:r>
-              <a:rPr lang="en-US" dirty="0" smtClean="0"/>
-              <a:t>did </a:t>
-            </a:r>
-            <a:r>
-              <a:rPr lang="en-US" dirty="0" smtClean="0"/>
-              <a:t>well.  The rest </a:t>
-            </a:r>
-            <a:r>
-              <a:rPr lang="en-US" dirty="0" smtClean="0"/>
-              <a:t>suffered </a:t>
-            </a:r>
-            <a:r>
-              <a:rPr lang="en-US" dirty="0" smtClean="0"/>
-              <a:t>as they </a:t>
-            </a:r>
-            <a:r>
-              <a:rPr lang="en-US" dirty="0" smtClean="0"/>
-              <a:t>could not find </a:t>
-            </a:r>
-            <a:r>
-              <a:rPr lang="en-US" dirty="0" smtClean="0"/>
-              <a:t>jobs. </a:t>
+              <a:t>The graph showing the steady rise in business productivity was generated given a reasonable ratio of businesses to people. When only a few companies exist, only the skilled individuals did well.  The rest suffered as they could not find jobs. </a:t>
             </a:r>
           </a:p>
           <a:p>
@@ -7609,15 +7408,7 @@
             </a:pPr>
             <a:r>
               <a:rPr lang="en-US" dirty="0" smtClean="0"/>
-              <a:t>Overall, this model only broke the surface in terms of modeling the complex dynamics of a city.  Several things could be done to expand the model. Namely, the dynamics of businesses and entertainment stores could be improved by creating a market that other businesses and consumers would be apart of. This would better represent how people and businesses actually operate.  The residence model could also be expanded by allowing individuals to renovate their homes or buy a new </a:t>
-            </a:r>
-            <a:r>
-              <a:rPr lang="en-US" dirty="0" smtClean="0"/>
-              <a:t>home </a:t>
-            </a:r>
-            <a:r>
-              <a:rPr lang="en-US" dirty="0" smtClean="0"/>
-              <a:t>altogether. The needs of individuals could also be made more robust, and the spending models could be refined by tying their actions even more closely to their basic needs.  </a:t>
+              <a:t>Overall, this model only broke the surface in terms of modeling the complex dynamics of a city.  Several things could be done to expand the model. Namely, the dynamics of businesses and entertainment stores could be improved by creating a market that other businesses and consumers would be apart of. This would better represent how people and businesses actually operate.  The residence model could also be expanded by allowing individuals to renovate their homes or buy a new home altogether. The needs of individuals could also be made more robust, and the spending models could be refined by tying their actions even more closely to their basic needs.  </a:t>
             </a:r>
             <a:endParaRPr lang="en-US" dirty="0"/>
           </a:p>
@@ -7741,6 +7532,167 @@
           </a:p>
           <a:p>
             <a:endParaRPr lang="en-US" b="1" dirty="0"/>
+          </a:p>
+        </p:txBody>
+      </p:sp>
+      <p:pic>
+        <p:nvPicPr>
+          <p:cNvPr id="24" name="Picture 23"/>
+          <p:cNvPicPr>
+            <a:picLocks noChangeAspect="1"/>
+          </p:cNvPicPr>
+          <p:nvPr/>
+        </p:nvPicPr>
+        <p:blipFill>
+          <a:blip r:embed="rId7"/>
+          <a:stretch>
+            <a:fillRect/>
+          </a:stretch>
+        </p:blipFill>
+        <p:spPr>
+          <a:xfrm>
+            <a:off x="21878428" y="6448736"/>
+            <a:ext cx="10248386" cy="6022878"/>
+          </a:xfrm>
+          <a:prstGeom prst="rect">
+            <a:avLst/>
+          </a:prstGeom>
+          <a:ln>
+            <a:solidFill>
+              <a:srgbClr val="2C556E"/>
+            </a:solidFill>
+          </a:ln>
+        </p:spPr>
+      </p:pic>
+      <p:sp>
+        <p:nvSpPr>
+          <p:cNvPr id="27" name="TextBox 26"/>
+          <p:cNvSpPr txBox="1"/>
+          <p:nvPr/>
+        </p:nvSpPr>
+        <p:spPr>
+          <a:xfrm>
+            <a:off x="24783379" y="5802405"/>
+            <a:ext cx="4380225" cy="646331"/>
+          </a:xfrm>
+          <a:prstGeom prst="rect">
+            <a:avLst/>
+          </a:prstGeom>
+          <a:noFill/>
+        </p:spPr>
+        <p:txBody>
+          <a:bodyPr wrap="none" rtlCol="0">
+            <a:spAutoFit/>
+          </a:bodyPr>
+          <a:lstStyle/>
+          <a:p>
+            <a:pPr algn="ctr"/>
+            <a:r>
+              <a:rPr lang="en-US" sz="3600" b="1" dirty="0" smtClean="0"/>
+              <a:t>Person State Machine</a:t>
+            </a:r>
+            <a:endParaRPr lang="en-US" sz="3600" b="1" dirty="0"/>
+          </a:p>
+        </p:txBody>
+      </p:sp>
+      <p:sp>
+        <p:nvSpPr>
+          <p:cNvPr id="29" name="TextBox 28"/>
+          <p:cNvSpPr txBox="1"/>
+          <p:nvPr/>
+        </p:nvSpPr>
+        <p:spPr>
+          <a:xfrm>
+            <a:off x="21878428" y="12732395"/>
+            <a:ext cx="10248386" cy="6232475"/>
+          </a:xfrm>
+          <a:prstGeom prst="rect">
+            <a:avLst/>
+          </a:prstGeom>
+          <a:noFill/>
+        </p:spPr>
+        <p:txBody>
+          <a:bodyPr wrap="square" rtlCol="0">
+            <a:spAutoFit/>
+          </a:bodyPr>
+          <a:lstStyle/>
+          <a:p>
+            <a:pPr>
+              <a:spcBef>
+                <a:spcPts val="576"/>
+              </a:spcBef>
+            </a:pPr>
+            <a:r>
+              <a:rPr lang="en-US" sz="2500" b="1" dirty="0" smtClean="0">
+                <a:latin typeface="Trebuchet MS"/>
+                <a:cs typeface="Trebuchet MS"/>
+              </a:rPr>
+              <a:t>Residences</a:t>
+            </a:r>
+          </a:p>
+          <a:p>
+            <a:pPr>
+              <a:spcBef>
+                <a:spcPts val="576"/>
+              </a:spcBef>
+            </a:pPr>
+            <a:r>
+              <a:rPr lang="en-US" sz="2500" dirty="0" smtClean="0">
+                <a:latin typeface="Trebuchet MS"/>
+                <a:cs typeface="Trebuchet MS"/>
+              </a:rPr>
+              <a:t>Residences provide individuals with shelter and serve as the launching point for the days activities.  In this model, the worth of a residence depends on its quality and proximity to high quality businesses.  Residents must pay a mortgage payment based on the net-worth of the property.  If an individual fails to pay the mortgage, they are locked out of their home until they can repay their debt.  </a:t>
+            </a:r>
+          </a:p>
+          <a:p>
+            <a:pPr>
+              <a:spcBef>
+                <a:spcPts val="576"/>
+              </a:spcBef>
+            </a:pPr>
+            <a:endParaRPr lang="en-US" sz="2500" dirty="0" smtClean="0">
+              <a:latin typeface="Trebuchet MS"/>
+              <a:cs typeface="Trebuchet MS"/>
+            </a:endParaRPr>
+          </a:p>
+          <a:p>
+            <a:pPr>
+              <a:spcBef>
+                <a:spcPts val="576"/>
+              </a:spcBef>
+            </a:pPr>
+            <a:r>
+              <a:rPr lang="en-US" sz="2500" b="1" dirty="0" smtClean="0">
+                <a:latin typeface="Trebuchet MS"/>
+                <a:cs typeface="Trebuchet MS"/>
+              </a:rPr>
+              <a:t>Entertainment </a:t>
+            </a:r>
+          </a:p>
+          <a:p>
+            <a:pPr>
+              <a:spcBef>
+                <a:spcPts val="576"/>
+              </a:spcBef>
+            </a:pPr>
+            <a:r>
+              <a:rPr lang="en-US" sz="2500" dirty="0" smtClean="0">
+                <a:latin typeface="Trebuchet MS"/>
+                <a:cs typeface="Trebuchet MS"/>
+              </a:rPr>
+              <a:t>When individuals want to go out and increase their happiness, they go shopping at an entertainment establishment. There are four types: restaurant, movie, adult, games.  Each type satisfies the needs of an individual differently, and the quality of the store influences the price.  </a:t>
+            </a:r>
+          </a:p>
+          <a:p>
+            <a:pPr>
+              <a:spcBef>
+                <a:spcPts val="576"/>
+              </a:spcBef>
+            </a:pPr>
+            <a:endParaRPr lang="en-US" sz="2500" dirty="0">
+              <a:latin typeface="Trebuchet MS"/>
+              <a:cs typeface="Trebuchet MS"/>
+            </a:endParaRPr>
           </a:p>
         </p:txBody>
       </p:sp>

</xml_diff>